<commit_message>
changes to first episode after feedback
</commit_message>
<xml_diff>
--- a/episode1/media/slides-episode-1.pptx
+++ b/episode1/media/slides-episode-1.pptx
@@ -6,45 +6,49 @@
     <p:sldMasterId id="2147483648" r:id="rId2"/>
   </p:sldMasterIdLst>
   <p:notesMasterIdLst>
-    <p:notesMasterId r:id="rId36"/>
+    <p:notesMasterId r:id="rId40"/>
   </p:notesMasterIdLst>
   <p:handoutMasterIdLst>
-    <p:handoutMasterId r:id="rId37"/>
+    <p:handoutMasterId r:id="rId41"/>
   </p:handoutMasterIdLst>
   <p:sldIdLst>
     <p:sldId id="256" r:id="rId3"/>
-    <p:sldId id="278" r:id="rId4"/>
-    <p:sldId id="277" r:id="rId5"/>
-    <p:sldId id="279" r:id="rId6"/>
-    <p:sldId id="265" r:id="rId7"/>
-    <p:sldId id="280" r:id="rId8"/>
-    <p:sldId id="281" r:id="rId9"/>
-    <p:sldId id="282" r:id="rId10"/>
-    <p:sldId id="276" r:id="rId11"/>
-    <p:sldId id="283" r:id="rId12"/>
-    <p:sldId id="285" r:id="rId13"/>
-    <p:sldId id="284" r:id="rId14"/>
-    <p:sldId id="286" r:id="rId15"/>
-    <p:sldId id="287" r:id="rId16"/>
-    <p:sldId id="288" r:id="rId17"/>
-    <p:sldId id="289" r:id="rId18"/>
-    <p:sldId id="290" r:id="rId19"/>
-    <p:sldId id="291" r:id="rId20"/>
-    <p:sldId id="295" r:id="rId21"/>
-    <p:sldId id="292" r:id="rId22"/>
-    <p:sldId id="293" r:id="rId23"/>
-    <p:sldId id="294" r:id="rId24"/>
-    <p:sldId id="296" r:id="rId25"/>
-    <p:sldId id="297" r:id="rId26"/>
-    <p:sldId id="299" r:id="rId27"/>
-    <p:sldId id="298" r:id="rId28"/>
-    <p:sldId id="300" r:id="rId29"/>
-    <p:sldId id="301" r:id="rId30"/>
-    <p:sldId id="302" r:id="rId31"/>
-    <p:sldId id="306" r:id="rId32"/>
-    <p:sldId id="303" r:id="rId33"/>
-    <p:sldId id="304" r:id="rId34"/>
-    <p:sldId id="305" r:id="rId35"/>
+    <p:sldId id="307" r:id="rId4"/>
+    <p:sldId id="278" r:id="rId5"/>
+    <p:sldId id="277" r:id="rId6"/>
+    <p:sldId id="279" r:id="rId7"/>
+    <p:sldId id="308" r:id="rId8"/>
+    <p:sldId id="265" r:id="rId9"/>
+    <p:sldId id="280" r:id="rId10"/>
+    <p:sldId id="310" r:id="rId11"/>
+    <p:sldId id="309" r:id="rId12"/>
+    <p:sldId id="311" r:id="rId13"/>
+    <p:sldId id="281" r:id="rId14"/>
+    <p:sldId id="276" r:id="rId15"/>
+    <p:sldId id="283" r:id="rId16"/>
+    <p:sldId id="285" r:id="rId17"/>
+    <p:sldId id="284" r:id="rId18"/>
+    <p:sldId id="286" r:id="rId19"/>
+    <p:sldId id="287" r:id="rId20"/>
+    <p:sldId id="288" r:id="rId21"/>
+    <p:sldId id="289" r:id="rId22"/>
+    <p:sldId id="290" r:id="rId23"/>
+    <p:sldId id="291" r:id="rId24"/>
+    <p:sldId id="295" r:id="rId25"/>
+    <p:sldId id="292" r:id="rId26"/>
+    <p:sldId id="293" r:id="rId27"/>
+    <p:sldId id="294" r:id="rId28"/>
+    <p:sldId id="296" r:id="rId29"/>
+    <p:sldId id="297" r:id="rId30"/>
+    <p:sldId id="299" r:id="rId31"/>
+    <p:sldId id="298" r:id="rId32"/>
+    <p:sldId id="300" r:id="rId33"/>
+    <p:sldId id="301" r:id="rId34"/>
+    <p:sldId id="302" r:id="rId35"/>
+    <p:sldId id="306" r:id="rId36"/>
+    <p:sldId id="303" r:id="rId37"/>
+    <p:sldId id="304" r:id="rId38"/>
+    <p:sldId id="305" r:id="rId39"/>
   </p:sldIdLst>
   <p:sldSz cx="12192000" cy="6858000"/>
   <p:notesSz cx="6858000" cy="9144000"/>
@@ -247,7 +251,7 @@
           <a:p>
             <a:fld id="{762B48F5-BACC-47D6-A0F7-82FBF9C6BC85}" type="datetimeFigureOut">
               <a:rPr lang="en-US"/>
-              <a:t>1/1/2021</a:t>
+              <a:t>1/5/2021</a:t>
             </a:fld>
             <a:endParaRPr/>
           </a:p>
@@ -412,7 +416,7 @@
           <a:p>
             <a:fld id="{0CB1CD00-5424-4675-AB18-2C419B060449}" type="datetimeFigureOut">
               <a:rPr lang="en-US"/>
-              <a:t>1/1/2021</a:t>
+              <a:t>1/5/2021</a:t>
             </a:fld>
             <a:endParaRPr/>
           </a:p>
@@ -739,7 +743,7 @@
           <a:p>
             <a:fld id="{5EE2CF44-2B13-41B4-A334-1CDF534EEBBF}" type="slidenum">
               <a:rPr lang="en-AU" smtClean="0"/>
-              <a:t>9</a:t>
+              <a:t>2</a:t>
             </a:fld>
             <a:endParaRPr lang="en-AU"/>
           </a:p>
@@ -748,7 +752,7 @@
     </p:spTree>
     <p:extLst>
       <p:ext uri="{BB962C8B-B14F-4D97-AF65-F5344CB8AC3E}">
-        <p14:creationId xmlns:p14="http://schemas.microsoft.com/office/powerpoint/2010/main" val="3858872874"/>
+        <p14:creationId xmlns:p14="http://schemas.microsoft.com/office/powerpoint/2010/main" val="984501757"/>
       </p:ext>
     </p:extLst>
   </p:cSld>
@@ -823,7 +827,7 @@
           <a:p>
             <a:fld id="{5EE2CF44-2B13-41B4-A334-1CDF534EEBBF}" type="slidenum">
               <a:rPr lang="en-AU" smtClean="0"/>
-              <a:t>10</a:t>
+              <a:t>13</a:t>
             </a:fld>
             <a:endParaRPr lang="en-AU"/>
           </a:p>
@@ -832,7 +836,7 @@
     </p:spTree>
     <p:extLst>
       <p:ext uri="{BB962C8B-B14F-4D97-AF65-F5344CB8AC3E}">
-        <p14:creationId xmlns:p14="http://schemas.microsoft.com/office/powerpoint/2010/main" val="2618169726"/>
+        <p14:creationId xmlns:p14="http://schemas.microsoft.com/office/powerpoint/2010/main" val="3858872874"/>
       </p:ext>
     </p:extLst>
   </p:cSld>
@@ -907,7 +911,7 @@
           <a:p>
             <a:fld id="{5EE2CF44-2B13-41B4-A334-1CDF534EEBBF}" type="slidenum">
               <a:rPr lang="en-AU" smtClean="0"/>
-              <a:t>11</a:t>
+              <a:t>14</a:t>
             </a:fld>
             <a:endParaRPr lang="en-AU"/>
           </a:p>
@@ -916,7 +920,7 @@
     </p:spTree>
     <p:extLst>
       <p:ext uri="{BB962C8B-B14F-4D97-AF65-F5344CB8AC3E}">
-        <p14:creationId xmlns:p14="http://schemas.microsoft.com/office/powerpoint/2010/main" val="345819773"/>
+        <p14:creationId xmlns:p14="http://schemas.microsoft.com/office/powerpoint/2010/main" val="2618169726"/>
       </p:ext>
     </p:extLst>
   </p:cSld>
@@ -991,7 +995,7 @@
           <a:p>
             <a:fld id="{5EE2CF44-2B13-41B4-A334-1CDF534EEBBF}" type="slidenum">
               <a:rPr lang="en-AU" smtClean="0"/>
-              <a:t>12</a:t>
+              <a:t>15</a:t>
             </a:fld>
             <a:endParaRPr lang="en-AU"/>
           </a:p>
@@ -1000,7 +1004,7 @@
     </p:spTree>
     <p:extLst>
       <p:ext uri="{BB962C8B-B14F-4D97-AF65-F5344CB8AC3E}">
-        <p14:creationId xmlns:p14="http://schemas.microsoft.com/office/powerpoint/2010/main" val="140915403"/>
+        <p14:creationId xmlns:p14="http://schemas.microsoft.com/office/powerpoint/2010/main" val="345819773"/>
       </p:ext>
     </p:extLst>
   </p:cSld>
@@ -1075,7 +1079,7 @@
           <a:p>
             <a:fld id="{5EE2CF44-2B13-41B4-A334-1CDF534EEBBF}" type="slidenum">
               <a:rPr lang="en-AU" smtClean="0"/>
-              <a:t>13</a:t>
+              <a:t>16</a:t>
             </a:fld>
             <a:endParaRPr lang="en-AU"/>
           </a:p>
@@ -1084,7 +1088,7 @@
     </p:spTree>
     <p:extLst>
       <p:ext uri="{BB962C8B-B14F-4D97-AF65-F5344CB8AC3E}">
-        <p14:creationId xmlns:p14="http://schemas.microsoft.com/office/powerpoint/2010/main" val="947057985"/>
+        <p14:creationId xmlns:p14="http://schemas.microsoft.com/office/powerpoint/2010/main" val="140915403"/>
       </p:ext>
     </p:extLst>
   </p:cSld>
@@ -1159,7 +1163,7 @@
           <a:p>
             <a:fld id="{5EE2CF44-2B13-41B4-A334-1CDF534EEBBF}" type="slidenum">
               <a:rPr lang="en-AU" smtClean="0"/>
-              <a:t>14</a:t>
+              <a:t>17</a:t>
             </a:fld>
             <a:endParaRPr lang="en-AU"/>
           </a:p>
@@ -1168,7 +1172,7 @@
     </p:spTree>
     <p:extLst>
       <p:ext uri="{BB962C8B-B14F-4D97-AF65-F5344CB8AC3E}">
-        <p14:creationId xmlns:p14="http://schemas.microsoft.com/office/powerpoint/2010/main" val="3065530317"/>
+        <p14:creationId xmlns:p14="http://schemas.microsoft.com/office/powerpoint/2010/main" val="947057985"/>
       </p:ext>
     </p:extLst>
   </p:cSld>
@@ -1243,7 +1247,7 @@
           <a:p>
             <a:fld id="{5EE2CF44-2B13-41B4-A334-1CDF534EEBBF}" type="slidenum">
               <a:rPr lang="en-AU" smtClean="0"/>
-              <a:t>16</a:t>
+              <a:t>18</a:t>
             </a:fld>
             <a:endParaRPr lang="en-AU"/>
           </a:p>
@@ -1252,7 +1256,7 @@
     </p:spTree>
     <p:extLst>
       <p:ext uri="{BB962C8B-B14F-4D97-AF65-F5344CB8AC3E}">
-        <p14:creationId xmlns:p14="http://schemas.microsoft.com/office/powerpoint/2010/main" val="71670278"/>
+        <p14:creationId xmlns:p14="http://schemas.microsoft.com/office/powerpoint/2010/main" val="3065530317"/>
       </p:ext>
     </p:extLst>
   </p:cSld>
@@ -1327,7 +1331,91 @@
           <a:p>
             <a:fld id="{5EE2CF44-2B13-41B4-A334-1CDF534EEBBF}" type="slidenum">
               <a:rPr lang="en-AU" smtClean="0"/>
-              <a:t>17</a:t>
+              <a:t>20</a:t>
+            </a:fld>
+            <a:endParaRPr lang="en-AU"/>
+          </a:p>
+        </p:txBody>
+      </p:sp>
+    </p:spTree>
+    <p:extLst>
+      <p:ext uri="{BB962C8B-B14F-4D97-AF65-F5344CB8AC3E}">
+        <p14:creationId xmlns:p14="http://schemas.microsoft.com/office/powerpoint/2010/main" val="71670278"/>
+      </p:ext>
+    </p:extLst>
+  </p:cSld>
+  <p:clrMapOvr>
+    <a:masterClrMapping/>
+  </p:clrMapOvr>
+</p:notes>
+</file>
+
+<file path=ppt/notesSlides/notesSlide9.xml><?xml version="1.0" encoding="utf-8"?>
+<p:notes xmlns:a="http://schemas.openxmlformats.org/drawingml/2006/main" xmlns:r="http://schemas.openxmlformats.org/officeDocument/2006/relationships" xmlns:p="http://schemas.openxmlformats.org/presentationml/2006/main">
+  <p:cSld>
+    <p:spTree>
+      <p:nvGrpSpPr>
+        <p:cNvPr id="1" name=""/>
+        <p:cNvGrpSpPr/>
+        <p:nvPr/>
+      </p:nvGrpSpPr>
+      <p:grpSpPr>
+        <a:xfrm>
+          <a:off x="0" y="0"/>
+          <a:ext cx="0" cy="0"/>
+          <a:chOff x="0" y="0"/>
+          <a:chExt cx="0" cy="0"/>
+        </a:xfrm>
+      </p:grpSpPr>
+      <p:sp>
+        <p:nvSpPr>
+          <p:cNvPr id="2" name="Slide Image Placeholder 1"/>
+          <p:cNvSpPr>
+            <a:spLocks noGrp="1" noRot="1" noChangeAspect="1"/>
+          </p:cNvSpPr>
+          <p:nvPr>
+            <p:ph type="sldImg"/>
+          </p:nvPr>
+        </p:nvSpPr>
+        <p:spPr/>
+      </p:sp>
+      <p:sp>
+        <p:nvSpPr>
+          <p:cNvPr id="3" name="Notes Placeholder 2"/>
+          <p:cNvSpPr>
+            <a:spLocks noGrp="1"/>
+          </p:cNvSpPr>
+          <p:nvPr>
+            <p:ph type="body" idx="1"/>
+          </p:nvPr>
+        </p:nvSpPr>
+        <p:spPr/>
+        <p:txBody>
+          <a:bodyPr/>
+          <a:lstStyle/>
+          <a:p>
+            <a:endParaRPr lang="en-AU" dirty="0"/>
+          </a:p>
+        </p:txBody>
+      </p:sp>
+      <p:sp>
+        <p:nvSpPr>
+          <p:cNvPr id="4" name="Slide Number Placeholder 3"/>
+          <p:cNvSpPr>
+            <a:spLocks noGrp="1"/>
+          </p:cNvSpPr>
+          <p:nvPr>
+            <p:ph type="sldNum" sz="quarter" idx="5"/>
+          </p:nvPr>
+        </p:nvSpPr>
+        <p:spPr/>
+        <p:txBody>
+          <a:bodyPr/>
+          <a:lstStyle/>
+          <a:p>
+            <a:fld id="{5EE2CF44-2B13-41B4-A334-1CDF534EEBBF}" type="slidenum">
+              <a:rPr lang="en-AU" smtClean="0"/>
+              <a:t>21</a:t>
             </a:fld>
             <a:endParaRPr lang="en-AU"/>
           </a:p>
@@ -1737,7 +1825,7 @@
                     </a:extLst>
                   </a:hlinkClick>
                 </a:rPr>
-                <a:t>https://twitch.com/just-the-benno</a:t>
+                <a:t>https://twitch.tv/justthebenno</a:t>
               </a:r>
               <a:endParaRPr lang="LID4096" dirty="0">
                 <a:solidFill>
@@ -1813,8 +1901,8 @@
 </file>
 
 <file path=ppt/slideLayouts/slideLayout10.xml><?xml version="1.0" encoding="utf-8"?>
-<p:sldLayout xmlns:a="http://schemas.openxmlformats.org/drawingml/2006/main" xmlns:r="http://schemas.openxmlformats.org/officeDocument/2006/relationships" xmlns:p="http://schemas.openxmlformats.org/presentationml/2006/main" type="picTx" preserve="1">
-  <p:cSld name="Picture with Caption">
+<p:sldLayout xmlns:a="http://schemas.openxmlformats.org/drawingml/2006/main" xmlns:r="http://schemas.openxmlformats.org/officeDocument/2006/relationships" xmlns:p="http://schemas.openxmlformats.org/presentationml/2006/main" preserve="1" userDrawn="1">
+  <p:cSld name="Content with Caption">
     <p:spTree>
       <p:nvGrpSpPr>
         <p:cNvPr id="1" name=""/>
@@ -1841,8 +1929,8 @@
         </p:nvSpPr>
         <p:spPr>
           <a:xfrm>
-            <a:off x="7997952" y="1600200"/>
-            <a:ext cx="3127248" cy="1828800"/>
+            <a:off x="8002587" y="1600200"/>
+            <a:ext cx="3122613" cy="1828800"/>
           </a:xfrm>
         </p:spPr>
         <p:txBody>
@@ -1859,72 +1947,94 @@
               <a:rPr lang="en-US"/>
               <a:t>Click to edit Master title style</a:t>
             </a:r>
-          </a:p>
-        </p:txBody>
-      </p:sp>
-      <p:sp>
-        <p:nvSpPr>
-          <p:cNvPr id="3" name="Picture Placeholder 2"/>
-          <p:cNvSpPr>
-            <a:spLocks noGrp="1"/>
-          </p:cNvSpPr>
-          <p:nvPr>
-            <p:ph type="pic" idx="1"/>
+            <a:endParaRPr lang="en-US" dirty="0"/>
+          </a:p>
+        </p:txBody>
+      </p:sp>
+      <p:sp>
+        <p:nvSpPr>
+          <p:cNvPr id="3" name="Content Placeholder 2"/>
+          <p:cNvSpPr>
+            <a:spLocks noGrp="1"/>
+          </p:cNvSpPr>
+          <p:nvPr>
+            <p:ph idx="1"/>
           </p:nvPr>
         </p:nvSpPr>
         <p:spPr>
           <a:xfrm>
-            <a:off x="781251" y="777240"/>
-            <a:ext cx="6400800" cy="5303520"/>
+            <a:off x="760412" y="762000"/>
+            <a:ext cx="6400800" cy="5334000"/>
           </a:xfrm>
         </p:spPr>
         <p:txBody>
-          <a:bodyPr tIns="457200">
+          <a:bodyPr>
             <a:normAutofit/>
           </a:bodyPr>
           <a:lstStyle>
-            <a:lvl1pPr marL="0" indent="0" algn="ctr">
-              <a:buNone/>
+            <a:lvl1pPr>
               <a:defRPr sz="2000"/>
             </a:lvl1pPr>
-            <a:lvl2pPr marL="457200" indent="0">
-              <a:buNone/>
-              <a:defRPr sz="2800"/>
+            <a:lvl2pPr>
+              <a:defRPr sz="1800"/>
             </a:lvl2pPr>
-            <a:lvl3pPr marL="914400" indent="0">
-              <a:buNone/>
-              <a:defRPr sz="2400"/>
+            <a:lvl3pPr>
+              <a:defRPr sz="1600"/>
             </a:lvl3pPr>
-            <a:lvl4pPr marL="1371600" indent="0">
-              <a:buNone/>
-              <a:defRPr sz="2000"/>
+            <a:lvl4pPr>
+              <a:defRPr sz="1400"/>
             </a:lvl4pPr>
-            <a:lvl5pPr marL="1828800" indent="0">
-              <a:buNone/>
-              <a:defRPr sz="2000"/>
+            <a:lvl5pPr>
+              <a:defRPr sz="1400"/>
             </a:lvl5pPr>
-            <a:lvl6pPr marL="2286000" indent="0">
-              <a:buNone/>
-              <a:defRPr sz="2000"/>
+            <a:lvl6pPr>
+              <a:defRPr sz="1400"/>
             </a:lvl6pPr>
-            <a:lvl7pPr marL="2743200" indent="0">
-              <a:buNone/>
-              <a:defRPr sz="2000"/>
+            <a:lvl7pPr>
+              <a:defRPr sz="1400"/>
             </a:lvl7pPr>
-            <a:lvl8pPr marL="3200400" indent="0">
-              <a:buNone/>
-              <a:defRPr sz="2000"/>
+            <a:lvl8pPr>
+              <a:defRPr sz="1400"/>
             </a:lvl8pPr>
-            <a:lvl9pPr marL="3657600" indent="0">
-              <a:buNone/>
-              <a:defRPr sz="2000"/>
+            <a:lvl9pPr>
+              <a:defRPr sz="1400"/>
             </a:lvl9pPr>
           </a:lstStyle>
           <a:p>
+            <a:pPr lvl="0"/>
             <a:r>
               <a:rPr lang="en-US"/>
-              <a:t>Click icon to add picture</a:t>
-            </a:r>
+              <a:t>Click to edit Master text styles</a:t>
+            </a:r>
+          </a:p>
+          <a:p>
+            <a:pPr lvl="1"/>
+            <a:r>
+              <a:rPr lang="en-US"/>
+              <a:t>Second level</a:t>
+            </a:r>
+          </a:p>
+          <a:p>
+            <a:pPr lvl="2"/>
+            <a:r>
+              <a:rPr lang="en-US"/>
+              <a:t>Third level</a:t>
+            </a:r>
+          </a:p>
+          <a:p>
+            <a:pPr lvl="3"/>
+            <a:r>
+              <a:rPr lang="en-US"/>
+              <a:t>Fourth level</a:t>
+            </a:r>
+          </a:p>
+          <a:p>
+            <a:pPr lvl="4"/>
+            <a:r>
+              <a:rPr lang="en-US"/>
+              <a:t>Fifth level</a:t>
+            </a:r>
+            <a:endParaRPr lang="en-US" dirty="0"/>
           </a:p>
         </p:txBody>
       </p:sp>
@@ -1940,8 +2050,8 @@
         </p:nvSpPr>
         <p:spPr>
           <a:xfrm>
-            <a:off x="7997952" y="3429000"/>
-            <a:ext cx="3127248" cy="1828800"/>
+            <a:off x="8001039" y="3429000"/>
+            <a:ext cx="3124161" cy="1828800"/>
           </a:xfrm>
         </p:spPr>
         <p:txBody>
@@ -1998,6 +2108,268 @@
       </p:sp>
       <p:sp>
         <p:nvSpPr>
+          <p:cNvPr id="6" name="Footer Placeholder 5"/>
+          <p:cNvSpPr>
+            <a:spLocks noGrp="1"/>
+          </p:cNvSpPr>
+          <p:nvPr>
+            <p:ph type="ftr" sz="quarter" idx="11"/>
+          </p:nvPr>
+        </p:nvSpPr>
+        <p:spPr/>
+        <p:txBody>
+          <a:bodyPr/>
+          <a:lstStyle/>
+          <a:p>
+            <a:endParaRPr lang="en-US"/>
+          </a:p>
+        </p:txBody>
+      </p:sp>
+      <p:sp>
+        <p:nvSpPr>
+          <p:cNvPr id="5" name="Date Placeholder 4"/>
+          <p:cNvSpPr>
+            <a:spLocks noGrp="1"/>
+          </p:cNvSpPr>
+          <p:nvPr>
+            <p:ph type="dt" sz="half" idx="10"/>
+          </p:nvPr>
+        </p:nvSpPr>
+        <p:spPr/>
+        <p:txBody>
+          <a:bodyPr/>
+          <a:lstStyle/>
+          <a:p>
+            <a:fld id="{37CC0096-1860-4642-9CD2-0079EA5E7CD1}" type="datetimeFigureOut">
+              <a:rPr lang="en-US" smtClean="0"/>
+              <a:t>1/5/2021</a:t>
+            </a:fld>
+            <a:endParaRPr lang="en-US"/>
+          </a:p>
+        </p:txBody>
+      </p:sp>
+      <p:sp>
+        <p:nvSpPr>
+          <p:cNvPr id="7" name="Slide Number Placeholder 6"/>
+          <p:cNvSpPr>
+            <a:spLocks noGrp="1"/>
+          </p:cNvSpPr>
+          <p:nvPr>
+            <p:ph type="sldNum" sz="quarter" idx="12"/>
+          </p:nvPr>
+        </p:nvSpPr>
+        <p:spPr/>
+        <p:txBody>
+          <a:bodyPr/>
+          <a:lstStyle/>
+          <a:p>
+            <a:fld id="{E31375A4-56A4-47D6-9801-1991572033F7}" type="slidenum">
+              <a:rPr lang="en-US" smtClean="0"/>
+              <a:t>‹#›</a:t>
+            </a:fld>
+            <a:endParaRPr lang="en-US"/>
+          </a:p>
+        </p:txBody>
+      </p:sp>
+    </p:spTree>
+    <p:extLst>
+      <p:ext uri="{BB962C8B-B14F-4D97-AF65-F5344CB8AC3E}">
+        <p14:creationId xmlns:p14="http://schemas.microsoft.com/office/powerpoint/2010/main" val="1667374130"/>
+      </p:ext>
+    </p:extLst>
+  </p:cSld>
+  <p:clrMapOvr>
+    <a:masterClrMapping/>
+  </p:clrMapOvr>
+</p:sldLayout>
+</file>
+
+<file path=ppt/slideLayouts/slideLayout11.xml><?xml version="1.0" encoding="utf-8"?>
+<p:sldLayout xmlns:a="http://schemas.openxmlformats.org/drawingml/2006/main" xmlns:r="http://schemas.openxmlformats.org/officeDocument/2006/relationships" xmlns:p="http://schemas.openxmlformats.org/presentationml/2006/main" type="picTx" preserve="1">
+  <p:cSld name="Picture with Caption">
+    <p:spTree>
+      <p:nvGrpSpPr>
+        <p:cNvPr id="1" name=""/>
+        <p:cNvGrpSpPr/>
+        <p:nvPr/>
+      </p:nvGrpSpPr>
+      <p:grpSpPr>
+        <a:xfrm>
+          <a:off x="0" y="0"/>
+          <a:ext cx="0" cy="0"/>
+          <a:chOff x="0" y="0"/>
+          <a:chExt cx="0" cy="0"/>
+        </a:xfrm>
+      </p:grpSpPr>
+      <p:sp>
+        <p:nvSpPr>
+          <p:cNvPr id="2" name="Title 1"/>
+          <p:cNvSpPr>
+            <a:spLocks noGrp="1"/>
+          </p:cNvSpPr>
+          <p:nvPr>
+            <p:ph type="title"/>
+          </p:nvPr>
+        </p:nvSpPr>
+        <p:spPr>
+          <a:xfrm>
+            <a:off x="7997952" y="1600200"/>
+            <a:ext cx="3127248" cy="1828800"/>
+          </a:xfrm>
+        </p:spPr>
+        <p:txBody>
+          <a:bodyPr anchor="b">
+            <a:normAutofit/>
+          </a:bodyPr>
+          <a:lstStyle>
+            <a:lvl1pPr>
+              <a:defRPr sz="3400"/>
+            </a:lvl1pPr>
+          </a:lstStyle>
+          <a:p>
+            <a:r>
+              <a:rPr lang="en-US"/>
+              <a:t>Click to edit Master title style</a:t>
+            </a:r>
+          </a:p>
+        </p:txBody>
+      </p:sp>
+      <p:sp>
+        <p:nvSpPr>
+          <p:cNvPr id="3" name="Picture Placeholder 2"/>
+          <p:cNvSpPr>
+            <a:spLocks noGrp="1"/>
+          </p:cNvSpPr>
+          <p:nvPr>
+            <p:ph type="pic" idx="1"/>
+          </p:nvPr>
+        </p:nvSpPr>
+        <p:spPr>
+          <a:xfrm>
+            <a:off x="781251" y="777240"/>
+            <a:ext cx="6400800" cy="5303520"/>
+          </a:xfrm>
+        </p:spPr>
+        <p:txBody>
+          <a:bodyPr tIns="457200">
+            <a:normAutofit/>
+          </a:bodyPr>
+          <a:lstStyle>
+            <a:lvl1pPr marL="0" indent="0" algn="ctr">
+              <a:buNone/>
+              <a:defRPr sz="2000"/>
+            </a:lvl1pPr>
+            <a:lvl2pPr marL="457200" indent="0">
+              <a:buNone/>
+              <a:defRPr sz="2800"/>
+            </a:lvl2pPr>
+            <a:lvl3pPr marL="914400" indent="0">
+              <a:buNone/>
+              <a:defRPr sz="2400"/>
+            </a:lvl3pPr>
+            <a:lvl4pPr marL="1371600" indent="0">
+              <a:buNone/>
+              <a:defRPr sz="2000"/>
+            </a:lvl4pPr>
+            <a:lvl5pPr marL="1828800" indent="0">
+              <a:buNone/>
+              <a:defRPr sz="2000"/>
+            </a:lvl5pPr>
+            <a:lvl6pPr marL="2286000" indent="0">
+              <a:buNone/>
+              <a:defRPr sz="2000"/>
+            </a:lvl6pPr>
+            <a:lvl7pPr marL="2743200" indent="0">
+              <a:buNone/>
+              <a:defRPr sz="2000"/>
+            </a:lvl7pPr>
+            <a:lvl8pPr marL="3200400" indent="0">
+              <a:buNone/>
+              <a:defRPr sz="2000"/>
+            </a:lvl8pPr>
+            <a:lvl9pPr marL="3657600" indent="0">
+              <a:buNone/>
+              <a:defRPr sz="2000"/>
+            </a:lvl9pPr>
+          </a:lstStyle>
+          <a:p>
+            <a:r>
+              <a:rPr lang="en-US"/>
+              <a:t>Click icon to add picture</a:t>
+            </a:r>
+          </a:p>
+        </p:txBody>
+      </p:sp>
+      <p:sp>
+        <p:nvSpPr>
+          <p:cNvPr id="4" name="Text Placeholder 3"/>
+          <p:cNvSpPr>
+            <a:spLocks noGrp="1"/>
+          </p:cNvSpPr>
+          <p:nvPr>
+            <p:ph type="body" sz="half" idx="2"/>
+          </p:nvPr>
+        </p:nvSpPr>
+        <p:spPr>
+          <a:xfrm>
+            <a:off x="7997952" y="3429000"/>
+            <a:ext cx="3127248" cy="1828800"/>
+          </a:xfrm>
+        </p:spPr>
+        <p:txBody>
+          <a:bodyPr/>
+          <a:lstStyle>
+            <a:lvl1pPr marL="0" indent="0">
+              <a:spcBef>
+                <a:spcPts val="0"/>
+              </a:spcBef>
+              <a:buNone/>
+              <a:defRPr sz="1600"/>
+            </a:lvl1pPr>
+            <a:lvl2pPr marL="457200" indent="0">
+              <a:buNone/>
+              <a:defRPr sz="1400"/>
+            </a:lvl2pPr>
+            <a:lvl3pPr marL="914400" indent="0">
+              <a:buNone/>
+              <a:defRPr sz="1200"/>
+            </a:lvl3pPr>
+            <a:lvl4pPr marL="1371600" indent="0">
+              <a:buNone/>
+              <a:defRPr sz="1000"/>
+            </a:lvl4pPr>
+            <a:lvl5pPr marL="1828800" indent="0">
+              <a:buNone/>
+              <a:defRPr sz="1000"/>
+            </a:lvl5pPr>
+            <a:lvl6pPr marL="2286000" indent="0">
+              <a:buNone/>
+              <a:defRPr sz="1000"/>
+            </a:lvl6pPr>
+            <a:lvl7pPr marL="2743200" indent="0">
+              <a:buNone/>
+              <a:defRPr sz="1000"/>
+            </a:lvl7pPr>
+            <a:lvl8pPr marL="3200400" indent="0">
+              <a:buNone/>
+              <a:defRPr sz="1000"/>
+            </a:lvl8pPr>
+            <a:lvl9pPr marL="3657600" indent="0">
+              <a:buNone/>
+              <a:defRPr sz="1000"/>
+            </a:lvl9pPr>
+          </a:lstStyle>
+          <a:p>
+            <a:pPr lvl="0"/>
+            <a:r>
+              <a:rPr lang="en-US"/>
+              <a:t>Click to edit Master text styles</a:t>
+            </a:r>
+          </a:p>
+        </p:txBody>
+      </p:sp>
+      <p:sp>
+        <p:nvSpPr>
           <p:cNvPr id="8" name="Rectangle 7" descr="An empty placeholder to add an image. Click on the placeholder and select the image that you wish to add."/>
           <p:cNvSpPr/>
           <p:nvPr userDrawn="1"/>
@@ -2081,7 +2453,7 @@
           <a:p>
             <a:fld id="{37CC0096-1860-4642-9CD2-0079EA5E7CD1}" type="datetimeFigureOut">
               <a:rPr lang="en-US" smtClean="0"/>
-              <a:t>1/1/2021</a:t>
+              <a:t>1/5/2021</a:t>
             </a:fld>
             <a:endParaRPr lang="en-US"/>
           </a:p>
@@ -2123,7 +2495,7 @@
 </p:sldLayout>
 </file>
 
-<file path=ppt/slideLayouts/slideLayout11.xml><?xml version="1.0" encoding="utf-8"?>
+<file path=ppt/slideLayouts/slideLayout12.xml><?xml version="1.0" encoding="utf-8"?>
 <p:sldLayout xmlns:a="http://schemas.openxmlformats.org/drawingml/2006/main" xmlns:r="http://schemas.openxmlformats.org/officeDocument/2006/relationships" xmlns:p="http://schemas.openxmlformats.org/presentationml/2006/main" type="vertTx" preserve="1">
   <p:cSld name="Title and Vertical Text">
     <p:spTree>
@@ -2250,7 +2622,7 @@
           <a:p>
             <a:fld id="{37CC0096-1860-4642-9CD2-0079EA5E7CD1}" type="datetimeFigureOut">
               <a:rPr lang="en-US" smtClean="0"/>
-              <a:t>1/1/2021</a:t>
+              <a:t>1/5/2021</a:t>
             </a:fld>
             <a:endParaRPr lang="en-US"/>
           </a:p>
@@ -2292,7 +2664,7 @@
 </p:sldLayout>
 </file>
 
-<file path=ppt/slideLayouts/slideLayout12.xml><?xml version="1.0" encoding="utf-8"?>
+<file path=ppt/slideLayouts/slideLayout13.xml><?xml version="1.0" encoding="utf-8"?>
 <p:sldLayout xmlns:a="http://schemas.openxmlformats.org/drawingml/2006/main" xmlns:r="http://schemas.openxmlformats.org/officeDocument/2006/relationships" xmlns:p="http://schemas.openxmlformats.org/presentationml/2006/main" type="vertTitleAndTx" preserve="1">
   <p:cSld name="Vertical Title and Text">
     <p:spTree>
@@ -2429,7 +2801,7 @@
           <a:p>
             <a:fld id="{37CC0096-1860-4642-9CD2-0079EA5E7CD1}" type="datetimeFigureOut">
               <a:rPr lang="en-US" smtClean="0"/>
-              <a:t>1/1/2021</a:t>
+              <a:t>1/5/2021</a:t>
             </a:fld>
             <a:endParaRPr lang="en-US"/>
           </a:p>
@@ -2472,6 +2844,297 @@
 </file>
 
 <file path=ppt/slideLayouts/slideLayout2.xml><?xml version="1.0" encoding="utf-8"?>
+<p:sldLayout xmlns:a="http://schemas.openxmlformats.org/drawingml/2006/main" xmlns:r="http://schemas.openxmlformats.org/officeDocument/2006/relationships" xmlns:p="http://schemas.openxmlformats.org/presentationml/2006/main" type="twoObj">
+  <p:cSld name="Two Content">
+    <p:spTree>
+      <p:nvGrpSpPr>
+        <p:cNvPr id="1" name=""/>
+        <p:cNvGrpSpPr/>
+        <p:nvPr/>
+      </p:nvGrpSpPr>
+      <p:grpSpPr>
+        <a:xfrm>
+          <a:off x="0" y="0"/>
+          <a:ext cx="0" cy="0"/>
+          <a:chOff x="0" y="0"/>
+          <a:chExt cx="0" cy="0"/>
+        </a:xfrm>
+      </p:grpSpPr>
+      <p:sp>
+        <p:nvSpPr>
+          <p:cNvPr id="2" name="Title 1"/>
+          <p:cNvSpPr>
+            <a:spLocks noGrp="1"/>
+          </p:cNvSpPr>
+          <p:nvPr>
+            <p:ph type="title"/>
+          </p:nvPr>
+        </p:nvSpPr>
+        <p:spPr/>
+        <p:txBody>
+          <a:bodyPr/>
+          <a:lstStyle/>
+          <a:p>
+            <a:r>
+              <a:rPr lang="en-US"/>
+              <a:t>Click to edit Master title style</a:t>
+            </a:r>
+          </a:p>
+        </p:txBody>
+      </p:sp>
+      <p:sp>
+        <p:nvSpPr>
+          <p:cNvPr id="3" name="Content Placeholder 2"/>
+          <p:cNvSpPr>
+            <a:spLocks noGrp="1"/>
+          </p:cNvSpPr>
+          <p:nvPr>
+            <p:ph sz="half" idx="1"/>
+          </p:nvPr>
+        </p:nvSpPr>
+        <p:spPr>
+          <a:xfrm>
+            <a:off x="1524000" y="1825625"/>
+            <a:ext cx="4343400" cy="4270375"/>
+          </a:xfrm>
+        </p:spPr>
+        <p:txBody>
+          <a:bodyPr>
+            <a:normAutofit/>
+          </a:bodyPr>
+          <a:lstStyle>
+            <a:lvl1pPr>
+              <a:defRPr sz="2000"/>
+            </a:lvl1pPr>
+            <a:lvl2pPr>
+              <a:defRPr sz="1800"/>
+            </a:lvl2pPr>
+            <a:lvl3pPr>
+              <a:defRPr sz="1600"/>
+            </a:lvl3pPr>
+            <a:lvl4pPr>
+              <a:defRPr sz="1400"/>
+            </a:lvl4pPr>
+            <a:lvl5pPr>
+              <a:defRPr sz="1400"/>
+            </a:lvl5pPr>
+            <a:lvl6pPr>
+              <a:defRPr sz="1400"/>
+            </a:lvl6pPr>
+            <a:lvl7pPr>
+              <a:defRPr sz="1400"/>
+            </a:lvl7pPr>
+            <a:lvl8pPr>
+              <a:defRPr sz="1400"/>
+            </a:lvl8pPr>
+            <a:lvl9pPr>
+              <a:defRPr sz="1400"/>
+            </a:lvl9pPr>
+          </a:lstStyle>
+          <a:p>
+            <a:pPr lvl="0"/>
+            <a:r>
+              <a:rPr lang="en-US"/>
+              <a:t>Click to edit Master text styles</a:t>
+            </a:r>
+          </a:p>
+          <a:p>
+            <a:pPr lvl="1"/>
+            <a:r>
+              <a:rPr lang="en-US"/>
+              <a:t>Second level</a:t>
+            </a:r>
+          </a:p>
+          <a:p>
+            <a:pPr lvl="2"/>
+            <a:r>
+              <a:rPr lang="en-US"/>
+              <a:t>Third level</a:t>
+            </a:r>
+          </a:p>
+          <a:p>
+            <a:pPr lvl="3"/>
+            <a:r>
+              <a:rPr lang="en-US"/>
+              <a:t>Fourth level</a:t>
+            </a:r>
+          </a:p>
+          <a:p>
+            <a:pPr lvl="4"/>
+            <a:r>
+              <a:rPr lang="en-US"/>
+              <a:t>Fifth level</a:t>
+            </a:r>
+            <a:endParaRPr lang="en-US" dirty="0"/>
+          </a:p>
+        </p:txBody>
+      </p:sp>
+      <p:sp>
+        <p:nvSpPr>
+          <p:cNvPr id="4" name="Content Placeholder 3"/>
+          <p:cNvSpPr>
+            <a:spLocks noGrp="1"/>
+          </p:cNvSpPr>
+          <p:nvPr>
+            <p:ph sz="half" idx="2"/>
+          </p:nvPr>
+        </p:nvSpPr>
+        <p:spPr>
+          <a:xfrm>
+            <a:off x="6324600" y="1825625"/>
+            <a:ext cx="4343400" cy="4270375"/>
+          </a:xfrm>
+        </p:spPr>
+        <p:txBody>
+          <a:bodyPr>
+            <a:normAutofit/>
+          </a:bodyPr>
+          <a:lstStyle>
+            <a:lvl1pPr>
+              <a:defRPr sz="2000"/>
+            </a:lvl1pPr>
+            <a:lvl2pPr>
+              <a:defRPr sz="1800"/>
+            </a:lvl2pPr>
+            <a:lvl3pPr>
+              <a:defRPr sz="1600"/>
+            </a:lvl3pPr>
+            <a:lvl4pPr>
+              <a:defRPr sz="1400"/>
+            </a:lvl4pPr>
+            <a:lvl5pPr>
+              <a:defRPr sz="1400"/>
+            </a:lvl5pPr>
+            <a:lvl6pPr>
+              <a:defRPr sz="1400"/>
+            </a:lvl6pPr>
+            <a:lvl7pPr>
+              <a:defRPr sz="1400"/>
+            </a:lvl7pPr>
+            <a:lvl8pPr>
+              <a:defRPr sz="1400"/>
+            </a:lvl8pPr>
+            <a:lvl9pPr>
+              <a:defRPr sz="1400"/>
+            </a:lvl9pPr>
+          </a:lstStyle>
+          <a:p>
+            <a:pPr lvl="0"/>
+            <a:r>
+              <a:rPr lang="en-US"/>
+              <a:t>Click to edit Master text styles</a:t>
+            </a:r>
+          </a:p>
+          <a:p>
+            <a:pPr lvl="1"/>
+            <a:r>
+              <a:rPr lang="en-US"/>
+              <a:t>Second level</a:t>
+            </a:r>
+          </a:p>
+          <a:p>
+            <a:pPr lvl="2"/>
+            <a:r>
+              <a:rPr lang="en-US"/>
+              <a:t>Third level</a:t>
+            </a:r>
+          </a:p>
+          <a:p>
+            <a:pPr lvl="3"/>
+            <a:r>
+              <a:rPr lang="en-US"/>
+              <a:t>Fourth level</a:t>
+            </a:r>
+          </a:p>
+          <a:p>
+            <a:pPr lvl="4"/>
+            <a:r>
+              <a:rPr lang="en-US"/>
+              <a:t>Fifth level</a:t>
+            </a:r>
+            <a:endParaRPr lang="en-US" dirty="0"/>
+          </a:p>
+        </p:txBody>
+      </p:sp>
+      <p:sp>
+        <p:nvSpPr>
+          <p:cNvPr id="6" name="Footer Placeholder 5"/>
+          <p:cNvSpPr>
+            <a:spLocks noGrp="1"/>
+          </p:cNvSpPr>
+          <p:nvPr>
+            <p:ph type="ftr" sz="quarter" idx="11"/>
+          </p:nvPr>
+        </p:nvSpPr>
+        <p:spPr/>
+        <p:txBody>
+          <a:bodyPr/>
+          <a:lstStyle/>
+          <a:p>
+            <a:endParaRPr lang="en-US"/>
+          </a:p>
+        </p:txBody>
+      </p:sp>
+      <p:sp>
+        <p:nvSpPr>
+          <p:cNvPr id="5" name="Date Placeholder 4"/>
+          <p:cNvSpPr>
+            <a:spLocks noGrp="1"/>
+          </p:cNvSpPr>
+          <p:nvPr>
+            <p:ph type="dt" sz="half" idx="10"/>
+          </p:nvPr>
+        </p:nvSpPr>
+        <p:spPr/>
+        <p:txBody>
+          <a:bodyPr/>
+          <a:lstStyle/>
+          <a:p>
+            <a:fld id="{37CC0096-1860-4642-9CD2-0079EA5E7CD1}" type="datetimeFigureOut">
+              <a:rPr lang="en-US" smtClean="0"/>
+              <a:t>1/5/2021</a:t>
+            </a:fld>
+            <a:endParaRPr lang="en-US"/>
+          </a:p>
+        </p:txBody>
+      </p:sp>
+      <p:sp>
+        <p:nvSpPr>
+          <p:cNvPr id="7" name="Slide Number Placeholder 6"/>
+          <p:cNvSpPr>
+            <a:spLocks noGrp="1"/>
+          </p:cNvSpPr>
+          <p:nvPr>
+            <p:ph type="sldNum" sz="quarter" idx="12"/>
+          </p:nvPr>
+        </p:nvSpPr>
+        <p:spPr/>
+        <p:txBody>
+          <a:bodyPr/>
+          <a:lstStyle/>
+          <a:p>
+            <a:fld id="{E31375A4-56A4-47D6-9801-1991572033F7}" type="slidenum">
+              <a:rPr lang="en-US" smtClean="0"/>
+              <a:t>‹#›</a:t>
+            </a:fld>
+            <a:endParaRPr lang="en-US"/>
+          </a:p>
+        </p:txBody>
+      </p:sp>
+    </p:spTree>
+    <p:extLst>
+      <p:ext uri="{BB962C8B-B14F-4D97-AF65-F5344CB8AC3E}">
+        <p14:creationId xmlns:p14="http://schemas.microsoft.com/office/powerpoint/2010/main" val="2937464362"/>
+      </p:ext>
+    </p:extLst>
+  </p:cSld>
+  <p:clrMapOvr>
+    <a:masterClrMapping/>
+  </p:clrMapOvr>
+</p:sldLayout>
+</file>
+
+<file path=ppt/slideLayouts/slideLayout3.xml><?xml version="1.0" encoding="utf-8"?>
 <p:sldLayout xmlns:a="http://schemas.openxmlformats.org/drawingml/2006/main" xmlns:r="http://schemas.openxmlformats.org/officeDocument/2006/relationships" xmlns:p="http://schemas.openxmlformats.org/presentationml/2006/main" type="title" preserve="1">
   <p:cSld name="Title Slide">
     <p:spTree>
@@ -2711,7 +3374,7 @@
 </p:sldLayout>
 </file>
 
-<file path=ppt/slideLayouts/slideLayout3.xml><?xml version="1.0" encoding="utf-8"?>
+<file path=ppt/slideLayouts/slideLayout4.xml><?xml version="1.0" encoding="utf-8"?>
 <p:sldLayout xmlns:a="http://schemas.openxmlformats.org/drawingml/2006/main" xmlns:r="http://schemas.openxmlformats.org/officeDocument/2006/relationships" xmlns:p="http://schemas.openxmlformats.org/presentationml/2006/main" type="obj" preserve="1">
   <p:cSld name="Title and Content">
     <p:spTree>
@@ -2856,7 +3519,7 @@
           <a:p>
             <a:fld id="{37CC0096-1860-4642-9CD2-0079EA5E7CD1}" type="datetimeFigureOut">
               <a:rPr lang="en-US" smtClean="0"/>
-              <a:t>1/1/2021</a:t>
+              <a:t>1/5/2021</a:t>
             </a:fld>
             <a:endParaRPr lang="en-US"/>
           </a:p>
@@ -2898,7 +3561,7 @@
 </p:sldLayout>
 </file>
 
-<file path=ppt/slideLayouts/slideLayout4.xml><?xml version="1.0" encoding="utf-8"?>
+<file path=ppt/slideLayouts/slideLayout5.xml><?xml version="1.0" encoding="utf-8"?>
 <p:sldLayout xmlns:a="http://schemas.openxmlformats.org/drawingml/2006/main" xmlns:r="http://schemas.openxmlformats.org/officeDocument/2006/relationships" xmlns:p="http://schemas.openxmlformats.org/presentationml/2006/main" type="secHead" preserve="1">
   <p:cSld name="Section Header">
     <p:spTree>
@@ -3040,7 +3703,7 @@
 </p:sldLayout>
 </file>
 
-<file path=ppt/slideLayouts/slideLayout5.xml><?xml version="1.0" encoding="utf-8"?>
+<file path=ppt/slideLayouts/slideLayout6.xml><?xml version="1.0" encoding="utf-8"?>
 <p:sldLayout xmlns:a="http://schemas.openxmlformats.org/drawingml/2006/main" xmlns:r="http://schemas.openxmlformats.org/officeDocument/2006/relationships" xmlns:p="http://schemas.openxmlformats.org/presentationml/2006/main" type="twoObj" preserve="1">
   <p:cSld name="Two Content">
     <p:spTree>
@@ -3289,7 +3952,7 @@
           <a:p>
             <a:fld id="{37CC0096-1860-4642-9CD2-0079EA5E7CD1}" type="datetimeFigureOut">
               <a:rPr lang="en-US" smtClean="0"/>
-              <a:t>1/1/2021</a:t>
+              <a:t>1/5/2021</a:t>
             </a:fld>
             <a:endParaRPr lang="en-US"/>
           </a:p>
@@ -3331,7 +3994,7 @@
 </p:sldLayout>
 </file>
 
-<file path=ppt/slideLayouts/slideLayout6.xml><?xml version="1.0" encoding="utf-8"?>
+<file path=ppt/slideLayouts/slideLayout7.xml><?xml version="1.0" encoding="utf-8"?>
 <p:sldLayout xmlns:a="http://schemas.openxmlformats.org/drawingml/2006/main" xmlns:r="http://schemas.openxmlformats.org/officeDocument/2006/relationships" xmlns:p="http://schemas.openxmlformats.org/presentationml/2006/main" type="twoTxTwoObj" preserve="1">
   <p:cSld name="Comparison">
     <p:spTree>
@@ -3728,7 +4391,7 @@
           <a:p>
             <a:fld id="{37CC0096-1860-4642-9CD2-0079EA5E7CD1}" type="datetimeFigureOut">
               <a:rPr lang="en-US" smtClean="0"/>
-              <a:t>1/1/2021</a:t>
+              <a:t>1/5/2021</a:t>
             </a:fld>
             <a:endParaRPr lang="en-US"/>
           </a:p>
@@ -3770,7 +4433,7 @@
 </p:sldLayout>
 </file>
 
-<file path=ppt/slideLayouts/slideLayout7.xml><?xml version="1.0" encoding="utf-8"?>
+<file path=ppt/slideLayouts/slideLayout8.xml><?xml version="1.0" encoding="utf-8"?>
 <p:sldLayout xmlns:a="http://schemas.openxmlformats.org/drawingml/2006/main" xmlns:r="http://schemas.openxmlformats.org/officeDocument/2006/relationships" xmlns:p="http://schemas.openxmlformats.org/presentationml/2006/main" type="titleOnly" preserve="1">
   <p:cSld name="Title Only">
     <p:spTree>
@@ -3845,7 +4508,7 @@
           <a:p>
             <a:fld id="{37CC0096-1860-4642-9CD2-0079EA5E7CD1}" type="datetimeFigureOut">
               <a:rPr lang="en-US" smtClean="0"/>
-              <a:t>1/1/2021</a:t>
+              <a:t>1/5/2021</a:t>
             </a:fld>
             <a:endParaRPr lang="en-US"/>
           </a:p>
@@ -3887,7 +4550,7 @@
 </p:sldLayout>
 </file>
 
-<file path=ppt/slideLayouts/slideLayout8.xml><?xml version="1.0" encoding="utf-8"?>
+<file path=ppt/slideLayouts/slideLayout9.xml><?xml version="1.0" encoding="utf-8"?>
 <p:sldLayout xmlns:a="http://schemas.openxmlformats.org/drawingml/2006/main" xmlns:r="http://schemas.openxmlformats.org/officeDocument/2006/relationships" xmlns:p="http://schemas.openxmlformats.org/presentationml/2006/main" type="blank" preserve="1">
   <p:cSld name="Blank">
     <p:spTree>
@@ -3940,7 +4603,7 @@
           <a:p>
             <a:fld id="{37CC0096-1860-4642-9CD2-0079EA5E7CD1}" type="datetimeFigureOut">
               <a:rPr lang="en-US" smtClean="0"/>
-              <a:t>1/1/2021</a:t>
+              <a:t>1/5/2021</a:t>
             </a:fld>
             <a:endParaRPr lang="en-US"/>
           </a:p>
@@ -3973,290 +4636,6 @@
     <p:extLst>
       <p:ext uri="{BB962C8B-B14F-4D97-AF65-F5344CB8AC3E}">
         <p14:creationId xmlns:p14="http://schemas.microsoft.com/office/powerpoint/2010/main" val="2146817227"/>
-      </p:ext>
-    </p:extLst>
-  </p:cSld>
-  <p:clrMapOvr>
-    <a:masterClrMapping/>
-  </p:clrMapOvr>
-</p:sldLayout>
-</file>
-
-<file path=ppt/slideLayouts/slideLayout9.xml><?xml version="1.0" encoding="utf-8"?>
-<p:sldLayout xmlns:a="http://schemas.openxmlformats.org/drawingml/2006/main" xmlns:r="http://schemas.openxmlformats.org/officeDocument/2006/relationships" xmlns:p="http://schemas.openxmlformats.org/presentationml/2006/main" preserve="1" userDrawn="1">
-  <p:cSld name="Content with Caption">
-    <p:spTree>
-      <p:nvGrpSpPr>
-        <p:cNvPr id="1" name=""/>
-        <p:cNvGrpSpPr/>
-        <p:nvPr/>
-      </p:nvGrpSpPr>
-      <p:grpSpPr>
-        <a:xfrm>
-          <a:off x="0" y="0"/>
-          <a:ext cx="0" cy="0"/>
-          <a:chOff x="0" y="0"/>
-          <a:chExt cx="0" cy="0"/>
-        </a:xfrm>
-      </p:grpSpPr>
-      <p:sp>
-        <p:nvSpPr>
-          <p:cNvPr id="2" name="Title 1"/>
-          <p:cNvSpPr>
-            <a:spLocks noGrp="1"/>
-          </p:cNvSpPr>
-          <p:nvPr>
-            <p:ph type="title"/>
-          </p:nvPr>
-        </p:nvSpPr>
-        <p:spPr>
-          <a:xfrm>
-            <a:off x="8002587" y="1600200"/>
-            <a:ext cx="3122613" cy="1828800"/>
-          </a:xfrm>
-        </p:spPr>
-        <p:txBody>
-          <a:bodyPr anchor="b">
-            <a:normAutofit/>
-          </a:bodyPr>
-          <a:lstStyle>
-            <a:lvl1pPr>
-              <a:defRPr sz="3400"/>
-            </a:lvl1pPr>
-          </a:lstStyle>
-          <a:p>
-            <a:r>
-              <a:rPr lang="en-US"/>
-              <a:t>Click to edit Master title style</a:t>
-            </a:r>
-            <a:endParaRPr lang="en-US" dirty="0"/>
-          </a:p>
-        </p:txBody>
-      </p:sp>
-      <p:sp>
-        <p:nvSpPr>
-          <p:cNvPr id="3" name="Content Placeholder 2"/>
-          <p:cNvSpPr>
-            <a:spLocks noGrp="1"/>
-          </p:cNvSpPr>
-          <p:nvPr>
-            <p:ph idx="1"/>
-          </p:nvPr>
-        </p:nvSpPr>
-        <p:spPr>
-          <a:xfrm>
-            <a:off x="760412" y="762000"/>
-            <a:ext cx="6400800" cy="5334000"/>
-          </a:xfrm>
-        </p:spPr>
-        <p:txBody>
-          <a:bodyPr>
-            <a:normAutofit/>
-          </a:bodyPr>
-          <a:lstStyle>
-            <a:lvl1pPr>
-              <a:defRPr sz="2000"/>
-            </a:lvl1pPr>
-            <a:lvl2pPr>
-              <a:defRPr sz="1800"/>
-            </a:lvl2pPr>
-            <a:lvl3pPr>
-              <a:defRPr sz="1600"/>
-            </a:lvl3pPr>
-            <a:lvl4pPr>
-              <a:defRPr sz="1400"/>
-            </a:lvl4pPr>
-            <a:lvl5pPr>
-              <a:defRPr sz="1400"/>
-            </a:lvl5pPr>
-            <a:lvl6pPr>
-              <a:defRPr sz="1400"/>
-            </a:lvl6pPr>
-            <a:lvl7pPr>
-              <a:defRPr sz="1400"/>
-            </a:lvl7pPr>
-            <a:lvl8pPr>
-              <a:defRPr sz="1400"/>
-            </a:lvl8pPr>
-            <a:lvl9pPr>
-              <a:defRPr sz="1400"/>
-            </a:lvl9pPr>
-          </a:lstStyle>
-          <a:p>
-            <a:pPr lvl="0"/>
-            <a:r>
-              <a:rPr lang="en-US"/>
-              <a:t>Click to edit Master text styles</a:t>
-            </a:r>
-          </a:p>
-          <a:p>
-            <a:pPr lvl="1"/>
-            <a:r>
-              <a:rPr lang="en-US"/>
-              <a:t>Second level</a:t>
-            </a:r>
-          </a:p>
-          <a:p>
-            <a:pPr lvl="2"/>
-            <a:r>
-              <a:rPr lang="en-US"/>
-              <a:t>Third level</a:t>
-            </a:r>
-          </a:p>
-          <a:p>
-            <a:pPr lvl="3"/>
-            <a:r>
-              <a:rPr lang="en-US"/>
-              <a:t>Fourth level</a:t>
-            </a:r>
-          </a:p>
-          <a:p>
-            <a:pPr lvl="4"/>
-            <a:r>
-              <a:rPr lang="en-US"/>
-              <a:t>Fifth level</a:t>
-            </a:r>
-            <a:endParaRPr lang="en-US" dirty="0"/>
-          </a:p>
-        </p:txBody>
-      </p:sp>
-      <p:sp>
-        <p:nvSpPr>
-          <p:cNvPr id="4" name="Text Placeholder 3"/>
-          <p:cNvSpPr>
-            <a:spLocks noGrp="1"/>
-          </p:cNvSpPr>
-          <p:nvPr>
-            <p:ph type="body" sz="half" idx="2"/>
-          </p:nvPr>
-        </p:nvSpPr>
-        <p:spPr>
-          <a:xfrm>
-            <a:off x="8001039" y="3429000"/>
-            <a:ext cx="3124161" cy="1828800"/>
-          </a:xfrm>
-        </p:spPr>
-        <p:txBody>
-          <a:bodyPr/>
-          <a:lstStyle>
-            <a:lvl1pPr marL="0" indent="0">
-              <a:spcBef>
-                <a:spcPts val="0"/>
-              </a:spcBef>
-              <a:buNone/>
-              <a:defRPr sz="1600"/>
-            </a:lvl1pPr>
-            <a:lvl2pPr marL="457200" indent="0">
-              <a:buNone/>
-              <a:defRPr sz="1400"/>
-            </a:lvl2pPr>
-            <a:lvl3pPr marL="914400" indent="0">
-              <a:buNone/>
-              <a:defRPr sz="1200"/>
-            </a:lvl3pPr>
-            <a:lvl4pPr marL="1371600" indent="0">
-              <a:buNone/>
-              <a:defRPr sz="1000"/>
-            </a:lvl4pPr>
-            <a:lvl5pPr marL="1828800" indent="0">
-              <a:buNone/>
-              <a:defRPr sz="1000"/>
-            </a:lvl5pPr>
-            <a:lvl6pPr marL="2286000" indent="0">
-              <a:buNone/>
-              <a:defRPr sz="1000"/>
-            </a:lvl6pPr>
-            <a:lvl7pPr marL="2743200" indent="0">
-              <a:buNone/>
-              <a:defRPr sz="1000"/>
-            </a:lvl7pPr>
-            <a:lvl8pPr marL="3200400" indent="0">
-              <a:buNone/>
-              <a:defRPr sz="1000"/>
-            </a:lvl8pPr>
-            <a:lvl9pPr marL="3657600" indent="0">
-              <a:buNone/>
-              <a:defRPr sz="1000"/>
-            </a:lvl9pPr>
-          </a:lstStyle>
-          <a:p>
-            <a:pPr lvl="0"/>
-            <a:r>
-              <a:rPr lang="en-US"/>
-              <a:t>Click to edit Master text styles</a:t>
-            </a:r>
-          </a:p>
-        </p:txBody>
-      </p:sp>
-      <p:sp>
-        <p:nvSpPr>
-          <p:cNvPr id="6" name="Footer Placeholder 5"/>
-          <p:cNvSpPr>
-            <a:spLocks noGrp="1"/>
-          </p:cNvSpPr>
-          <p:nvPr>
-            <p:ph type="ftr" sz="quarter" idx="11"/>
-          </p:nvPr>
-        </p:nvSpPr>
-        <p:spPr/>
-        <p:txBody>
-          <a:bodyPr/>
-          <a:lstStyle/>
-          <a:p>
-            <a:endParaRPr lang="en-US"/>
-          </a:p>
-        </p:txBody>
-      </p:sp>
-      <p:sp>
-        <p:nvSpPr>
-          <p:cNvPr id="5" name="Date Placeholder 4"/>
-          <p:cNvSpPr>
-            <a:spLocks noGrp="1"/>
-          </p:cNvSpPr>
-          <p:nvPr>
-            <p:ph type="dt" sz="half" idx="10"/>
-          </p:nvPr>
-        </p:nvSpPr>
-        <p:spPr/>
-        <p:txBody>
-          <a:bodyPr/>
-          <a:lstStyle/>
-          <a:p>
-            <a:fld id="{37CC0096-1860-4642-9CD2-0079EA5E7CD1}" type="datetimeFigureOut">
-              <a:rPr lang="en-US" smtClean="0"/>
-              <a:t>1/1/2021</a:t>
-            </a:fld>
-            <a:endParaRPr lang="en-US"/>
-          </a:p>
-        </p:txBody>
-      </p:sp>
-      <p:sp>
-        <p:nvSpPr>
-          <p:cNvPr id="7" name="Slide Number Placeholder 6"/>
-          <p:cNvSpPr>
-            <a:spLocks noGrp="1"/>
-          </p:cNvSpPr>
-          <p:nvPr>
-            <p:ph type="sldNum" sz="quarter" idx="12"/>
-          </p:nvPr>
-        </p:nvSpPr>
-        <p:spPr/>
-        <p:txBody>
-          <a:bodyPr/>
-          <a:lstStyle/>
-          <a:p>
-            <a:fld id="{E31375A4-56A4-47D6-9801-1991572033F7}" type="slidenum">
-              <a:rPr lang="en-US" smtClean="0"/>
-              <a:t>‹#›</a:t>
-            </a:fld>
-            <a:endParaRPr lang="en-US"/>
-          </a:p>
-        </p:txBody>
-      </p:sp>
-    </p:spTree>
-    <p:extLst>
-      <p:ext uri="{BB962C8B-B14F-4D97-AF65-F5344CB8AC3E}">
-        <p14:creationId xmlns:p14="http://schemas.microsoft.com/office/powerpoint/2010/main" val="1667374130"/>
       </p:ext>
     </p:extLst>
   </p:cSld>
@@ -4436,7 +4815,7 @@
           <a:p>
             <a:fld id="{9420A81C-88FD-4BBC-9AC4-0552DE3F24E8}" type="datetimeFigureOut">
               <a:rPr lang="LID4096" smtClean="0"/>
-              <a:t>01/01/2021</a:t>
+              <a:t>01/05/2021</a:t>
             </a:fld>
             <a:endParaRPr lang="LID4096"/>
           </a:p>
@@ -4542,6 +4921,7 @@
   <p:clrMap bg1="lt1" tx1="dk1" bg2="lt2" tx2="dk2" accent1="accent1" accent2="accent2" accent3="accent3" accent4="accent4" accent5="accent5" accent6="accent6" hlink="hlink" folHlink="folHlink"/>
   <p:sldLayoutIdLst>
     <p:sldLayoutId id="2147483661" r:id="rId1"/>
+    <p:sldLayoutId id="2147483662" r:id="rId2"/>
   </p:sldLayoutIdLst>
   <p:txStyles>
     <p:titleStyle>
@@ -5019,7 +5399,7 @@
             <a:fld id="{37CC0096-1860-4642-9CD2-0079EA5E7CD1}" type="datetimeFigureOut">
               <a:rPr lang="en-US" smtClean="0"/>
               <a:pPr/>
-              <a:t>1/1/2021</a:t>
+              <a:t>1/5/2021</a:t>
             </a:fld>
             <a:endParaRPr lang="en-US"/>
           </a:p>
@@ -5686,6 +6066,878 @@
       </p:grpSpPr>
       <p:sp>
         <p:nvSpPr>
+          <p:cNvPr id="2" name="Title 1">
+            <a:extLst>
+              <a:ext uri="{FF2B5EF4-FFF2-40B4-BE49-F238E27FC236}">
+                <a16:creationId xmlns:a16="http://schemas.microsoft.com/office/drawing/2014/main" id="{3104EB9D-F7F3-474B-A2EE-7C889EBF2F7E}"/>
+              </a:ext>
+            </a:extLst>
+          </p:cNvPr>
+          <p:cNvSpPr>
+            <a:spLocks noGrp="1"/>
+          </p:cNvSpPr>
+          <p:nvPr>
+            <p:ph type="title"/>
+          </p:nvPr>
+        </p:nvSpPr>
+        <p:spPr/>
+        <p:txBody>
+          <a:bodyPr/>
+          <a:lstStyle/>
+          <a:p>
+            <a:r>
+              <a:rPr lang="en-US" dirty="0"/>
+              <a:t>What is </a:t>
+            </a:r>
+            <a:r>
+              <a:rPr lang="en-US" dirty="0" err="1"/>
+              <a:t>BlazQ</a:t>
+            </a:r>
+            <a:r>
+              <a:rPr lang="en-US" dirty="0"/>
+              <a:t>?</a:t>
+            </a:r>
+            <a:endParaRPr lang="LID4096" dirty="0"/>
+          </a:p>
+        </p:txBody>
+      </p:sp>
+      <p:sp>
+        <p:nvSpPr>
+          <p:cNvPr id="6" name="Content Placeholder 5">
+            <a:extLst>
+              <a:ext uri="{FF2B5EF4-FFF2-40B4-BE49-F238E27FC236}">
+                <a16:creationId xmlns:a16="http://schemas.microsoft.com/office/drawing/2014/main" id="{355D04B8-BD9A-4496-8EAF-B71711DC083F}"/>
+              </a:ext>
+            </a:extLst>
+          </p:cNvPr>
+          <p:cNvSpPr>
+            <a:spLocks noGrp="1"/>
+          </p:cNvSpPr>
+          <p:nvPr>
+            <p:ph idx="1"/>
+          </p:nvPr>
+        </p:nvSpPr>
+        <p:spPr/>
+        <p:txBody>
+          <a:bodyPr/>
+          <a:lstStyle/>
+          <a:p>
+            <a:r>
+              <a:rPr lang="en-US" dirty="0"/>
+              <a:t>We will start from scratch (in the next episode)</a:t>
+            </a:r>
+          </a:p>
+          <a:p>
+            <a:pPr lvl="0"/>
+            <a:r>
+              <a:rPr lang="en-US" dirty="0"/>
+              <a:t>I’ve planned 12 episodes so far</a:t>
+            </a:r>
+          </a:p>
+          <a:p>
+            <a:pPr lvl="0"/>
+            <a:r>
+              <a:rPr lang="en-US" dirty="0"/>
+              <a:t>We are working slowly but steady towards understanding basic concepts of software development</a:t>
+            </a:r>
+          </a:p>
+        </p:txBody>
+      </p:sp>
+      <p:grpSp>
+        <p:nvGrpSpPr>
+          <p:cNvPr id="7" name="Group 6">
+            <a:extLst>
+              <a:ext uri="{FF2B5EF4-FFF2-40B4-BE49-F238E27FC236}">
+                <a16:creationId xmlns:a16="http://schemas.microsoft.com/office/drawing/2014/main" id="{F29EBBAE-E619-4376-AE3F-0CB2F2853C9A}"/>
+              </a:ext>
+            </a:extLst>
+          </p:cNvPr>
+          <p:cNvGrpSpPr/>
+          <p:nvPr/>
+        </p:nvGrpSpPr>
+        <p:grpSpPr>
+          <a:xfrm>
+            <a:off x="533400" y="6477000"/>
+            <a:ext cx="11658600" cy="381000"/>
+            <a:chOff x="533400" y="6477000"/>
+            <a:chExt cx="11658600" cy="381000"/>
+          </a:xfrm>
+        </p:grpSpPr>
+        <p:sp>
+          <p:nvSpPr>
+            <p:cNvPr id="8" name="Rectangle 7">
+              <a:extLst>
+                <a:ext uri="{FF2B5EF4-FFF2-40B4-BE49-F238E27FC236}">
+                  <a16:creationId xmlns:a16="http://schemas.microsoft.com/office/drawing/2014/main" id="{537E1CC5-399F-4173-8609-8FECFB13F5D8}"/>
+                </a:ext>
+              </a:extLst>
+            </p:cNvPr>
+            <p:cNvSpPr/>
+            <p:nvPr/>
+          </p:nvSpPr>
+          <p:spPr>
+            <a:xfrm>
+              <a:off x="7086600" y="6477000"/>
+              <a:ext cx="5105400" cy="304800"/>
+            </a:xfrm>
+            <a:prstGeom prst="rect">
+              <a:avLst/>
+            </a:prstGeom>
+            <a:solidFill>
+              <a:schemeClr val="bg1"/>
+            </a:solidFill>
+            <a:ln w="38100">
+              <a:solidFill>
+                <a:schemeClr val="accent4">
+                  <a:lumMod val="75000"/>
+                </a:schemeClr>
+              </a:solidFill>
+            </a:ln>
+          </p:spPr>
+          <p:style>
+            <a:lnRef idx="2">
+              <a:schemeClr val="accent1">
+                <a:shade val="50000"/>
+              </a:schemeClr>
+            </a:lnRef>
+            <a:fillRef idx="1">
+              <a:schemeClr val="accent1"/>
+            </a:fillRef>
+            <a:effectRef idx="0">
+              <a:schemeClr val="accent1"/>
+            </a:effectRef>
+            <a:fontRef idx="minor">
+              <a:schemeClr val="lt1"/>
+            </a:fontRef>
+          </p:style>
+          <p:txBody>
+            <a:bodyPr rtlCol="0" anchor="ctr"/>
+            <a:lstStyle/>
+            <a:p>
+              <a:pPr algn="ctr"/>
+              <a:endParaRPr lang="en-AU"/>
+            </a:p>
+          </p:txBody>
+        </p:sp>
+        <p:sp>
+          <p:nvSpPr>
+            <p:cNvPr id="9" name="Rectangle 8">
+              <a:extLst>
+                <a:ext uri="{FF2B5EF4-FFF2-40B4-BE49-F238E27FC236}">
+                  <a16:creationId xmlns:a16="http://schemas.microsoft.com/office/drawing/2014/main" id="{1CB33AFB-E747-4914-9FDA-082EA5B36943}"/>
+                </a:ext>
+              </a:extLst>
+            </p:cNvPr>
+            <p:cNvSpPr/>
+            <p:nvPr/>
+          </p:nvSpPr>
+          <p:spPr>
+            <a:xfrm>
+              <a:off x="7086600" y="6477000"/>
+              <a:ext cx="1066800" cy="304800"/>
+            </a:xfrm>
+            <a:prstGeom prst="rect">
+              <a:avLst/>
+            </a:prstGeom>
+            <a:solidFill>
+              <a:schemeClr val="accent2"/>
+            </a:solidFill>
+            <a:ln w="38100">
+              <a:noFill/>
+            </a:ln>
+          </p:spPr>
+          <p:style>
+            <a:lnRef idx="2">
+              <a:schemeClr val="accent1">
+                <a:shade val="50000"/>
+              </a:schemeClr>
+            </a:lnRef>
+            <a:fillRef idx="1">
+              <a:schemeClr val="accent1"/>
+            </a:fillRef>
+            <a:effectRef idx="0">
+              <a:schemeClr val="accent1"/>
+            </a:effectRef>
+            <a:fontRef idx="minor">
+              <a:schemeClr val="lt1"/>
+            </a:fontRef>
+          </p:style>
+          <p:txBody>
+            <a:bodyPr rtlCol="0" anchor="ctr"/>
+            <a:lstStyle/>
+            <a:p>
+              <a:pPr algn="ctr"/>
+              <a:endParaRPr lang="en-AU" dirty="0"/>
+            </a:p>
+          </p:txBody>
+        </p:sp>
+        <p:sp>
+          <p:nvSpPr>
+            <p:cNvPr id="10" name="TextBox 9">
+              <a:extLst>
+                <a:ext uri="{FF2B5EF4-FFF2-40B4-BE49-F238E27FC236}">
+                  <a16:creationId xmlns:a16="http://schemas.microsoft.com/office/drawing/2014/main" id="{D1CE94DE-70DE-4B2D-83C5-0FBE55C4174D}"/>
+                </a:ext>
+              </a:extLst>
+            </p:cNvPr>
+            <p:cNvSpPr txBox="1"/>
+            <p:nvPr/>
+          </p:nvSpPr>
+          <p:spPr>
+            <a:xfrm>
+              <a:off x="533400" y="6488668"/>
+              <a:ext cx="3962400" cy="369332"/>
+            </a:xfrm>
+            <a:prstGeom prst="rect">
+              <a:avLst/>
+            </a:prstGeom>
+            <a:noFill/>
+          </p:spPr>
+          <p:txBody>
+            <a:bodyPr wrap="square" rtlCol="0">
+              <a:spAutoFit/>
+            </a:bodyPr>
+            <a:lstStyle/>
+            <a:p>
+              <a:r>
+                <a:rPr lang="en-US" b="1" dirty="0">
+                  <a:solidFill>
+                    <a:schemeClr val="bg1"/>
+                  </a:solidFill>
+                  <a:latin typeface="Consolas (Headings)"/>
+                </a:rPr>
+                <a:t>Part I: Introduction</a:t>
+              </a:r>
+              <a:endParaRPr lang="en-AU" b="1" dirty="0">
+                <a:solidFill>
+                  <a:schemeClr val="bg1"/>
+                </a:solidFill>
+                <a:latin typeface="Consolas (Headings)"/>
+              </a:endParaRPr>
+            </a:p>
+          </p:txBody>
+        </p:sp>
+      </p:grpSp>
+    </p:spTree>
+    <p:extLst>
+      <p:ext uri="{BB962C8B-B14F-4D97-AF65-F5344CB8AC3E}">
+        <p14:creationId xmlns:p14="http://schemas.microsoft.com/office/powerpoint/2010/main" val="648298854"/>
+      </p:ext>
+    </p:extLst>
+  </p:cSld>
+  <p:clrMapOvr>
+    <a:masterClrMapping/>
+  </p:clrMapOvr>
+</p:sld>
+</file>
+
+<file path=ppt/slides/slide11.xml><?xml version="1.0" encoding="utf-8"?>
+<p:sld xmlns:a="http://schemas.openxmlformats.org/drawingml/2006/main" xmlns:r="http://schemas.openxmlformats.org/officeDocument/2006/relationships" xmlns:p="http://schemas.openxmlformats.org/presentationml/2006/main">
+  <p:cSld>
+    <p:spTree>
+      <p:nvGrpSpPr>
+        <p:cNvPr id="1" name=""/>
+        <p:cNvGrpSpPr/>
+        <p:nvPr/>
+      </p:nvGrpSpPr>
+      <p:grpSpPr>
+        <a:xfrm>
+          <a:off x="0" y="0"/>
+          <a:ext cx="0" cy="0"/>
+          <a:chOff x="0" y="0"/>
+          <a:chExt cx="0" cy="0"/>
+        </a:xfrm>
+      </p:grpSpPr>
+      <p:sp>
+        <p:nvSpPr>
+          <p:cNvPr id="2" name="Title 1">
+            <a:extLst>
+              <a:ext uri="{FF2B5EF4-FFF2-40B4-BE49-F238E27FC236}">
+                <a16:creationId xmlns:a16="http://schemas.microsoft.com/office/drawing/2014/main" id="{3104EB9D-F7F3-474B-A2EE-7C889EBF2F7E}"/>
+              </a:ext>
+            </a:extLst>
+          </p:cNvPr>
+          <p:cNvSpPr>
+            <a:spLocks noGrp="1"/>
+          </p:cNvSpPr>
+          <p:nvPr>
+            <p:ph type="title"/>
+          </p:nvPr>
+        </p:nvSpPr>
+        <p:spPr/>
+        <p:txBody>
+          <a:bodyPr/>
+          <a:lstStyle/>
+          <a:p>
+            <a:r>
+              <a:rPr lang="en-US"/>
+              <a:t>What techniques will be covered</a:t>
+            </a:r>
+            <a:endParaRPr lang="LID4096" dirty="0"/>
+          </a:p>
+        </p:txBody>
+      </p:sp>
+      <p:sp>
+        <p:nvSpPr>
+          <p:cNvPr id="6" name="Content Placeholder 5">
+            <a:extLst>
+              <a:ext uri="{FF2B5EF4-FFF2-40B4-BE49-F238E27FC236}">
+                <a16:creationId xmlns:a16="http://schemas.microsoft.com/office/drawing/2014/main" id="{355D04B8-BD9A-4496-8EAF-B71711DC083F}"/>
+              </a:ext>
+            </a:extLst>
+          </p:cNvPr>
+          <p:cNvSpPr>
+            <a:spLocks noGrp="1"/>
+          </p:cNvSpPr>
+          <p:nvPr>
+            <p:ph idx="1"/>
+          </p:nvPr>
+        </p:nvSpPr>
+        <p:spPr/>
+        <p:txBody>
+          <a:bodyPr/>
+          <a:lstStyle/>
+          <a:p>
+            <a:r>
+              <a:rPr lang="en-US" dirty="0"/>
+              <a:t>Web development (HTML and CSS)</a:t>
+            </a:r>
+          </a:p>
+          <a:p>
+            <a:r>
+              <a:rPr lang="en-US" dirty="0"/>
+              <a:t>C# and Object orientated programming (OOP)</a:t>
+            </a:r>
+          </a:p>
+          <a:p>
+            <a:r>
+              <a:rPr lang="en-US" dirty="0"/>
+              <a:t>Client Server und HTTP REST API</a:t>
+            </a:r>
+          </a:p>
+          <a:p>
+            <a:r>
+              <a:rPr lang="en-US" dirty="0"/>
+              <a:t>Persistent Data (Database, Storage)</a:t>
+            </a:r>
+          </a:p>
+          <a:p>
+            <a:r>
+              <a:rPr lang="en-US" dirty="0"/>
+              <a:t>Bidirectional Communication (WebSocket)</a:t>
+            </a:r>
+          </a:p>
+          <a:p>
+            <a:endParaRPr lang="en-US" dirty="0"/>
+          </a:p>
+          <a:p>
+            <a:endParaRPr lang="en-US" dirty="0"/>
+          </a:p>
+        </p:txBody>
+      </p:sp>
+      <p:grpSp>
+        <p:nvGrpSpPr>
+          <p:cNvPr id="4" name="Group 3">
+            <a:extLst>
+              <a:ext uri="{FF2B5EF4-FFF2-40B4-BE49-F238E27FC236}">
+                <a16:creationId xmlns:a16="http://schemas.microsoft.com/office/drawing/2014/main" id="{2C95804A-66EF-43C6-AC7A-6F8AD99F2F31}"/>
+              </a:ext>
+            </a:extLst>
+          </p:cNvPr>
+          <p:cNvGrpSpPr/>
+          <p:nvPr/>
+        </p:nvGrpSpPr>
+        <p:grpSpPr>
+          <a:xfrm>
+            <a:off x="533400" y="6477000"/>
+            <a:ext cx="11658600" cy="381000"/>
+            <a:chOff x="533400" y="6477000"/>
+            <a:chExt cx="11658600" cy="381000"/>
+          </a:xfrm>
+        </p:grpSpPr>
+        <p:sp>
+          <p:nvSpPr>
+            <p:cNvPr id="5" name="Rectangle 4">
+              <a:extLst>
+                <a:ext uri="{FF2B5EF4-FFF2-40B4-BE49-F238E27FC236}">
+                  <a16:creationId xmlns:a16="http://schemas.microsoft.com/office/drawing/2014/main" id="{3B825CF2-516A-4218-AACC-36F8679715B2}"/>
+                </a:ext>
+              </a:extLst>
+            </p:cNvPr>
+            <p:cNvSpPr/>
+            <p:nvPr/>
+          </p:nvSpPr>
+          <p:spPr>
+            <a:xfrm>
+              <a:off x="7086600" y="6477000"/>
+              <a:ext cx="5105400" cy="304800"/>
+            </a:xfrm>
+            <a:prstGeom prst="rect">
+              <a:avLst/>
+            </a:prstGeom>
+            <a:solidFill>
+              <a:schemeClr val="bg1"/>
+            </a:solidFill>
+            <a:ln w="38100">
+              <a:solidFill>
+                <a:schemeClr val="accent4">
+                  <a:lumMod val="75000"/>
+                </a:schemeClr>
+              </a:solidFill>
+            </a:ln>
+          </p:spPr>
+          <p:style>
+            <a:lnRef idx="2">
+              <a:schemeClr val="accent1">
+                <a:shade val="50000"/>
+              </a:schemeClr>
+            </a:lnRef>
+            <a:fillRef idx="1">
+              <a:schemeClr val="accent1"/>
+            </a:fillRef>
+            <a:effectRef idx="0">
+              <a:schemeClr val="accent1"/>
+            </a:effectRef>
+            <a:fontRef idx="minor">
+              <a:schemeClr val="lt1"/>
+            </a:fontRef>
+          </p:style>
+          <p:txBody>
+            <a:bodyPr rtlCol="0" anchor="ctr"/>
+            <a:lstStyle/>
+            <a:p>
+              <a:pPr algn="ctr"/>
+              <a:endParaRPr lang="en-AU"/>
+            </a:p>
+          </p:txBody>
+        </p:sp>
+        <p:sp>
+          <p:nvSpPr>
+            <p:cNvPr id="7" name="Rectangle 6">
+              <a:extLst>
+                <a:ext uri="{FF2B5EF4-FFF2-40B4-BE49-F238E27FC236}">
+                  <a16:creationId xmlns:a16="http://schemas.microsoft.com/office/drawing/2014/main" id="{295AE36D-3D55-4FA3-988D-A8095A08980B}"/>
+                </a:ext>
+              </a:extLst>
+            </p:cNvPr>
+            <p:cNvSpPr/>
+            <p:nvPr/>
+          </p:nvSpPr>
+          <p:spPr>
+            <a:xfrm>
+              <a:off x="7086600" y="6477000"/>
+              <a:ext cx="1066800" cy="304800"/>
+            </a:xfrm>
+            <a:prstGeom prst="rect">
+              <a:avLst/>
+            </a:prstGeom>
+            <a:solidFill>
+              <a:schemeClr val="accent2"/>
+            </a:solidFill>
+            <a:ln w="38100">
+              <a:noFill/>
+            </a:ln>
+          </p:spPr>
+          <p:style>
+            <a:lnRef idx="2">
+              <a:schemeClr val="accent1">
+                <a:shade val="50000"/>
+              </a:schemeClr>
+            </a:lnRef>
+            <a:fillRef idx="1">
+              <a:schemeClr val="accent1"/>
+            </a:fillRef>
+            <a:effectRef idx="0">
+              <a:schemeClr val="accent1"/>
+            </a:effectRef>
+            <a:fontRef idx="minor">
+              <a:schemeClr val="lt1"/>
+            </a:fontRef>
+          </p:style>
+          <p:txBody>
+            <a:bodyPr rtlCol="0" anchor="ctr"/>
+            <a:lstStyle/>
+            <a:p>
+              <a:pPr algn="ctr"/>
+              <a:endParaRPr lang="en-AU" dirty="0"/>
+            </a:p>
+          </p:txBody>
+        </p:sp>
+        <p:sp>
+          <p:nvSpPr>
+            <p:cNvPr id="8" name="TextBox 7">
+              <a:extLst>
+                <a:ext uri="{FF2B5EF4-FFF2-40B4-BE49-F238E27FC236}">
+                  <a16:creationId xmlns:a16="http://schemas.microsoft.com/office/drawing/2014/main" id="{1E23DD71-F4D8-4A94-8403-0B1BA0A17347}"/>
+                </a:ext>
+              </a:extLst>
+            </p:cNvPr>
+            <p:cNvSpPr txBox="1"/>
+            <p:nvPr/>
+          </p:nvSpPr>
+          <p:spPr>
+            <a:xfrm>
+              <a:off x="533400" y="6488668"/>
+              <a:ext cx="3962400" cy="369332"/>
+            </a:xfrm>
+            <a:prstGeom prst="rect">
+              <a:avLst/>
+            </a:prstGeom>
+            <a:noFill/>
+          </p:spPr>
+          <p:txBody>
+            <a:bodyPr wrap="square" rtlCol="0">
+              <a:spAutoFit/>
+            </a:bodyPr>
+            <a:lstStyle/>
+            <a:p>
+              <a:r>
+                <a:rPr lang="en-US" b="1" dirty="0">
+                  <a:solidFill>
+                    <a:schemeClr val="bg1"/>
+                  </a:solidFill>
+                  <a:latin typeface="Consolas (Headings)"/>
+                </a:rPr>
+                <a:t>Part I: Introduction</a:t>
+              </a:r>
+              <a:endParaRPr lang="en-AU" b="1" dirty="0">
+                <a:solidFill>
+                  <a:schemeClr val="bg1"/>
+                </a:solidFill>
+                <a:latin typeface="Consolas (Headings)"/>
+              </a:endParaRPr>
+            </a:p>
+          </p:txBody>
+        </p:sp>
+      </p:grpSp>
+    </p:spTree>
+    <p:extLst>
+      <p:ext uri="{BB962C8B-B14F-4D97-AF65-F5344CB8AC3E}">
+        <p14:creationId xmlns:p14="http://schemas.microsoft.com/office/powerpoint/2010/main" val="449843538"/>
+      </p:ext>
+    </p:extLst>
+  </p:cSld>
+  <p:clrMapOvr>
+    <a:masterClrMapping/>
+  </p:clrMapOvr>
+</p:sld>
+</file>
+
+<file path=ppt/slides/slide12.xml><?xml version="1.0" encoding="utf-8"?>
+<p:sld xmlns:a="http://schemas.openxmlformats.org/drawingml/2006/main" xmlns:r="http://schemas.openxmlformats.org/officeDocument/2006/relationships" xmlns:p="http://schemas.openxmlformats.org/presentationml/2006/main">
+  <p:cSld>
+    <p:spTree>
+      <p:nvGrpSpPr>
+        <p:cNvPr id="1" name=""/>
+        <p:cNvGrpSpPr/>
+        <p:nvPr/>
+      </p:nvGrpSpPr>
+      <p:grpSpPr>
+        <a:xfrm>
+          <a:off x="0" y="0"/>
+          <a:ext cx="0" cy="0"/>
+          <a:chOff x="0" y="0"/>
+          <a:chExt cx="0" cy="0"/>
+        </a:xfrm>
+      </p:grpSpPr>
+      <p:sp>
+        <p:nvSpPr>
+          <p:cNvPr id="2" name="Title 1">
+            <a:extLst>
+              <a:ext uri="{FF2B5EF4-FFF2-40B4-BE49-F238E27FC236}">
+                <a16:creationId xmlns:a16="http://schemas.microsoft.com/office/drawing/2014/main" id="{F0D94D76-CE3E-4D52-8197-5A3636FF1A91}"/>
+              </a:ext>
+            </a:extLst>
+          </p:cNvPr>
+          <p:cNvSpPr>
+            <a:spLocks noGrp="1"/>
+          </p:cNvSpPr>
+          <p:nvPr>
+            <p:ph type="title"/>
+          </p:nvPr>
+        </p:nvSpPr>
+        <p:spPr/>
+        <p:txBody>
+          <a:bodyPr/>
+          <a:lstStyle/>
+          <a:p>
+            <a:r>
+              <a:rPr lang="en-US" dirty="0"/>
+              <a:t>Learning Values</a:t>
+            </a:r>
+            <a:endParaRPr lang="LID4096" dirty="0"/>
+          </a:p>
+        </p:txBody>
+      </p:sp>
+      <p:sp>
+        <p:nvSpPr>
+          <p:cNvPr id="5" name="Content Placeholder 4">
+            <a:extLst>
+              <a:ext uri="{FF2B5EF4-FFF2-40B4-BE49-F238E27FC236}">
+                <a16:creationId xmlns:a16="http://schemas.microsoft.com/office/drawing/2014/main" id="{A8B50088-2274-4894-BF55-60209497C6F1}"/>
+              </a:ext>
+            </a:extLst>
+          </p:cNvPr>
+          <p:cNvSpPr>
+            <a:spLocks noGrp="1"/>
+          </p:cNvSpPr>
+          <p:nvPr>
+            <p:ph idx="1"/>
+          </p:nvPr>
+        </p:nvSpPr>
+        <p:spPr/>
+        <p:txBody>
+          <a:bodyPr/>
+          <a:lstStyle/>
+          <a:p>
+            <a:pPr marL="742950" lvl="0" indent="-742950">
+              <a:buFont typeface="+mj-lt"/>
+              <a:buAutoNum type="arabicPeriod"/>
+            </a:pPr>
+            <a:r>
+              <a:rPr lang="en-US" dirty="0"/>
+              <a:t>There are no dump questions</a:t>
+            </a:r>
+          </a:p>
+          <a:p>
+            <a:pPr marL="742950" lvl="0" indent="-742950">
+              <a:buFont typeface="+mj-lt"/>
+              <a:buAutoNum type="arabicPeriod"/>
+            </a:pPr>
+            <a:r>
+              <a:rPr lang="en-US" dirty="0"/>
+              <a:t>I’m not free of error</a:t>
+            </a:r>
+          </a:p>
+          <a:p>
+            <a:pPr marL="742950" lvl="0" indent="-742950">
+              <a:buFont typeface="+mj-lt"/>
+              <a:buAutoNum type="arabicPeriod"/>
+            </a:pPr>
+            <a:r>
+              <a:rPr lang="en-US" dirty="0"/>
+              <a:t>It’s about learning</a:t>
+            </a:r>
+          </a:p>
+          <a:p>
+            <a:pPr marL="742950" lvl="0" indent="-742950">
+              <a:buFont typeface="+mj-lt"/>
+              <a:buAutoNum type="arabicPeriod"/>
+            </a:pPr>
+            <a:r>
+              <a:rPr lang="en-US" dirty="0"/>
+              <a:t>Respect</a:t>
+            </a:r>
+          </a:p>
+        </p:txBody>
+      </p:sp>
+      <p:grpSp>
+        <p:nvGrpSpPr>
+          <p:cNvPr id="6" name="Group 5">
+            <a:extLst>
+              <a:ext uri="{FF2B5EF4-FFF2-40B4-BE49-F238E27FC236}">
+                <a16:creationId xmlns:a16="http://schemas.microsoft.com/office/drawing/2014/main" id="{81F12EA8-DBA6-4590-9588-A10371A5C479}"/>
+              </a:ext>
+            </a:extLst>
+          </p:cNvPr>
+          <p:cNvGrpSpPr/>
+          <p:nvPr/>
+        </p:nvGrpSpPr>
+        <p:grpSpPr>
+          <a:xfrm>
+            <a:off x="533400" y="6477000"/>
+            <a:ext cx="11658600" cy="381000"/>
+            <a:chOff x="533400" y="6477000"/>
+            <a:chExt cx="11658600" cy="381000"/>
+          </a:xfrm>
+        </p:grpSpPr>
+        <p:sp>
+          <p:nvSpPr>
+            <p:cNvPr id="7" name="Rectangle 6">
+              <a:extLst>
+                <a:ext uri="{FF2B5EF4-FFF2-40B4-BE49-F238E27FC236}">
+                  <a16:creationId xmlns:a16="http://schemas.microsoft.com/office/drawing/2014/main" id="{797F8AFF-7575-4FC4-B4B3-85987C25D5CF}"/>
+                </a:ext>
+              </a:extLst>
+            </p:cNvPr>
+            <p:cNvSpPr/>
+            <p:nvPr/>
+          </p:nvSpPr>
+          <p:spPr>
+            <a:xfrm>
+              <a:off x="7086600" y="6477000"/>
+              <a:ext cx="5105400" cy="304800"/>
+            </a:xfrm>
+            <a:prstGeom prst="rect">
+              <a:avLst/>
+            </a:prstGeom>
+            <a:solidFill>
+              <a:schemeClr val="bg1"/>
+            </a:solidFill>
+            <a:ln w="38100">
+              <a:solidFill>
+                <a:schemeClr val="accent4">
+                  <a:lumMod val="75000"/>
+                </a:schemeClr>
+              </a:solidFill>
+            </a:ln>
+          </p:spPr>
+          <p:style>
+            <a:lnRef idx="2">
+              <a:schemeClr val="accent1">
+                <a:shade val="50000"/>
+              </a:schemeClr>
+            </a:lnRef>
+            <a:fillRef idx="1">
+              <a:schemeClr val="accent1"/>
+            </a:fillRef>
+            <a:effectRef idx="0">
+              <a:schemeClr val="accent1"/>
+            </a:effectRef>
+            <a:fontRef idx="minor">
+              <a:schemeClr val="lt1"/>
+            </a:fontRef>
+          </p:style>
+          <p:txBody>
+            <a:bodyPr rtlCol="0" anchor="ctr"/>
+            <a:lstStyle/>
+            <a:p>
+              <a:pPr algn="ctr"/>
+              <a:endParaRPr lang="en-AU"/>
+            </a:p>
+          </p:txBody>
+        </p:sp>
+        <p:sp>
+          <p:nvSpPr>
+            <p:cNvPr id="8" name="Rectangle 7">
+              <a:extLst>
+                <a:ext uri="{FF2B5EF4-FFF2-40B4-BE49-F238E27FC236}">
+                  <a16:creationId xmlns:a16="http://schemas.microsoft.com/office/drawing/2014/main" id="{8432FCE7-DEFB-4002-880C-93EE1E97EDE2}"/>
+                </a:ext>
+              </a:extLst>
+            </p:cNvPr>
+            <p:cNvSpPr/>
+            <p:nvPr/>
+          </p:nvSpPr>
+          <p:spPr>
+            <a:xfrm>
+              <a:off x="7086600" y="6477000"/>
+              <a:ext cx="1066800" cy="304800"/>
+            </a:xfrm>
+            <a:prstGeom prst="rect">
+              <a:avLst/>
+            </a:prstGeom>
+            <a:solidFill>
+              <a:schemeClr val="accent2"/>
+            </a:solidFill>
+            <a:ln w="38100">
+              <a:noFill/>
+            </a:ln>
+          </p:spPr>
+          <p:style>
+            <a:lnRef idx="2">
+              <a:schemeClr val="accent1">
+                <a:shade val="50000"/>
+              </a:schemeClr>
+            </a:lnRef>
+            <a:fillRef idx="1">
+              <a:schemeClr val="accent1"/>
+            </a:fillRef>
+            <a:effectRef idx="0">
+              <a:schemeClr val="accent1"/>
+            </a:effectRef>
+            <a:fontRef idx="minor">
+              <a:schemeClr val="lt1"/>
+            </a:fontRef>
+          </p:style>
+          <p:txBody>
+            <a:bodyPr rtlCol="0" anchor="ctr"/>
+            <a:lstStyle/>
+            <a:p>
+              <a:pPr algn="ctr"/>
+              <a:endParaRPr lang="en-AU" dirty="0"/>
+            </a:p>
+          </p:txBody>
+        </p:sp>
+        <p:sp>
+          <p:nvSpPr>
+            <p:cNvPr id="9" name="TextBox 8">
+              <a:extLst>
+                <a:ext uri="{FF2B5EF4-FFF2-40B4-BE49-F238E27FC236}">
+                  <a16:creationId xmlns:a16="http://schemas.microsoft.com/office/drawing/2014/main" id="{80DAC672-0B00-4C8B-AD10-28FDA62511F3}"/>
+                </a:ext>
+              </a:extLst>
+            </p:cNvPr>
+            <p:cNvSpPr txBox="1"/>
+            <p:nvPr/>
+          </p:nvSpPr>
+          <p:spPr>
+            <a:xfrm>
+              <a:off x="533400" y="6488668"/>
+              <a:ext cx="3962400" cy="369332"/>
+            </a:xfrm>
+            <a:prstGeom prst="rect">
+              <a:avLst/>
+            </a:prstGeom>
+            <a:noFill/>
+          </p:spPr>
+          <p:txBody>
+            <a:bodyPr wrap="square" rtlCol="0">
+              <a:spAutoFit/>
+            </a:bodyPr>
+            <a:lstStyle/>
+            <a:p>
+              <a:r>
+                <a:rPr lang="en-US" b="1" dirty="0">
+                  <a:solidFill>
+                    <a:schemeClr val="bg1"/>
+                  </a:solidFill>
+                  <a:latin typeface="Consolas (Headings)"/>
+                </a:rPr>
+                <a:t>Part I: Introduction</a:t>
+              </a:r>
+              <a:endParaRPr lang="en-AU" b="1" dirty="0">
+                <a:solidFill>
+                  <a:schemeClr val="bg1"/>
+                </a:solidFill>
+                <a:latin typeface="Consolas (Headings)"/>
+              </a:endParaRPr>
+            </a:p>
+          </p:txBody>
+        </p:sp>
+      </p:grpSp>
+    </p:spTree>
+    <p:extLst>
+      <p:ext uri="{BB962C8B-B14F-4D97-AF65-F5344CB8AC3E}">
+        <p14:creationId xmlns:p14="http://schemas.microsoft.com/office/powerpoint/2010/main" val="3298022619"/>
+      </p:ext>
+    </p:extLst>
+  </p:cSld>
+  <p:clrMapOvr>
+    <a:masterClrMapping/>
+  </p:clrMapOvr>
+</p:sld>
+</file>
+
+<file path=ppt/slides/slide13.xml><?xml version="1.0" encoding="utf-8"?>
+<p:sld xmlns:a="http://schemas.openxmlformats.org/drawingml/2006/main" xmlns:r="http://schemas.openxmlformats.org/officeDocument/2006/relationships" xmlns:p="http://schemas.openxmlformats.org/presentationml/2006/main">
+  <p:cSld>
+    <p:spTree>
+      <p:nvGrpSpPr>
+        <p:cNvPr id="1" name=""/>
+        <p:cNvGrpSpPr/>
+        <p:nvPr/>
+      </p:nvGrpSpPr>
+      <p:grpSpPr>
+        <a:xfrm>
+          <a:off x="0" y="0"/>
+          <a:ext cx="0" cy="0"/>
+          <a:chOff x="0" y="0"/>
+          <a:chExt cx="0" cy="0"/>
+        </a:xfrm>
+      </p:grpSpPr>
+      <p:sp>
+        <p:nvSpPr>
           <p:cNvPr id="13" name="Title 12"/>
           <p:cNvSpPr>
             <a:spLocks noGrp="1"/>
@@ -5706,7 +6958,7 @@
           <a:p>
             <a:r>
               <a:rPr lang="en-US" b="1" dirty="0"/>
-              <a:t>Learning Mode - GitHub</a:t>
+              <a:t>Learning Mode</a:t>
             </a:r>
           </a:p>
         </p:txBody>
@@ -5736,6 +6988,275 @@
             <a:pPr lvl="0"/>
             <a:r>
               <a:rPr lang="en-US" dirty="0"/>
+              <a:t>I strongly recommend to focus on understanding during listening</a:t>
+            </a:r>
+          </a:p>
+          <a:p>
+            <a:pPr lvl="0"/>
+            <a:r>
+              <a:rPr lang="en-US" dirty="0"/>
+              <a:t>Practice by yourself a time convenient for you</a:t>
+            </a:r>
+          </a:p>
+        </p:txBody>
+      </p:sp>
+      <p:grpSp>
+        <p:nvGrpSpPr>
+          <p:cNvPr id="9" name="Group 8">
+            <a:extLst>
+              <a:ext uri="{FF2B5EF4-FFF2-40B4-BE49-F238E27FC236}">
+                <a16:creationId xmlns:a16="http://schemas.microsoft.com/office/drawing/2014/main" id="{710A6B04-29E5-4DE4-A581-1F25FDC346CE}"/>
+              </a:ext>
+            </a:extLst>
+          </p:cNvPr>
+          <p:cNvGrpSpPr/>
+          <p:nvPr/>
+        </p:nvGrpSpPr>
+        <p:grpSpPr>
+          <a:xfrm>
+            <a:off x="533400" y="6477000"/>
+            <a:ext cx="11658600" cy="381000"/>
+            <a:chOff x="533400" y="6477000"/>
+            <a:chExt cx="11658600" cy="381000"/>
+          </a:xfrm>
+        </p:grpSpPr>
+        <p:sp>
+          <p:nvSpPr>
+            <p:cNvPr id="10" name="Rectangle 9">
+              <a:extLst>
+                <a:ext uri="{FF2B5EF4-FFF2-40B4-BE49-F238E27FC236}">
+                  <a16:creationId xmlns:a16="http://schemas.microsoft.com/office/drawing/2014/main" id="{3BE32A7E-60D9-4728-B73C-652AA397DE41}"/>
+                </a:ext>
+              </a:extLst>
+            </p:cNvPr>
+            <p:cNvSpPr/>
+            <p:nvPr/>
+          </p:nvSpPr>
+          <p:spPr>
+            <a:xfrm>
+              <a:off x="7086600" y="6477000"/>
+              <a:ext cx="5105400" cy="304800"/>
+            </a:xfrm>
+            <a:prstGeom prst="rect">
+              <a:avLst/>
+            </a:prstGeom>
+            <a:solidFill>
+              <a:schemeClr val="bg1"/>
+            </a:solidFill>
+            <a:ln w="38100">
+              <a:solidFill>
+                <a:schemeClr val="accent4">
+                  <a:lumMod val="75000"/>
+                </a:schemeClr>
+              </a:solidFill>
+            </a:ln>
+          </p:spPr>
+          <p:style>
+            <a:lnRef idx="2">
+              <a:schemeClr val="accent1">
+                <a:shade val="50000"/>
+              </a:schemeClr>
+            </a:lnRef>
+            <a:fillRef idx="1">
+              <a:schemeClr val="accent1"/>
+            </a:fillRef>
+            <a:effectRef idx="0">
+              <a:schemeClr val="accent1"/>
+            </a:effectRef>
+            <a:fontRef idx="minor">
+              <a:schemeClr val="lt1"/>
+            </a:fontRef>
+          </p:style>
+          <p:txBody>
+            <a:bodyPr rtlCol="0" anchor="ctr"/>
+            <a:lstStyle/>
+            <a:p>
+              <a:pPr algn="ctr"/>
+              <a:endParaRPr lang="en-AU"/>
+            </a:p>
+          </p:txBody>
+        </p:sp>
+        <p:sp>
+          <p:nvSpPr>
+            <p:cNvPr id="11" name="Rectangle 10">
+              <a:extLst>
+                <a:ext uri="{FF2B5EF4-FFF2-40B4-BE49-F238E27FC236}">
+                  <a16:creationId xmlns:a16="http://schemas.microsoft.com/office/drawing/2014/main" id="{B9AF97B4-5DB7-4C7D-9DDD-CD7A545676AE}"/>
+                </a:ext>
+              </a:extLst>
+            </p:cNvPr>
+            <p:cNvSpPr/>
+            <p:nvPr/>
+          </p:nvSpPr>
+          <p:spPr>
+            <a:xfrm>
+              <a:off x="7086600" y="6477000"/>
+              <a:ext cx="1066800" cy="304800"/>
+            </a:xfrm>
+            <a:prstGeom prst="rect">
+              <a:avLst/>
+            </a:prstGeom>
+            <a:solidFill>
+              <a:schemeClr val="accent2"/>
+            </a:solidFill>
+            <a:ln w="38100">
+              <a:noFill/>
+            </a:ln>
+          </p:spPr>
+          <p:style>
+            <a:lnRef idx="2">
+              <a:schemeClr val="accent1">
+                <a:shade val="50000"/>
+              </a:schemeClr>
+            </a:lnRef>
+            <a:fillRef idx="1">
+              <a:schemeClr val="accent1"/>
+            </a:fillRef>
+            <a:effectRef idx="0">
+              <a:schemeClr val="accent1"/>
+            </a:effectRef>
+            <a:fontRef idx="minor">
+              <a:schemeClr val="lt1"/>
+            </a:fontRef>
+          </p:style>
+          <p:txBody>
+            <a:bodyPr rtlCol="0" anchor="ctr"/>
+            <a:lstStyle/>
+            <a:p>
+              <a:pPr algn="ctr"/>
+              <a:endParaRPr lang="en-AU" dirty="0"/>
+            </a:p>
+          </p:txBody>
+        </p:sp>
+        <p:sp>
+          <p:nvSpPr>
+            <p:cNvPr id="12" name="TextBox 11">
+              <a:extLst>
+                <a:ext uri="{FF2B5EF4-FFF2-40B4-BE49-F238E27FC236}">
+                  <a16:creationId xmlns:a16="http://schemas.microsoft.com/office/drawing/2014/main" id="{79E7F918-127A-4907-A220-B9A02895E607}"/>
+                </a:ext>
+              </a:extLst>
+            </p:cNvPr>
+            <p:cNvSpPr txBox="1"/>
+            <p:nvPr/>
+          </p:nvSpPr>
+          <p:spPr>
+            <a:xfrm>
+              <a:off x="533400" y="6488668"/>
+              <a:ext cx="3962400" cy="369332"/>
+            </a:xfrm>
+            <a:prstGeom prst="rect">
+              <a:avLst/>
+            </a:prstGeom>
+            <a:noFill/>
+          </p:spPr>
+          <p:txBody>
+            <a:bodyPr wrap="square" rtlCol="0">
+              <a:spAutoFit/>
+            </a:bodyPr>
+            <a:lstStyle/>
+            <a:p>
+              <a:r>
+                <a:rPr lang="en-US" b="1" dirty="0">
+                  <a:solidFill>
+                    <a:schemeClr val="bg1"/>
+                  </a:solidFill>
+                  <a:latin typeface="Consolas (Headings)"/>
+                </a:rPr>
+                <a:t>Part I: Introduction</a:t>
+              </a:r>
+              <a:endParaRPr lang="en-AU" b="1" dirty="0">
+                <a:solidFill>
+                  <a:schemeClr val="bg1"/>
+                </a:solidFill>
+                <a:latin typeface="Consolas (Headings)"/>
+              </a:endParaRPr>
+            </a:p>
+          </p:txBody>
+        </p:sp>
+      </p:grpSp>
+    </p:spTree>
+    <p:extLst>
+      <p:ext uri="{BB962C8B-B14F-4D97-AF65-F5344CB8AC3E}">
+        <p14:creationId xmlns:p14="http://schemas.microsoft.com/office/powerpoint/2010/main" val="1998565245"/>
+      </p:ext>
+    </p:extLst>
+  </p:cSld>
+  <p:clrMapOvr>
+    <a:masterClrMapping/>
+  </p:clrMapOvr>
+</p:sld>
+</file>
+
+<file path=ppt/slides/slide14.xml><?xml version="1.0" encoding="utf-8"?>
+<p:sld xmlns:a="http://schemas.openxmlformats.org/drawingml/2006/main" xmlns:r="http://schemas.openxmlformats.org/officeDocument/2006/relationships" xmlns:p="http://schemas.openxmlformats.org/presentationml/2006/main">
+  <p:cSld>
+    <p:spTree>
+      <p:nvGrpSpPr>
+        <p:cNvPr id="1" name=""/>
+        <p:cNvGrpSpPr/>
+        <p:nvPr/>
+      </p:nvGrpSpPr>
+      <p:grpSpPr>
+        <a:xfrm>
+          <a:off x="0" y="0"/>
+          <a:ext cx="0" cy="0"/>
+          <a:chOff x="0" y="0"/>
+          <a:chExt cx="0" cy="0"/>
+        </a:xfrm>
+      </p:grpSpPr>
+      <p:sp>
+        <p:nvSpPr>
+          <p:cNvPr id="13" name="Title 12"/>
+          <p:cNvSpPr>
+            <a:spLocks noGrp="1"/>
+          </p:cNvSpPr>
+          <p:nvPr>
+            <p:ph type="title"/>
+          </p:nvPr>
+        </p:nvSpPr>
+        <p:spPr>
+          <a:xfrm>
+            <a:off x="1524000" y="457200"/>
+            <a:ext cx="9144000" cy="1143000"/>
+          </a:xfrm>
+        </p:spPr>
+        <p:txBody>
+          <a:bodyPr/>
+          <a:lstStyle/>
+          <a:p>
+            <a:r>
+              <a:rPr lang="en-US" b="1" dirty="0"/>
+              <a:t>Learning Mode - GitHub</a:t>
+            </a:r>
+          </a:p>
+        </p:txBody>
+      </p:sp>
+      <p:sp>
+        <p:nvSpPr>
+          <p:cNvPr id="14" name="Content Placeholder 13"/>
+          <p:cNvSpPr>
+            <a:spLocks noGrp="1"/>
+          </p:cNvSpPr>
+          <p:nvPr>
+            <p:ph idx="1"/>
+          </p:nvPr>
+        </p:nvSpPr>
+        <p:spPr>
+          <a:xfrm>
+            <a:off x="1524000" y="1828800"/>
+            <a:ext cx="9144000" cy="4267200"/>
+          </a:xfrm>
+        </p:spPr>
+        <p:txBody>
+          <a:bodyPr>
+            <a:normAutofit/>
+          </a:bodyPr>
+          <a:lstStyle/>
+          <a:p>
+            <a:pPr lvl="0"/>
+            <a:r>
+              <a:rPr lang="en-US" dirty="0"/>
               <a:t>The material for each episode is provided on </a:t>
             </a:r>
             <a:r>
@@ -5769,7 +7290,16 @@
             <a:pPr lvl="1"/>
             <a:r>
               <a:rPr lang="en-US" dirty="0" err="1"/>
-              <a:t>etc</a:t>
+              <a:t>Etc</a:t>
+            </a:r>
+            <a:endParaRPr lang="en-US" dirty="0"/>
+          </a:p>
+          <a:p>
+            <a:r>
+              <a:rPr lang="en-US" dirty="0">
+                <a:hlinkClick r:id="rId3"/>
+              </a:rPr>
+              <a:t>https://github.com/just-the-benno/BlazQ</a:t>
             </a:r>
             <a:endParaRPr lang="en-US" dirty="0"/>
           </a:p>
@@ -5963,7 +7493,7 @@
 </p:sld>
 </file>
 
-<file path=ppt/slides/slide11.xml><?xml version="1.0" encoding="utf-8"?>
+<file path=ppt/slides/slide15.xml><?xml version="1.0" encoding="utf-8"?>
 <p:sld xmlns:a="http://schemas.openxmlformats.org/drawingml/2006/main" xmlns:r="http://schemas.openxmlformats.org/officeDocument/2006/relationships" xmlns:p="http://schemas.openxmlformats.org/presentationml/2006/main">
   <p:cSld>
     <p:spTree>
@@ -6280,7 +7810,7 @@
 </p:sld>
 </file>
 
-<file path=ppt/slides/slide12.xml><?xml version="1.0" encoding="utf-8"?>
+<file path=ppt/slides/slide16.xml><?xml version="1.0" encoding="utf-8"?>
 <p:sld xmlns:a="http://schemas.openxmlformats.org/drawingml/2006/main" xmlns:r="http://schemas.openxmlformats.org/officeDocument/2006/relationships" xmlns:p="http://schemas.openxmlformats.org/presentationml/2006/main">
   <p:cSld>
     <p:spTree>
@@ -6554,7 +8084,7 @@
 </p:sld>
 </file>
 
-<file path=ppt/slides/slide13.xml><?xml version="1.0" encoding="utf-8"?>
+<file path=ppt/slides/slide17.xml><?xml version="1.0" encoding="utf-8"?>
 <p:sld xmlns:a="http://schemas.openxmlformats.org/drawingml/2006/main" xmlns:r="http://schemas.openxmlformats.org/officeDocument/2006/relationships" xmlns:p="http://schemas.openxmlformats.org/presentationml/2006/main">
   <p:cSld>
     <p:spTree>
@@ -6824,7 +8354,7 @@
 </p:sld>
 </file>
 
-<file path=ppt/slides/slide14.xml><?xml version="1.0" encoding="utf-8"?>
+<file path=ppt/slides/slide18.xml><?xml version="1.0" encoding="utf-8"?>
 <p:sld xmlns:a="http://schemas.openxmlformats.org/drawingml/2006/main" xmlns:r="http://schemas.openxmlformats.org/officeDocument/2006/relationships" xmlns:p="http://schemas.openxmlformats.org/presentationml/2006/main">
   <p:cSld>
     <p:spTree>
@@ -7116,7 +8646,7 @@
 </p:sld>
 </file>
 
-<file path=ppt/slides/slide15.xml><?xml version="1.0" encoding="utf-8"?>
+<file path=ppt/slides/slide19.xml><?xml version="1.0" encoding="utf-8"?>
 <p:sld xmlns:a="http://schemas.openxmlformats.org/drawingml/2006/main" xmlns:r="http://schemas.openxmlformats.org/officeDocument/2006/relationships" xmlns:p="http://schemas.openxmlformats.org/presentationml/2006/main">
   <p:cSld>
     <p:spTree>
@@ -7204,7 +8734,100 @@
 </p:sld>
 </file>
 
-<file path=ppt/slides/slide16.xml><?xml version="1.0" encoding="utf-8"?>
+<file path=ppt/slides/slide2.xml><?xml version="1.0" encoding="utf-8"?>
+<p:sld xmlns:a="http://schemas.openxmlformats.org/drawingml/2006/main" xmlns:r="http://schemas.openxmlformats.org/officeDocument/2006/relationships" xmlns:p="http://schemas.openxmlformats.org/presentationml/2006/main">
+  <p:cSld>
+    <p:spTree>
+      <p:nvGrpSpPr>
+        <p:cNvPr id="1" name=""/>
+        <p:cNvGrpSpPr/>
+        <p:nvPr/>
+      </p:nvGrpSpPr>
+      <p:grpSpPr>
+        <a:xfrm>
+          <a:off x="0" y="0"/>
+          <a:ext cx="0" cy="0"/>
+          <a:chOff x="0" y="0"/>
+          <a:chExt cx="0" cy="0"/>
+        </a:xfrm>
+      </p:grpSpPr>
+      <p:sp>
+        <p:nvSpPr>
+          <p:cNvPr id="13" name="Title 12"/>
+          <p:cNvSpPr>
+            <a:spLocks noGrp="1"/>
+          </p:cNvSpPr>
+          <p:nvPr>
+            <p:ph type="title"/>
+          </p:nvPr>
+        </p:nvSpPr>
+        <p:spPr/>
+        <p:txBody>
+          <a:bodyPr/>
+          <a:lstStyle/>
+          <a:p>
+            <a:r>
+              <a:rPr lang="en-US" dirty="0"/>
+              <a:t>Episode’s</a:t>
+            </a:r>
+            <a:r>
+              <a:rPr lang="en-US" b="1" dirty="0"/>
+              <a:t> </a:t>
+            </a:r>
+            <a:r>
+              <a:rPr lang="en-US" dirty="0"/>
+              <a:t>goals</a:t>
+            </a:r>
+          </a:p>
+        </p:txBody>
+      </p:sp>
+      <p:sp>
+        <p:nvSpPr>
+          <p:cNvPr id="14" name="Content Placeholder 13"/>
+          <p:cNvSpPr>
+            <a:spLocks noGrp="1"/>
+          </p:cNvSpPr>
+          <p:nvPr>
+            <p:ph idx="1"/>
+          </p:nvPr>
+        </p:nvSpPr>
+        <p:spPr/>
+        <p:txBody>
+          <a:bodyPr>
+            <a:normAutofit/>
+          </a:bodyPr>
+          <a:lstStyle/>
+          <a:p>
+            <a:pPr lvl="0"/>
+            <a:r>
+              <a:rPr lang="en-US" dirty="0"/>
+              <a:t>Move </a:t>
+            </a:r>
+            <a:r>
+              <a:rPr lang="en-US" dirty="0" err="1"/>
+              <a:t>Blazorly</a:t>
+            </a:r>
+            <a:r>
+              <a:rPr lang="en-US" dirty="0"/>
+              <a:t> around the screen</a:t>
+            </a:r>
+          </a:p>
+        </p:txBody>
+      </p:sp>
+    </p:spTree>
+    <p:extLst>
+      <p:ext uri="{BB962C8B-B14F-4D97-AF65-F5344CB8AC3E}">
+        <p14:creationId xmlns:p14="http://schemas.microsoft.com/office/powerpoint/2010/main" val="2772730073"/>
+      </p:ext>
+    </p:extLst>
+  </p:cSld>
+  <p:clrMapOvr>
+    <a:masterClrMapping/>
+  </p:clrMapOvr>
+</p:sld>
+</file>
+
+<file path=ppt/slides/slide20.xml><?xml version="1.0" encoding="utf-8"?>
 <p:sld xmlns:a="http://schemas.openxmlformats.org/drawingml/2006/main" xmlns:r="http://schemas.openxmlformats.org/officeDocument/2006/relationships" xmlns:p="http://schemas.openxmlformats.org/presentationml/2006/main">
   <p:cSld>
     <p:spTree>
@@ -7488,7 +9111,7 @@
 </p:sld>
 </file>
 
-<file path=ppt/slides/slide17.xml><?xml version="1.0" encoding="utf-8"?>
+<file path=ppt/slides/slide21.xml><?xml version="1.0" encoding="utf-8"?>
 <p:sld xmlns:a="http://schemas.openxmlformats.org/drawingml/2006/main" xmlns:r="http://schemas.openxmlformats.org/officeDocument/2006/relationships" xmlns:p="http://schemas.openxmlformats.org/presentationml/2006/main">
   <p:cSld>
     <p:spTree>
@@ -7759,7 +9382,7 @@
 </p:sld>
 </file>
 
-<file path=ppt/slides/slide18.xml><?xml version="1.0" encoding="utf-8"?>
+<file path=ppt/slides/slide22.xml><?xml version="1.0" encoding="utf-8"?>
 <p:sld xmlns:a="http://schemas.openxmlformats.org/drawingml/2006/main" xmlns:r="http://schemas.openxmlformats.org/officeDocument/2006/relationships" xmlns:p="http://schemas.openxmlformats.org/presentationml/2006/main">
   <p:cSld>
     <p:spTree>
@@ -8042,7 +9665,7 @@
 </p:sld>
 </file>
 
-<file path=ppt/slides/slide19.xml><?xml version="1.0" encoding="utf-8"?>
+<file path=ppt/slides/slide23.xml><?xml version="1.0" encoding="utf-8"?>
 <p:sld xmlns:a="http://schemas.openxmlformats.org/drawingml/2006/main" xmlns:r="http://schemas.openxmlformats.org/officeDocument/2006/relationships" xmlns:p="http://schemas.openxmlformats.org/presentationml/2006/main">
   <p:cSld>
     <p:spTree>
@@ -8111,7 +9734,7 @@
           <a:p>
             <a:r>
               <a:rPr lang="en-US" dirty="0"/>
-              <a:t>The following plugins for </a:t>
+              <a:t>Only one plugin for </a:t>
             </a:r>
             <a:r>
               <a:rPr lang="en-US" dirty="0" err="1"/>
@@ -8119,8 +9742,27 @@
             </a:r>
             <a:r>
               <a:rPr lang="en-US" dirty="0"/>
-              <a:t> are recommended</a:t>
-            </a:r>
+              <a:t> is needed</a:t>
+            </a:r>
+          </a:p>
+          <a:p>
+            <a:r>
+              <a:rPr lang="en-US" dirty="0"/>
+              <a:t>C# (</a:t>
+            </a:r>
+            <a:r>
+              <a:rPr lang="en-US" dirty="0">
+                <a:hlinkClick r:id="rId2"/>
+              </a:rPr>
+              <a:t>https://marketplace.visualstudio.com/items?itemName=ms-dotnettools.csharp</a:t>
+            </a:r>
+            <a:r>
+              <a:rPr lang="en-US" dirty="0"/>
+              <a:t>)</a:t>
+            </a:r>
+          </a:p>
+          <a:p>
+            <a:endParaRPr lang="en-US" dirty="0"/>
           </a:p>
           <a:p>
             <a:pPr lvl="1"/>
@@ -8141,7 +9783,7 @@
 </p:sld>
 </file>
 
-<file path=ppt/slides/slide2.xml><?xml version="1.0" encoding="utf-8"?>
+<file path=ppt/slides/slide24.xml><?xml version="1.0" encoding="utf-8"?>
 <p:sld xmlns:a="http://schemas.openxmlformats.org/drawingml/2006/main" xmlns:r="http://schemas.openxmlformats.org/officeDocument/2006/relationships" xmlns:p="http://schemas.openxmlformats.org/presentationml/2006/main">
   <p:cSld>
     <p:spTree>
@@ -8163,122 +9805,6 @@
           <p:cNvPr id="2" name="Title 1">
             <a:extLst>
               <a:ext uri="{FF2B5EF4-FFF2-40B4-BE49-F238E27FC236}">
-                <a16:creationId xmlns:a16="http://schemas.microsoft.com/office/drawing/2014/main" id="{E24C8BEF-6711-4C27-A613-C49668579FC6}"/>
-              </a:ext>
-            </a:extLst>
-          </p:cNvPr>
-          <p:cNvSpPr>
-            <a:spLocks noGrp="1"/>
-          </p:cNvSpPr>
-          <p:nvPr>
-            <p:ph type="title"/>
-          </p:nvPr>
-        </p:nvSpPr>
-        <p:spPr/>
-        <p:txBody>
-          <a:bodyPr/>
-          <a:lstStyle/>
-          <a:p>
-            <a:r>
-              <a:rPr lang="en-US" dirty="0"/>
-              <a:t>Episode’s Content</a:t>
-            </a:r>
-            <a:endParaRPr lang="LID4096" dirty="0"/>
-          </a:p>
-        </p:txBody>
-      </p:sp>
-      <p:sp>
-        <p:nvSpPr>
-          <p:cNvPr id="3" name="Content Placeholder 2">
-            <a:extLst>
-              <a:ext uri="{FF2B5EF4-FFF2-40B4-BE49-F238E27FC236}">
-                <a16:creationId xmlns:a16="http://schemas.microsoft.com/office/drawing/2014/main" id="{3DA0104E-B78E-4F54-84D5-CD6975655220}"/>
-              </a:ext>
-            </a:extLst>
-          </p:cNvPr>
-          <p:cNvSpPr>
-            <a:spLocks noGrp="1"/>
-          </p:cNvSpPr>
-          <p:nvPr>
-            <p:ph idx="1"/>
-          </p:nvPr>
-        </p:nvSpPr>
-        <p:spPr/>
-        <p:txBody>
-          <a:bodyPr/>
-          <a:lstStyle/>
-          <a:p>
-            <a:r>
-              <a:rPr lang="en-US" dirty="0"/>
-              <a:t>Introduction</a:t>
-            </a:r>
-          </a:p>
-          <a:p>
-            <a:r>
-              <a:rPr lang="en-US" dirty="0"/>
-              <a:t>Preparation</a:t>
-            </a:r>
-          </a:p>
-          <a:p>
-            <a:r>
-              <a:rPr lang="en-US" dirty="0"/>
-              <a:t>Let </a:t>
-            </a:r>
-            <a:r>
-              <a:rPr lang="en-US" dirty="0" err="1"/>
-              <a:t>Blazorly</a:t>
-            </a:r>
-            <a:r>
-              <a:rPr lang="en-US" dirty="0"/>
-              <a:t> move</a:t>
-            </a:r>
-          </a:p>
-          <a:p>
-            <a:r>
-              <a:rPr lang="en-US" dirty="0"/>
-              <a:t>Debrief</a:t>
-            </a:r>
-          </a:p>
-          <a:p>
-            <a:endParaRPr lang="LID4096" dirty="0"/>
-          </a:p>
-        </p:txBody>
-      </p:sp>
-    </p:spTree>
-    <p:extLst>
-      <p:ext uri="{BB962C8B-B14F-4D97-AF65-F5344CB8AC3E}">
-        <p14:creationId xmlns:p14="http://schemas.microsoft.com/office/powerpoint/2010/main" val="3715486455"/>
-      </p:ext>
-    </p:extLst>
-  </p:cSld>
-  <p:clrMapOvr>
-    <a:masterClrMapping/>
-  </p:clrMapOvr>
-</p:sld>
-</file>
-
-<file path=ppt/slides/slide20.xml><?xml version="1.0" encoding="utf-8"?>
-<p:sld xmlns:a="http://schemas.openxmlformats.org/drawingml/2006/main" xmlns:r="http://schemas.openxmlformats.org/officeDocument/2006/relationships" xmlns:p="http://schemas.openxmlformats.org/presentationml/2006/main">
-  <p:cSld>
-    <p:spTree>
-      <p:nvGrpSpPr>
-        <p:cNvPr id="1" name=""/>
-        <p:cNvGrpSpPr/>
-        <p:nvPr/>
-      </p:nvGrpSpPr>
-      <p:grpSpPr>
-        <a:xfrm>
-          <a:off x="0" y="0"/>
-          <a:ext cx="0" cy="0"/>
-          <a:chOff x="0" y="0"/>
-          <a:chExt cx="0" cy="0"/>
-        </a:xfrm>
-      </p:grpSpPr>
-      <p:sp>
-        <p:nvSpPr>
-          <p:cNvPr id="2" name="Title 1">
-            <a:extLst>
-              <a:ext uri="{FF2B5EF4-FFF2-40B4-BE49-F238E27FC236}">
                 <a16:creationId xmlns:a16="http://schemas.microsoft.com/office/drawing/2014/main" id="{460B8984-BD4B-4C4B-946F-822632B74F85}"/>
               </a:ext>
             </a:extLst>
@@ -8345,7 +9871,7 @@
 </p:sld>
 </file>
 
-<file path=ppt/slides/slide21.xml><?xml version="1.0" encoding="utf-8"?>
+<file path=ppt/slides/slide25.xml><?xml version="1.0" encoding="utf-8"?>
 <p:sld xmlns:a="http://schemas.openxmlformats.org/drawingml/2006/main" xmlns:r="http://schemas.openxmlformats.org/officeDocument/2006/relationships" xmlns:p="http://schemas.openxmlformats.org/presentationml/2006/main">
   <p:cSld>
     <p:spTree>
@@ -8647,7 +10173,7 @@
 </p:sld>
 </file>
 
-<file path=ppt/slides/slide22.xml><?xml version="1.0" encoding="utf-8"?>
+<file path=ppt/slides/slide26.xml><?xml version="1.0" encoding="utf-8"?>
 <p:sld xmlns:a="http://schemas.openxmlformats.org/drawingml/2006/main" xmlns:r="http://schemas.openxmlformats.org/officeDocument/2006/relationships" xmlns:p="http://schemas.openxmlformats.org/presentationml/2006/main">
   <p:cSld>
     <p:spTree>
@@ -8938,7 +10464,7 @@
 </p:sld>
 </file>
 
-<file path=ppt/slides/slide23.xml><?xml version="1.0" encoding="utf-8"?>
+<file path=ppt/slides/slide27.xml><?xml version="1.0" encoding="utf-8"?>
 <p:sld xmlns:a="http://schemas.openxmlformats.org/drawingml/2006/main" xmlns:r="http://schemas.openxmlformats.org/officeDocument/2006/relationships" xmlns:p="http://schemas.openxmlformats.org/presentationml/2006/main">
   <p:cSld>
     <p:spTree>
@@ -9224,7 +10750,7 @@
 </p:sld>
 </file>
 
-<file path=ppt/slides/slide24.xml><?xml version="1.0" encoding="utf-8"?>
+<file path=ppt/slides/slide28.xml><?xml version="1.0" encoding="utf-8"?>
 <p:sld xmlns:a="http://schemas.openxmlformats.org/drawingml/2006/main" xmlns:r="http://schemas.openxmlformats.org/officeDocument/2006/relationships" xmlns:p="http://schemas.openxmlformats.org/presentationml/2006/main">
   <p:cSld>
     <p:spTree>
@@ -9512,7 +11038,7 @@
 </p:sld>
 </file>
 
-<file path=ppt/slides/slide25.xml><?xml version="1.0" encoding="utf-8"?>
+<file path=ppt/slides/slide29.xml><?xml version="1.0" encoding="utf-8"?>
 <p:sld xmlns:a="http://schemas.openxmlformats.org/drawingml/2006/main" xmlns:r="http://schemas.openxmlformats.org/officeDocument/2006/relationships" xmlns:p="http://schemas.openxmlformats.org/presentationml/2006/main">
   <p:cSld>
     <p:spTree>
@@ -9784,7 +11310,123 @@
 </p:sld>
 </file>
 
-<file path=ppt/slides/slide26.xml><?xml version="1.0" encoding="utf-8"?>
+<file path=ppt/slides/slide3.xml><?xml version="1.0" encoding="utf-8"?>
+<p:sld xmlns:a="http://schemas.openxmlformats.org/drawingml/2006/main" xmlns:r="http://schemas.openxmlformats.org/officeDocument/2006/relationships" xmlns:p="http://schemas.openxmlformats.org/presentationml/2006/main">
+  <p:cSld>
+    <p:spTree>
+      <p:nvGrpSpPr>
+        <p:cNvPr id="1" name=""/>
+        <p:cNvGrpSpPr/>
+        <p:nvPr/>
+      </p:nvGrpSpPr>
+      <p:grpSpPr>
+        <a:xfrm>
+          <a:off x="0" y="0"/>
+          <a:ext cx="0" cy="0"/>
+          <a:chOff x="0" y="0"/>
+          <a:chExt cx="0" cy="0"/>
+        </a:xfrm>
+      </p:grpSpPr>
+      <p:sp>
+        <p:nvSpPr>
+          <p:cNvPr id="2" name="Title 1">
+            <a:extLst>
+              <a:ext uri="{FF2B5EF4-FFF2-40B4-BE49-F238E27FC236}">
+                <a16:creationId xmlns:a16="http://schemas.microsoft.com/office/drawing/2014/main" id="{E24C8BEF-6711-4C27-A613-C49668579FC6}"/>
+              </a:ext>
+            </a:extLst>
+          </p:cNvPr>
+          <p:cNvSpPr>
+            <a:spLocks noGrp="1"/>
+          </p:cNvSpPr>
+          <p:nvPr>
+            <p:ph type="title"/>
+          </p:nvPr>
+        </p:nvSpPr>
+        <p:spPr/>
+        <p:txBody>
+          <a:bodyPr/>
+          <a:lstStyle/>
+          <a:p>
+            <a:r>
+              <a:rPr lang="en-US" dirty="0"/>
+              <a:t>Episode’s Content</a:t>
+            </a:r>
+            <a:endParaRPr lang="LID4096" dirty="0"/>
+          </a:p>
+        </p:txBody>
+      </p:sp>
+      <p:sp>
+        <p:nvSpPr>
+          <p:cNvPr id="3" name="Content Placeholder 2">
+            <a:extLst>
+              <a:ext uri="{FF2B5EF4-FFF2-40B4-BE49-F238E27FC236}">
+                <a16:creationId xmlns:a16="http://schemas.microsoft.com/office/drawing/2014/main" id="{3DA0104E-B78E-4F54-84D5-CD6975655220}"/>
+              </a:ext>
+            </a:extLst>
+          </p:cNvPr>
+          <p:cNvSpPr>
+            <a:spLocks noGrp="1"/>
+          </p:cNvSpPr>
+          <p:nvPr>
+            <p:ph idx="1"/>
+          </p:nvPr>
+        </p:nvSpPr>
+        <p:spPr/>
+        <p:txBody>
+          <a:bodyPr/>
+          <a:lstStyle/>
+          <a:p>
+            <a:r>
+              <a:rPr lang="en-US" dirty="0"/>
+              <a:t>Introduction</a:t>
+            </a:r>
+          </a:p>
+          <a:p>
+            <a:r>
+              <a:rPr lang="en-US" dirty="0"/>
+              <a:t>Preparation</a:t>
+            </a:r>
+          </a:p>
+          <a:p>
+            <a:r>
+              <a:rPr lang="en-US" dirty="0"/>
+              <a:t>Let </a:t>
+            </a:r>
+            <a:r>
+              <a:rPr lang="en-US" dirty="0" err="1"/>
+              <a:t>Blazorly</a:t>
+            </a:r>
+            <a:r>
+              <a:rPr lang="en-US" dirty="0"/>
+              <a:t> move</a:t>
+            </a:r>
+          </a:p>
+          <a:p>
+            <a:r>
+              <a:rPr lang="en-US" dirty="0"/>
+              <a:t>Debrief</a:t>
+            </a:r>
+          </a:p>
+          <a:p>
+            <a:endParaRPr lang="LID4096" dirty="0"/>
+          </a:p>
+        </p:txBody>
+      </p:sp>
+    </p:spTree>
+    <p:extLst>
+      <p:ext uri="{BB962C8B-B14F-4D97-AF65-F5344CB8AC3E}">
+        <p14:creationId xmlns:p14="http://schemas.microsoft.com/office/powerpoint/2010/main" val="3715486455"/>
+      </p:ext>
+    </p:extLst>
+  </p:cSld>
+  <p:clrMapOvr>
+    <a:masterClrMapping/>
+  </p:clrMapOvr>
+</p:sld>
+</file>
+
+<file path=ppt/slides/slide30.xml><?xml version="1.0" encoding="utf-8"?>
 <p:sld xmlns:a="http://schemas.openxmlformats.org/drawingml/2006/main" xmlns:r="http://schemas.openxmlformats.org/officeDocument/2006/relationships" xmlns:p="http://schemas.openxmlformats.org/presentationml/2006/main">
   <p:cSld>
     <p:spTree>
@@ -10062,7 +11704,7 @@
 </p:sld>
 </file>
 
-<file path=ppt/slides/slide27.xml><?xml version="1.0" encoding="utf-8"?>
+<file path=ppt/slides/slide31.xml><?xml version="1.0" encoding="utf-8"?>
 <p:sld xmlns:a="http://schemas.openxmlformats.org/drawingml/2006/main" xmlns:r="http://schemas.openxmlformats.org/officeDocument/2006/relationships" xmlns:p="http://schemas.openxmlformats.org/presentationml/2006/main">
   <p:cSld>
     <p:spTree>
@@ -10342,7 +11984,7 @@
 </p:sld>
 </file>
 
-<file path=ppt/slides/slide28.xml><?xml version="1.0" encoding="utf-8"?>
+<file path=ppt/slides/slide32.xml><?xml version="1.0" encoding="utf-8"?>
 <p:sld xmlns:a="http://schemas.openxmlformats.org/drawingml/2006/main" xmlns:r="http://schemas.openxmlformats.org/officeDocument/2006/relationships" xmlns:p="http://schemas.openxmlformats.org/presentationml/2006/main">
   <p:cSld>
     <p:spTree>
@@ -10430,7 +12072,7 @@
 </p:sld>
 </file>
 
-<file path=ppt/slides/slide29.xml><?xml version="1.0" encoding="utf-8"?>
+<file path=ppt/slides/slide33.xml><?xml version="1.0" encoding="utf-8"?>
 <p:sld xmlns:a="http://schemas.openxmlformats.org/drawingml/2006/main" xmlns:r="http://schemas.openxmlformats.org/officeDocument/2006/relationships" xmlns:p="http://schemas.openxmlformats.org/presentationml/2006/main">
   <p:cSld>
     <p:spTree>
@@ -10726,102 +12368,7 @@
 </p:sld>
 </file>
 
-<file path=ppt/slides/slide3.xml><?xml version="1.0" encoding="utf-8"?>
-<p:sld xmlns:a="http://schemas.openxmlformats.org/drawingml/2006/main" xmlns:r="http://schemas.openxmlformats.org/officeDocument/2006/relationships" xmlns:p="http://schemas.openxmlformats.org/presentationml/2006/main">
-  <p:cSld>
-    <p:spTree>
-      <p:nvGrpSpPr>
-        <p:cNvPr id="1" name=""/>
-        <p:cNvGrpSpPr/>
-        <p:nvPr/>
-      </p:nvGrpSpPr>
-      <p:grpSpPr>
-        <a:xfrm>
-          <a:off x="0" y="0"/>
-          <a:ext cx="0" cy="0"/>
-          <a:chOff x="0" y="0"/>
-          <a:chExt cx="0" cy="0"/>
-        </a:xfrm>
-      </p:grpSpPr>
-      <p:sp>
-        <p:nvSpPr>
-          <p:cNvPr id="4" name="Title 3">
-            <a:extLst>
-              <a:ext uri="{FF2B5EF4-FFF2-40B4-BE49-F238E27FC236}">
-                <a16:creationId xmlns:a16="http://schemas.microsoft.com/office/drawing/2014/main" id="{63C64854-1081-41D7-92A0-0596BEDBF743}"/>
-              </a:ext>
-            </a:extLst>
-          </p:cNvPr>
-          <p:cNvSpPr>
-            <a:spLocks noGrp="1"/>
-          </p:cNvSpPr>
-          <p:nvPr>
-            <p:ph type="ctrTitle"/>
-          </p:nvPr>
-        </p:nvSpPr>
-        <p:spPr/>
-        <p:txBody>
-          <a:bodyPr/>
-          <a:lstStyle/>
-          <a:p>
-            <a:r>
-              <a:rPr lang="en-US" dirty="0"/>
-              <a:t>Introduction</a:t>
-            </a:r>
-            <a:endParaRPr lang="en-AU" dirty="0"/>
-          </a:p>
-        </p:txBody>
-      </p:sp>
-      <p:sp>
-        <p:nvSpPr>
-          <p:cNvPr id="5" name="Subtitle 4">
-            <a:extLst>
-              <a:ext uri="{FF2B5EF4-FFF2-40B4-BE49-F238E27FC236}">
-                <a16:creationId xmlns:a16="http://schemas.microsoft.com/office/drawing/2014/main" id="{4F95D786-68A8-409F-878E-F2295B121735}"/>
-              </a:ext>
-            </a:extLst>
-          </p:cNvPr>
-          <p:cNvSpPr>
-            <a:spLocks noGrp="1"/>
-          </p:cNvSpPr>
-          <p:nvPr>
-            <p:ph type="subTitle" idx="1"/>
-          </p:nvPr>
-        </p:nvSpPr>
-        <p:spPr/>
-        <p:txBody>
-          <a:bodyPr/>
-          <a:lstStyle/>
-          <a:p>
-            <a:r>
-              <a:rPr lang="en-AU" dirty="0"/>
-              <a:t>What is </a:t>
-            </a:r>
-            <a:r>
-              <a:rPr lang="en-AU" dirty="0" err="1"/>
-              <a:t>BlazQ</a:t>
-            </a:r>
-            <a:r>
-              <a:rPr lang="en-AU" dirty="0"/>
-              <a:t> and how does it help to learn software development?</a:t>
-            </a:r>
-          </a:p>
-        </p:txBody>
-      </p:sp>
-    </p:spTree>
-    <p:extLst>
-      <p:ext uri="{BB962C8B-B14F-4D97-AF65-F5344CB8AC3E}">
-        <p14:creationId xmlns:p14="http://schemas.microsoft.com/office/powerpoint/2010/main" val="3643869058"/>
-      </p:ext>
-    </p:extLst>
-  </p:cSld>
-  <p:clrMapOvr>
-    <a:masterClrMapping/>
-  </p:clrMapOvr>
-</p:sld>
-</file>
-
-<file path=ppt/slides/slide30.xml><?xml version="1.0" encoding="utf-8"?>
+<file path=ppt/slides/slide34.xml><?xml version="1.0" encoding="utf-8"?>
 <p:sld xmlns:a="http://schemas.openxmlformats.org/drawingml/2006/main" xmlns:r="http://schemas.openxmlformats.org/officeDocument/2006/relationships" xmlns:p="http://schemas.openxmlformats.org/presentationml/2006/main">
   <p:cSld>
     <p:spTree>
@@ -11106,7 +12653,7 @@
 </p:sld>
 </file>
 
-<file path=ppt/slides/slide31.xml><?xml version="1.0" encoding="utf-8"?>
+<file path=ppt/slides/slide35.xml><?xml version="1.0" encoding="utf-8"?>
 <p:sld xmlns:a="http://schemas.openxmlformats.org/drawingml/2006/main" xmlns:r="http://schemas.openxmlformats.org/officeDocument/2006/relationships" xmlns:p="http://schemas.openxmlformats.org/presentationml/2006/main">
   <p:cSld>
     <p:spTree>
@@ -11462,7 +13009,7 @@
 </p:sld>
 </file>
 
-<file path=ppt/slides/slide32.xml><?xml version="1.0" encoding="utf-8"?>
+<file path=ppt/slides/slide36.xml><?xml version="1.0" encoding="utf-8"?>
 <p:sld xmlns:a="http://schemas.openxmlformats.org/drawingml/2006/main" xmlns:r="http://schemas.openxmlformats.org/officeDocument/2006/relationships" xmlns:p="http://schemas.openxmlformats.org/presentationml/2006/main">
   <p:cSld>
     <p:spTree>
@@ -11874,7 +13421,7 @@
 </p:sld>
 </file>
 
-<file path=ppt/slides/slide33.xml><?xml version="1.0" encoding="utf-8"?>
+<file path=ppt/slides/slide37.xml><?xml version="1.0" encoding="utf-8"?>
 <p:sld xmlns:a="http://schemas.openxmlformats.org/drawingml/2006/main" xmlns:r="http://schemas.openxmlformats.org/officeDocument/2006/relationships" xmlns:p="http://schemas.openxmlformats.org/presentationml/2006/main">
   <p:cSld>
     <p:spTree>
@@ -12167,6 +13714,101 @@
       </p:grpSpPr>
       <p:sp>
         <p:nvSpPr>
+          <p:cNvPr id="4" name="Title 3">
+            <a:extLst>
+              <a:ext uri="{FF2B5EF4-FFF2-40B4-BE49-F238E27FC236}">
+                <a16:creationId xmlns:a16="http://schemas.microsoft.com/office/drawing/2014/main" id="{63C64854-1081-41D7-92A0-0596BEDBF743}"/>
+              </a:ext>
+            </a:extLst>
+          </p:cNvPr>
+          <p:cNvSpPr>
+            <a:spLocks noGrp="1"/>
+          </p:cNvSpPr>
+          <p:nvPr>
+            <p:ph type="ctrTitle"/>
+          </p:nvPr>
+        </p:nvSpPr>
+        <p:spPr/>
+        <p:txBody>
+          <a:bodyPr/>
+          <a:lstStyle/>
+          <a:p>
+            <a:r>
+              <a:rPr lang="en-US" dirty="0"/>
+              <a:t>Introduction</a:t>
+            </a:r>
+            <a:endParaRPr lang="en-AU" dirty="0"/>
+          </a:p>
+        </p:txBody>
+      </p:sp>
+      <p:sp>
+        <p:nvSpPr>
+          <p:cNvPr id="5" name="Subtitle 4">
+            <a:extLst>
+              <a:ext uri="{FF2B5EF4-FFF2-40B4-BE49-F238E27FC236}">
+                <a16:creationId xmlns:a16="http://schemas.microsoft.com/office/drawing/2014/main" id="{4F95D786-68A8-409F-878E-F2295B121735}"/>
+              </a:ext>
+            </a:extLst>
+          </p:cNvPr>
+          <p:cNvSpPr>
+            <a:spLocks noGrp="1"/>
+          </p:cNvSpPr>
+          <p:nvPr>
+            <p:ph type="subTitle" idx="1"/>
+          </p:nvPr>
+        </p:nvSpPr>
+        <p:spPr/>
+        <p:txBody>
+          <a:bodyPr/>
+          <a:lstStyle/>
+          <a:p>
+            <a:r>
+              <a:rPr lang="en-AU" dirty="0"/>
+              <a:t>What is </a:t>
+            </a:r>
+            <a:r>
+              <a:rPr lang="en-AU" dirty="0" err="1"/>
+              <a:t>BlazQ</a:t>
+            </a:r>
+            <a:r>
+              <a:rPr lang="en-AU" dirty="0"/>
+              <a:t> and how does it help to learn software development?</a:t>
+            </a:r>
+          </a:p>
+        </p:txBody>
+      </p:sp>
+    </p:spTree>
+    <p:extLst>
+      <p:ext uri="{BB962C8B-B14F-4D97-AF65-F5344CB8AC3E}">
+        <p14:creationId xmlns:p14="http://schemas.microsoft.com/office/powerpoint/2010/main" val="3643869058"/>
+      </p:ext>
+    </p:extLst>
+  </p:cSld>
+  <p:clrMapOvr>
+    <a:masterClrMapping/>
+  </p:clrMapOvr>
+</p:sld>
+</file>
+
+<file path=ppt/slides/slide5.xml><?xml version="1.0" encoding="utf-8"?>
+<p:sld xmlns:a="http://schemas.openxmlformats.org/drawingml/2006/main" xmlns:r="http://schemas.openxmlformats.org/officeDocument/2006/relationships" xmlns:p="http://schemas.openxmlformats.org/presentationml/2006/main">
+  <p:cSld>
+    <p:spTree>
+      <p:nvGrpSpPr>
+        <p:cNvPr id="1" name=""/>
+        <p:cNvGrpSpPr/>
+        <p:nvPr/>
+      </p:nvGrpSpPr>
+      <p:grpSpPr>
+        <a:xfrm>
+          <a:off x="0" y="0"/>
+          <a:ext cx="0" cy="0"/>
+          <a:chOff x="0" y="0"/>
+          <a:chExt cx="0" cy="0"/>
+        </a:xfrm>
+      </p:grpSpPr>
+      <p:sp>
+        <p:nvSpPr>
           <p:cNvPr id="2" name="Title 1">
             <a:extLst>
               <a:ext uri="{FF2B5EF4-FFF2-40B4-BE49-F238E27FC236}">
@@ -12237,7 +13879,7 @@
           <a:p>
             <a:r>
               <a:rPr lang="en-US" dirty="0"/>
-              <a:t>Studied Electric Engeneering in Germany</a:t>
+              <a:t>Studied Electric Engineering in Germany</a:t>
             </a:r>
           </a:p>
           <a:p>
@@ -12498,7 +14140,375 @@
 </p:sld>
 </file>
 
-<file path=ppt/slides/slide5.xml><?xml version="1.0" encoding="utf-8"?>
+<file path=ppt/slides/slide6.xml><?xml version="1.0" encoding="utf-8"?>
+<p:sld xmlns:a="http://schemas.openxmlformats.org/drawingml/2006/main" xmlns:r="http://schemas.openxmlformats.org/officeDocument/2006/relationships" xmlns:p="http://schemas.openxmlformats.org/presentationml/2006/main">
+  <p:cSld>
+    <p:spTree>
+      <p:nvGrpSpPr>
+        <p:cNvPr id="1" name=""/>
+        <p:cNvGrpSpPr/>
+        <p:nvPr/>
+      </p:nvGrpSpPr>
+      <p:grpSpPr>
+        <a:xfrm>
+          <a:off x="0" y="0"/>
+          <a:ext cx="0" cy="0"/>
+          <a:chOff x="0" y="0"/>
+          <a:chExt cx="0" cy="0"/>
+        </a:xfrm>
+      </p:grpSpPr>
+      <p:sp>
+        <p:nvSpPr>
+          <p:cNvPr id="13" name="Title 12"/>
+          <p:cNvSpPr>
+            <a:spLocks noGrp="1"/>
+          </p:cNvSpPr>
+          <p:nvPr>
+            <p:ph type="title"/>
+          </p:nvPr>
+        </p:nvSpPr>
+        <p:spPr/>
+        <p:txBody>
+          <a:bodyPr/>
+          <a:lstStyle/>
+          <a:p>
+            <a:r>
+              <a:rPr lang="en-US" dirty="0"/>
+              <a:t>Who will benefit?</a:t>
+            </a:r>
+          </a:p>
+        </p:txBody>
+      </p:sp>
+      <p:sp>
+        <p:nvSpPr>
+          <p:cNvPr id="7" name="Text Placeholder 6">
+            <a:extLst>
+              <a:ext uri="{FF2B5EF4-FFF2-40B4-BE49-F238E27FC236}">
+                <a16:creationId xmlns:a16="http://schemas.microsoft.com/office/drawing/2014/main" id="{F1CFDD37-6D1D-4550-93A6-06969E5E743E}"/>
+              </a:ext>
+            </a:extLst>
+          </p:cNvPr>
+          <p:cNvSpPr>
+            <a:spLocks noGrp="1"/>
+          </p:cNvSpPr>
+          <p:nvPr>
+            <p:ph type="body" idx="1"/>
+          </p:nvPr>
+        </p:nvSpPr>
+        <p:spPr/>
+        <p:txBody>
+          <a:bodyPr>
+            <a:normAutofit lnSpcReduction="10000"/>
+          </a:bodyPr>
+          <a:lstStyle/>
+          <a:p>
+            <a:r>
+              <a:rPr lang="en-US" b="1" dirty="0"/>
+              <a:t>Is Software Engeneering your thing?</a:t>
+            </a:r>
+            <a:endParaRPr lang="LID4096" b="1" dirty="0"/>
+          </a:p>
+        </p:txBody>
+      </p:sp>
+      <p:sp>
+        <p:nvSpPr>
+          <p:cNvPr id="14" name="Content Placeholder 13"/>
+          <p:cNvSpPr>
+            <a:spLocks noGrp="1"/>
+          </p:cNvSpPr>
+          <p:nvPr>
+            <p:ph sz="half" idx="2"/>
+          </p:nvPr>
+        </p:nvSpPr>
+        <p:spPr/>
+        <p:txBody>
+          <a:bodyPr/>
+          <a:lstStyle/>
+          <a:p>
+            <a:r>
+              <a:rPr lang="en-US" dirty="0" err="1"/>
+              <a:t>BlazQ</a:t>
+            </a:r>
+            <a:r>
+              <a:rPr lang="en-US" dirty="0"/>
+              <a:t> will help you to evaluate the question if a career as a Software Engineer is something you’ll enjoy</a:t>
+            </a:r>
+          </a:p>
+          <a:p>
+            <a:r>
+              <a:rPr lang="en-US" dirty="0"/>
+              <a:t>You can see, if the way of thinking is something you want to do to earn a living</a:t>
+            </a:r>
+          </a:p>
+          <a:p>
+            <a:r>
+              <a:rPr lang="en-US" dirty="0"/>
+              <a:t>Do you like to be challenged? Surpassing your limits to reach new highs of understanding?</a:t>
+            </a:r>
+          </a:p>
+        </p:txBody>
+      </p:sp>
+      <p:sp>
+        <p:nvSpPr>
+          <p:cNvPr id="8" name="Text Placeholder 7">
+            <a:extLst>
+              <a:ext uri="{FF2B5EF4-FFF2-40B4-BE49-F238E27FC236}">
+                <a16:creationId xmlns:a16="http://schemas.microsoft.com/office/drawing/2014/main" id="{26576931-6D78-402D-B8E2-43511630B83F}"/>
+              </a:ext>
+            </a:extLst>
+          </p:cNvPr>
+          <p:cNvSpPr>
+            <a:spLocks noGrp="1"/>
+          </p:cNvSpPr>
+          <p:nvPr>
+            <p:ph type="body" sz="quarter" idx="3"/>
+          </p:nvPr>
+        </p:nvSpPr>
+        <p:spPr/>
+        <p:txBody>
+          <a:bodyPr>
+            <a:normAutofit lnSpcReduction="10000"/>
+          </a:bodyPr>
+          <a:lstStyle/>
+          <a:p>
+            <a:r>
+              <a:rPr lang="en-US" b="1" dirty="0"/>
+              <a:t>I want to develop Software!</a:t>
+            </a:r>
+            <a:endParaRPr lang="LID4096" b="1" dirty="0"/>
+          </a:p>
+        </p:txBody>
+      </p:sp>
+      <p:sp>
+        <p:nvSpPr>
+          <p:cNvPr id="9" name="Content Placeholder 8">
+            <a:extLst>
+              <a:ext uri="{FF2B5EF4-FFF2-40B4-BE49-F238E27FC236}">
+                <a16:creationId xmlns:a16="http://schemas.microsoft.com/office/drawing/2014/main" id="{29041B2B-EC9B-41FC-96A0-1DB630288686}"/>
+              </a:ext>
+            </a:extLst>
+          </p:cNvPr>
+          <p:cNvSpPr>
+            <a:spLocks noGrp="1"/>
+          </p:cNvSpPr>
+          <p:nvPr>
+            <p:ph sz="quarter" idx="4"/>
+          </p:nvPr>
+        </p:nvSpPr>
+        <p:spPr/>
+        <p:txBody>
+          <a:bodyPr/>
+          <a:lstStyle/>
+          <a:p>
+            <a:r>
+              <a:rPr lang="en-US" dirty="0"/>
+              <a:t>You have already made the decision to get into tech and software development</a:t>
+            </a:r>
+          </a:p>
+          <a:p>
+            <a:r>
+              <a:rPr lang="en-US" dirty="0"/>
+              <a:t>You don’t know where to start or feels overwhelmed by all the possibilities</a:t>
+            </a:r>
+          </a:p>
+          <a:p>
+            <a:r>
+              <a:rPr lang="en-US" dirty="0"/>
+              <a:t>Looking for a challenging but still easy to fellow introduction</a:t>
+            </a:r>
+            <a:endParaRPr lang="LID4096" dirty="0"/>
+          </a:p>
+        </p:txBody>
+      </p:sp>
+      <p:grpSp>
+        <p:nvGrpSpPr>
+          <p:cNvPr id="2" name="Group 1">
+            <a:extLst>
+              <a:ext uri="{FF2B5EF4-FFF2-40B4-BE49-F238E27FC236}">
+                <a16:creationId xmlns:a16="http://schemas.microsoft.com/office/drawing/2014/main" id="{28D28925-96F7-437D-AF24-594666D8407F}"/>
+              </a:ext>
+            </a:extLst>
+          </p:cNvPr>
+          <p:cNvGrpSpPr/>
+          <p:nvPr/>
+        </p:nvGrpSpPr>
+        <p:grpSpPr>
+          <a:xfrm>
+            <a:off x="533400" y="6477000"/>
+            <a:ext cx="11658600" cy="381000"/>
+            <a:chOff x="533400" y="6477000"/>
+            <a:chExt cx="11658600" cy="381000"/>
+          </a:xfrm>
+        </p:grpSpPr>
+        <p:sp>
+          <p:nvSpPr>
+            <p:cNvPr id="4" name="Rectangle 3">
+              <a:extLst>
+                <a:ext uri="{FF2B5EF4-FFF2-40B4-BE49-F238E27FC236}">
+                  <a16:creationId xmlns:a16="http://schemas.microsoft.com/office/drawing/2014/main" id="{59A71E2A-F204-4E8D-9821-71B26127D41D}"/>
+                </a:ext>
+              </a:extLst>
+            </p:cNvPr>
+            <p:cNvSpPr/>
+            <p:nvPr/>
+          </p:nvSpPr>
+          <p:spPr>
+            <a:xfrm>
+              <a:off x="7086600" y="6477000"/>
+              <a:ext cx="5105400" cy="304800"/>
+            </a:xfrm>
+            <a:prstGeom prst="rect">
+              <a:avLst/>
+            </a:prstGeom>
+            <a:solidFill>
+              <a:schemeClr val="bg1"/>
+            </a:solidFill>
+            <a:ln w="38100">
+              <a:solidFill>
+                <a:schemeClr val="accent4">
+                  <a:lumMod val="75000"/>
+                </a:schemeClr>
+              </a:solidFill>
+            </a:ln>
+          </p:spPr>
+          <p:style>
+            <a:lnRef idx="2">
+              <a:schemeClr val="accent1">
+                <a:shade val="50000"/>
+              </a:schemeClr>
+            </a:lnRef>
+            <a:fillRef idx="1">
+              <a:schemeClr val="accent1"/>
+            </a:fillRef>
+            <a:effectRef idx="0">
+              <a:schemeClr val="accent1"/>
+            </a:effectRef>
+            <a:fontRef idx="minor">
+              <a:schemeClr val="lt1"/>
+            </a:fontRef>
+          </p:style>
+          <p:txBody>
+            <a:bodyPr rtlCol="0" anchor="ctr"/>
+            <a:lstStyle/>
+            <a:p>
+              <a:pPr algn="ctr"/>
+              <a:endParaRPr lang="en-AU"/>
+            </a:p>
+          </p:txBody>
+        </p:sp>
+        <p:sp>
+          <p:nvSpPr>
+            <p:cNvPr id="5" name="Rectangle 4">
+              <a:extLst>
+                <a:ext uri="{FF2B5EF4-FFF2-40B4-BE49-F238E27FC236}">
+                  <a16:creationId xmlns:a16="http://schemas.microsoft.com/office/drawing/2014/main" id="{CBD75A09-7F78-43C6-B6EC-346AA3C08F18}"/>
+                </a:ext>
+              </a:extLst>
+            </p:cNvPr>
+            <p:cNvSpPr/>
+            <p:nvPr/>
+          </p:nvSpPr>
+          <p:spPr>
+            <a:xfrm>
+              <a:off x="7086600" y="6477000"/>
+              <a:ext cx="1066800" cy="304800"/>
+            </a:xfrm>
+            <a:prstGeom prst="rect">
+              <a:avLst/>
+            </a:prstGeom>
+            <a:solidFill>
+              <a:schemeClr val="accent2"/>
+            </a:solidFill>
+            <a:ln w="38100">
+              <a:noFill/>
+            </a:ln>
+          </p:spPr>
+          <p:style>
+            <a:lnRef idx="2">
+              <a:schemeClr val="accent1">
+                <a:shade val="50000"/>
+              </a:schemeClr>
+            </a:lnRef>
+            <a:fillRef idx="1">
+              <a:schemeClr val="accent1"/>
+            </a:fillRef>
+            <a:effectRef idx="0">
+              <a:schemeClr val="accent1"/>
+            </a:effectRef>
+            <a:fontRef idx="minor">
+              <a:schemeClr val="lt1"/>
+            </a:fontRef>
+          </p:style>
+          <p:txBody>
+            <a:bodyPr rtlCol="0" anchor="ctr"/>
+            <a:lstStyle/>
+            <a:p>
+              <a:pPr algn="ctr"/>
+              <a:endParaRPr lang="en-AU" dirty="0"/>
+            </a:p>
+          </p:txBody>
+        </p:sp>
+        <p:sp>
+          <p:nvSpPr>
+            <p:cNvPr id="6" name="TextBox 5">
+              <a:extLst>
+                <a:ext uri="{FF2B5EF4-FFF2-40B4-BE49-F238E27FC236}">
+                  <a16:creationId xmlns:a16="http://schemas.microsoft.com/office/drawing/2014/main" id="{E76387D4-A49E-4A4F-80C2-05DDBC32E7C1}"/>
+                </a:ext>
+              </a:extLst>
+            </p:cNvPr>
+            <p:cNvSpPr txBox="1"/>
+            <p:nvPr/>
+          </p:nvSpPr>
+          <p:spPr>
+            <a:xfrm>
+              <a:off x="533400" y="6488668"/>
+              <a:ext cx="3962400" cy="369332"/>
+            </a:xfrm>
+            <a:prstGeom prst="rect">
+              <a:avLst/>
+            </a:prstGeom>
+            <a:noFill/>
+          </p:spPr>
+          <p:txBody>
+            <a:bodyPr wrap="square" rtlCol="0">
+              <a:spAutoFit/>
+            </a:bodyPr>
+            <a:lstStyle/>
+            <a:p>
+              <a:r>
+                <a:rPr lang="en-US" b="1" dirty="0">
+                  <a:solidFill>
+                    <a:schemeClr val="bg1"/>
+                  </a:solidFill>
+                  <a:latin typeface="Consolas (Headings)"/>
+                </a:rPr>
+                <a:t>Part I: Introduction</a:t>
+              </a:r>
+              <a:endParaRPr lang="en-AU" b="1" dirty="0">
+                <a:solidFill>
+                  <a:schemeClr val="bg1"/>
+                </a:solidFill>
+                <a:latin typeface="Consolas (Headings)"/>
+              </a:endParaRPr>
+            </a:p>
+          </p:txBody>
+        </p:sp>
+      </p:grpSp>
+    </p:spTree>
+    <p:extLst>
+      <p:ext uri="{BB962C8B-B14F-4D97-AF65-F5344CB8AC3E}">
+        <p14:creationId xmlns:p14="http://schemas.microsoft.com/office/powerpoint/2010/main" val="1172941845"/>
+      </p:ext>
+    </p:extLst>
+  </p:cSld>
+  <p:clrMapOvr>
+    <a:masterClrMapping/>
+  </p:clrMapOvr>
+</p:sld>
+</file>
+
+<file path=ppt/slides/slide7.xml><?xml version="1.0" encoding="utf-8"?>
 <p:sld xmlns:a="http://schemas.openxmlformats.org/drawingml/2006/main" xmlns:r="http://schemas.openxmlformats.org/officeDocument/2006/relationships" xmlns:p="http://schemas.openxmlformats.org/presentationml/2006/main">
   <p:cSld>
     <p:spTree>
@@ -12781,7 +14791,7 @@
 </p:sld>
 </file>
 
-<file path=ppt/slides/slide6.xml><?xml version="1.0" encoding="utf-8"?>
+<file path=ppt/slides/slide8.xml><?xml version="1.0" encoding="utf-8"?>
 <p:sld xmlns:a="http://schemas.openxmlformats.org/drawingml/2006/main" xmlns:r="http://schemas.openxmlformats.org/officeDocument/2006/relationships" xmlns:p="http://schemas.openxmlformats.org/presentationml/2006/main">
   <p:cSld>
     <p:spTree>
@@ -12874,55 +14884,41 @@
           <a:p>
             <a:pPr lvl="0"/>
             <a:r>
-              <a:rPr lang="en-US" sz="2400" b="1" dirty="0" err="1"/>
+              <a:rPr lang="en-US" sz="3200" b="1" dirty="0" err="1"/>
               <a:t>Blaz</a:t>
             </a:r>
             <a:r>
-              <a:rPr lang="en-US" dirty="0" err="1"/>
+              <a:rPr lang="en-US" sz="2800" dirty="0" err="1"/>
               <a:t>or</a:t>
             </a:r>
             <a:r>
-              <a:rPr lang="en-US" dirty="0"/>
+              <a:rPr lang="en-US" sz="2800" dirty="0"/>
               <a:t> is web technology from the .NET stack</a:t>
             </a:r>
           </a:p>
           <a:p>
             <a:pPr lvl="0"/>
             <a:r>
-              <a:rPr lang="en-US" dirty="0"/>
+              <a:rPr lang="en-US" sz="2800" dirty="0"/>
               <a:t>.NET is a huge library to build any type of application</a:t>
             </a:r>
           </a:p>
           <a:p>
             <a:pPr lvl="0"/>
             <a:r>
-              <a:rPr lang="en-US" sz="1800" b="1" dirty="0"/>
+              <a:rPr lang="en-US" sz="2400" b="1" dirty="0"/>
               <a:t>Q</a:t>
             </a:r>
             <a:r>
-              <a:rPr lang="en-US" dirty="0"/>
+              <a:rPr lang="en-US" sz="2800" dirty="0"/>
               <a:t> because we are building a quiz</a:t>
             </a:r>
           </a:p>
           <a:p>
             <a:pPr lvl="0"/>
             <a:r>
-              <a:rPr lang="en-US" dirty="0"/>
+              <a:rPr lang="en-US" sz="2800" dirty="0"/>
               <a:t>Starting local, to coach coop, to a online multiplayer version</a:t>
-            </a:r>
-          </a:p>
-          <a:p>
-            <a:pPr lvl="0"/>
-            <a:r>
-              <a:rPr lang="en-US" dirty="0"/>
-              <a:t>I’ve planned 12 episodes so far</a:t>
-            </a:r>
-          </a:p>
-          <a:p>
-            <a:pPr lvl="0"/>
-            <a:r>
-              <a:rPr lang="en-US" dirty="0"/>
-              <a:t>We are working slowly but steady towards understanding basic concepts of software development</a:t>
             </a:r>
           </a:p>
         </p:txBody>
@@ -13115,7 +15111,7 @@
 </p:sld>
 </file>
 
-<file path=ppt/slides/slide7.xml><?xml version="1.0" encoding="utf-8"?>
+<file path=ppt/slides/slide9.xml><?xml version="1.0" encoding="utf-8"?>
 <p:sld xmlns:a="http://schemas.openxmlformats.org/drawingml/2006/main" xmlns:r="http://schemas.openxmlformats.org/officeDocument/2006/relationships" xmlns:p="http://schemas.openxmlformats.org/presentationml/2006/main">
   <p:cSld>
     <p:spTree>
@@ -13137,7 +15133,7 @@
           <p:cNvPr id="2" name="Title 1">
             <a:extLst>
               <a:ext uri="{FF2B5EF4-FFF2-40B4-BE49-F238E27FC236}">
-                <a16:creationId xmlns:a16="http://schemas.microsoft.com/office/drawing/2014/main" id="{F0D94D76-CE3E-4D52-8197-5A3636FF1A91}"/>
+                <a16:creationId xmlns:a16="http://schemas.microsoft.com/office/drawing/2014/main" id="{415E6929-595E-4606-9477-305B50AF6649}"/>
               </a:ext>
             </a:extLst>
           </p:cNvPr>
@@ -13155,7 +15151,7 @@
           <a:p>
             <a:r>
               <a:rPr lang="en-US" dirty="0"/>
-              <a:t>Learning Values</a:t>
+              <a:t>About the game</a:t>
             </a:r>
             <a:endParaRPr lang="LID4096" dirty="0"/>
           </a:p>
@@ -13166,7 +15162,7 @@
           <p:cNvPr id="5" name="Content Placeholder 4">
             <a:extLst>
               <a:ext uri="{FF2B5EF4-FFF2-40B4-BE49-F238E27FC236}">
-                <a16:creationId xmlns:a16="http://schemas.microsoft.com/office/drawing/2014/main" id="{A8B50088-2274-4894-BF55-60209497C6F1}"/>
+                <a16:creationId xmlns:a16="http://schemas.microsoft.com/office/drawing/2014/main" id="{ADCF2EED-5EAF-4214-BB43-CFC9D273DF3B}"/>
               </a:ext>
             </a:extLst>
           </p:cNvPr>
@@ -13179,46 +15175,54 @@
         </p:nvSpPr>
         <p:spPr/>
         <p:txBody>
-          <a:bodyPr/>
+          <a:bodyPr>
+            <a:normAutofit lnSpcReduction="10000"/>
+          </a:bodyPr>
           <a:lstStyle/>
           <a:p>
-            <a:pPr marL="742950" lvl="0" indent="-742950">
-              <a:buFont typeface="+mj-lt"/>
-              <a:buAutoNum type="arabicPeriod"/>
-            </a:pPr>
+            <a:r>
+              <a:rPr lang="en-US" dirty="0" err="1"/>
+              <a:t>BlazQ</a:t>
+            </a:r>
             <a:r>
               <a:rPr lang="en-US" dirty="0"/>
-              <a:t>There are no dump questions</a:t>
-            </a:r>
-          </a:p>
-          <a:p>
-            <a:pPr marL="742950" lvl="0" indent="-742950">
-              <a:buFont typeface="+mj-lt"/>
-              <a:buAutoNum type="arabicPeriod"/>
-            </a:pPr>
+              <a:t> should be a fun quiz</a:t>
+            </a:r>
+          </a:p>
+          <a:p>
+            <a:pPr lvl="1"/>
             <a:r>
               <a:rPr lang="en-US" dirty="0"/>
-              <a:t>I’m not free of error</a:t>
-            </a:r>
-          </a:p>
-          <a:p>
-            <a:pPr marL="742950" lvl="0" indent="-742950">
-              <a:buFont typeface="+mj-lt"/>
-              <a:buAutoNum type="arabicPeriod"/>
-            </a:pPr>
+              <a:t>Taking itself not too serious</a:t>
+            </a:r>
+          </a:p>
+          <a:p>
+            <a:pPr lvl="1"/>
             <a:r>
               <a:rPr lang="en-US" dirty="0"/>
-              <a:t>It’s about learning</a:t>
-            </a:r>
-          </a:p>
-          <a:p>
-            <a:pPr marL="742950" lvl="0" indent="-742950">
-              <a:buFont typeface="+mj-lt"/>
-              <a:buAutoNum type="arabicPeriod"/>
-            </a:pPr>
+              <a:t>You (as a developer) create the questions</a:t>
+            </a:r>
+          </a:p>
+          <a:p>
             <a:r>
               <a:rPr lang="en-US" dirty="0"/>
-              <a:t>Respect</a:t>
+              <a:t>We will add “Jokers” to spice it up</a:t>
+            </a:r>
+          </a:p>
+          <a:p>
+            <a:r>
+              <a:rPr lang="en-US" dirty="0"/>
+              <a:t>You don’t know Jack (YDKJ) is kind of the archetype (</a:t>
+            </a:r>
+            <a:r>
+              <a:rPr lang="en-US" sz="2800" dirty="0">
+                <a:hlinkClick r:id="rId2"/>
+              </a:rPr>
+              <a:t>https://www.youtube.com/watch?v=PrGMnVTnmcU&amp;t=246s</a:t>
+            </a:r>
+            <a:r>
+              <a:rPr lang="en-US" dirty="0"/>
+              <a:t>) </a:t>
             </a:r>
           </a:p>
         </p:txBody>
@@ -13228,7 +15232,7 @@
           <p:cNvPr id="6" name="Group 5">
             <a:extLst>
               <a:ext uri="{FF2B5EF4-FFF2-40B4-BE49-F238E27FC236}">
-                <a16:creationId xmlns:a16="http://schemas.microsoft.com/office/drawing/2014/main" id="{81F12EA8-DBA6-4590-9588-A10371A5C479}"/>
+                <a16:creationId xmlns:a16="http://schemas.microsoft.com/office/drawing/2014/main" id="{D60C645B-D839-4C91-B01C-2ACC33A9B337}"/>
               </a:ext>
             </a:extLst>
           </p:cNvPr>
@@ -13248,7 +15252,7 @@
             <p:cNvPr id="7" name="Rectangle 6">
               <a:extLst>
                 <a:ext uri="{FF2B5EF4-FFF2-40B4-BE49-F238E27FC236}">
-                  <a16:creationId xmlns:a16="http://schemas.microsoft.com/office/drawing/2014/main" id="{797F8AFF-7575-4FC4-B4B3-85987C25D5CF}"/>
+                  <a16:creationId xmlns:a16="http://schemas.microsoft.com/office/drawing/2014/main" id="{10744DE1-1314-45A7-963C-C3F3BB8B11CF}"/>
                 </a:ext>
               </a:extLst>
             </p:cNvPr>
@@ -13304,7 +15308,7 @@
             <p:cNvPr id="8" name="Rectangle 7">
               <a:extLst>
                 <a:ext uri="{FF2B5EF4-FFF2-40B4-BE49-F238E27FC236}">
-                  <a16:creationId xmlns:a16="http://schemas.microsoft.com/office/drawing/2014/main" id="{8432FCE7-DEFB-4002-880C-93EE1E97EDE2}"/>
+                  <a16:creationId xmlns:a16="http://schemas.microsoft.com/office/drawing/2014/main" id="{22CAFF52-8C50-4716-8C17-B3B157C0F945}"/>
                 </a:ext>
               </a:extLst>
             </p:cNvPr>
@@ -13356,7 +15360,7 @@
             <p:cNvPr id="9" name="TextBox 8">
               <a:extLst>
                 <a:ext uri="{FF2B5EF4-FFF2-40B4-BE49-F238E27FC236}">
-                  <a16:creationId xmlns:a16="http://schemas.microsoft.com/office/drawing/2014/main" id="{80DAC672-0B00-4C8B-AD10-28FDA62511F3}"/>
+                  <a16:creationId xmlns:a16="http://schemas.microsoft.com/office/drawing/2014/main" id="{A1D4163A-AC96-4925-B26B-549CCFB5231A}"/>
                 </a:ext>
               </a:extLst>
             </p:cNvPr>
@@ -13401,559 +15405,7 @@
     </p:spTree>
     <p:extLst>
       <p:ext uri="{BB962C8B-B14F-4D97-AF65-F5344CB8AC3E}">
-        <p14:creationId xmlns:p14="http://schemas.microsoft.com/office/powerpoint/2010/main" val="3298022619"/>
-      </p:ext>
-    </p:extLst>
-  </p:cSld>
-  <p:clrMapOvr>
-    <a:masterClrMapping/>
-  </p:clrMapOvr>
-</p:sld>
-</file>
-
-<file path=ppt/slides/slide8.xml><?xml version="1.0" encoding="utf-8"?>
-<p:sld xmlns:a="http://schemas.openxmlformats.org/drawingml/2006/main" xmlns:r="http://schemas.openxmlformats.org/officeDocument/2006/relationships" xmlns:p="http://schemas.openxmlformats.org/presentationml/2006/main">
-  <p:cSld>
-    <p:spTree>
-      <p:nvGrpSpPr>
-        <p:cNvPr id="1" name=""/>
-        <p:cNvGrpSpPr/>
-        <p:nvPr/>
-      </p:nvGrpSpPr>
-      <p:grpSpPr>
-        <a:xfrm>
-          <a:off x="0" y="0"/>
-          <a:ext cx="0" cy="0"/>
-          <a:chOff x="0" y="0"/>
-          <a:chExt cx="0" cy="0"/>
-        </a:xfrm>
-      </p:grpSpPr>
-      <p:sp>
-        <p:nvSpPr>
-          <p:cNvPr id="13" name="Title 12"/>
-          <p:cNvSpPr>
-            <a:spLocks noGrp="1"/>
-          </p:cNvSpPr>
-          <p:nvPr>
-            <p:ph type="title"/>
-          </p:nvPr>
-        </p:nvSpPr>
-        <p:spPr>
-          <a:xfrm>
-            <a:off x="1524000" y="457200"/>
-            <a:ext cx="9144000" cy="1143000"/>
-          </a:xfrm>
-        </p:spPr>
-        <p:txBody>
-          <a:bodyPr/>
-          <a:lstStyle/>
-          <a:p>
-            <a:r>
-              <a:rPr lang="en-US" dirty="0"/>
-              <a:t>Why </a:t>
-            </a:r>
-            <a:r>
-              <a:rPr lang="en-US" dirty="0" err="1"/>
-              <a:t>BlazQ</a:t>
-            </a:r>
-            <a:r>
-              <a:rPr lang="en-US" dirty="0"/>
-              <a:t>?</a:t>
-            </a:r>
-          </a:p>
-        </p:txBody>
-      </p:sp>
-      <p:sp>
-        <p:nvSpPr>
-          <p:cNvPr id="14" name="Content Placeholder 13"/>
-          <p:cNvSpPr>
-            <a:spLocks noGrp="1"/>
-          </p:cNvSpPr>
-          <p:nvPr>
-            <p:ph idx="1"/>
-          </p:nvPr>
-        </p:nvSpPr>
-        <p:spPr>
-          <a:xfrm>
-            <a:off x="1524000" y="1828800"/>
-            <a:ext cx="9144000" cy="4267200"/>
-          </a:xfrm>
-        </p:spPr>
-        <p:txBody>
-          <a:bodyPr/>
-          <a:lstStyle/>
-          <a:p>
-            <a:r>
-              <a:rPr lang="en-US" dirty="0"/>
-              <a:t>I love to develop software</a:t>
-            </a:r>
-          </a:p>
-          <a:p>
-            <a:r>
-              <a:rPr lang="en-US" dirty="0"/>
-              <a:t>I want that others can feel as empowered and “mighty” as I do</a:t>
-            </a:r>
-          </a:p>
-          <a:p>
-            <a:r>
-              <a:rPr lang="en-US" dirty="0" err="1"/>
-              <a:t>BlazQ</a:t>
-            </a:r>
-            <a:r>
-              <a:rPr lang="en-US" dirty="0"/>
-              <a:t> is my contribution to a smooth start on the path towards becoming a software developer </a:t>
-            </a:r>
-          </a:p>
-        </p:txBody>
-      </p:sp>
-      <p:grpSp>
-        <p:nvGrpSpPr>
-          <p:cNvPr id="2" name="Group 1">
-            <a:extLst>
-              <a:ext uri="{FF2B5EF4-FFF2-40B4-BE49-F238E27FC236}">
-                <a16:creationId xmlns:a16="http://schemas.microsoft.com/office/drawing/2014/main" id="{28D28925-96F7-437D-AF24-594666D8407F}"/>
-              </a:ext>
-            </a:extLst>
-          </p:cNvPr>
-          <p:cNvGrpSpPr/>
-          <p:nvPr/>
-        </p:nvGrpSpPr>
-        <p:grpSpPr>
-          <a:xfrm>
-            <a:off x="533400" y="6477000"/>
-            <a:ext cx="11658600" cy="381000"/>
-            <a:chOff x="533400" y="6477000"/>
-            <a:chExt cx="11658600" cy="381000"/>
-          </a:xfrm>
-        </p:grpSpPr>
-        <p:sp>
-          <p:nvSpPr>
-            <p:cNvPr id="4" name="Rectangle 3">
-              <a:extLst>
-                <a:ext uri="{FF2B5EF4-FFF2-40B4-BE49-F238E27FC236}">
-                  <a16:creationId xmlns:a16="http://schemas.microsoft.com/office/drawing/2014/main" id="{59A71E2A-F204-4E8D-9821-71B26127D41D}"/>
-                </a:ext>
-              </a:extLst>
-            </p:cNvPr>
-            <p:cNvSpPr/>
-            <p:nvPr/>
-          </p:nvSpPr>
-          <p:spPr>
-            <a:xfrm>
-              <a:off x="7086600" y="6477000"/>
-              <a:ext cx="5105400" cy="304800"/>
-            </a:xfrm>
-            <a:prstGeom prst="rect">
-              <a:avLst/>
-            </a:prstGeom>
-            <a:solidFill>
-              <a:schemeClr val="bg1"/>
-            </a:solidFill>
-            <a:ln w="38100">
-              <a:solidFill>
-                <a:schemeClr val="accent4">
-                  <a:lumMod val="75000"/>
-                </a:schemeClr>
-              </a:solidFill>
-            </a:ln>
-          </p:spPr>
-          <p:style>
-            <a:lnRef idx="2">
-              <a:schemeClr val="accent1">
-                <a:shade val="50000"/>
-              </a:schemeClr>
-            </a:lnRef>
-            <a:fillRef idx="1">
-              <a:schemeClr val="accent1"/>
-            </a:fillRef>
-            <a:effectRef idx="0">
-              <a:schemeClr val="accent1"/>
-            </a:effectRef>
-            <a:fontRef idx="minor">
-              <a:schemeClr val="lt1"/>
-            </a:fontRef>
-          </p:style>
-          <p:txBody>
-            <a:bodyPr rtlCol="0" anchor="ctr"/>
-            <a:lstStyle/>
-            <a:p>
-              <a:pPr algn="ctr"/>
-              <a:endParaRPr lang="en-AU"/>
-            </a:p>
-          </p:txBody>
-        </p:sp>
-        <p:sp>
-          <p:nvSpPr>
-            <p:cNvPr id="5" name="Rectangle 4">
-              <a:extLst>
-                <a:ext uri="{FF2B5EF4-FFF2-40B4-BE49-F238E27FC236}">
-                  <a16:creationId xmlns:a16="http://schemas.microsoft.com/office/drawing/2014/main" id="{CBD75A09-7F78-43C6-B6EC-346AA3C08F18}"/>
-                </a:ext>
-              </a:extLst>
-            </p:cNvPr>
-            <p:cNvSpPr/>
-            <p:nvPr/>
-          </p:nvSpPr>
-          <p:spPr>
-            <a:xfrm>
-              <a:off x="7086600" y="6477000"/>
-              <a:ext cx="1066800" cy="304800"/>
-            </a:xfrm>
-            <a:prstGeom prst="rect">
-              <a:avLst/>
-            </a:prstGeom>
-            <a:solidFill>
-              <a:schemeClr val="accent2"/>
-            </a:solidFill>
-            <a:ln w="38100">
-              <a:noFill/>
-            </a:ln>
-          </p:spPr>
-          <p:style>
-            <a:lnRef idx="2">
-              <a:schemeClr val="accent1">
-                <a:shade val="50000"/>
-              </a:schemeClr>
-            </a:lnRef>
-            <a:fillRef idx="1">
-              <a:schemeClr val="accent1"/>
-            </a:fillRef>
-            <a:effectRef idx="0">
-              <a:schemeClr val="accent1"/>
-            </a:effectRef>
-            <a:fontRef idx="minor">
-              <a:schemeClr val="lt1"/>
-            </a:fontRef>
-          </p:style>
-          <p:txBody>
-            <a:bodyPr rtlCol="0" anchor="ctr"/>
-            <a:lstStyle/>
-            <a:p>
-              <a:pPr algn="ctr"/>
-              <a:endParaRPr lang="en-AU" dirty="0"/>
-            </a:p>
-          </p:txBody>
-        </p:sp>
-        <p:sp>
-          <p:nvSpPr>
-            <p:cNvPr id="6" name="TextBox 5">
-              <a:extLst>
-                <a:ext uri="{FF2B5EF4-FFF2-40B4-BE49-F238E27FC236}">
-                  <a16:creationId xmlns:a16="http://schemas.microsoft.com/office/drawing/2014/main" id="{E76387D4-A49E-4A4F-80C2-05DDBC32E7C1}"/>
-                </a:ext>
-              </a:extLst>
-            </p:cNvPr>
-            <p:cNvSpPr txBox="1"/>
-            <p:nvPr/>
-          </p:nvSpPr>
-          <p:spPr>
-            <a:xfrm>
-              <a:off x="533400" y="6488668"/>
-              <a:ext cx="3962400" cy="369332"/>
-            </a:xfrm>
-            <a:prstGeom prst="rect">
-              <a:avLst/>
-            </a:prstGeom>
-            <a:noFill/>
-          </p:spPr>
-          <p:txBody>
-            <a:bodyPr wrap="square" rtlCol="0">
-              <a:spAutoFit/>
-            </a:bodyPr>
-            <a:lstStyle/>
-            <a:p>
-              <a:r>
-                <a:rPr lang="en-US" b="1" dirty="0">
-                  <a:solidFill>
-                    <a:schemeClr val="bg1"/>
-                  </a:solidFill>
-                  <a:latin typeface="Consolas (Headings)"/>
-                </a:rPr>
-                <a:t>Part I: Introduction</a:t>
-              </a:r>
-              <a:endParaRPr lang="en-AU" b="1" dirty="0">
-                <a:solidFill>
-                  <a:schemeClr val="bg1"/>
-                </a:solidFill>
-                <a:latin typeface="Consolas (Headings)"/>
-              </a:endParaRPr>
-            </a:p>
-          </p:txBody>
-        </p:sp>
-      </p:grpSp>
-    </p:spTree>
-    <p:extLst>
-      <p:ext uri="{BB962C8B-B14F-4D97-AF65-F5344CB8AC3E}">
-        <p14:creationId xmlns:p14="http://schemas.microsoft.com/office/powerpoint/2010/main" val="832136856"/>
-      </p:ext>
-    </p:extLst>
-  </p:cSld>
-  <p:clrMapOvr>
-    <a:masterClrMapping/>
-  </p:clrMapOvr>
-</p:sld>
-</file>
-
-<file path=ppt/slides/slide9.xml><?xml version="1.0" encoding="utf-8"?>
-<p:sld xmlns:a="http://schemas.openxmlformats.org/drawingml/2006/main" xmlns:r="http://schemas.openxmlformats.org/officeDocument/2006/relationships" xmlns:p="http://schemas.openxmlformats.org/presentationml/2006/main">
-  <p:cSld>
-    <p:spTree>
-      <p:nvGrpSpPr>
-        <p:cNvPr id="1" name=""/>
-        <p:cNvGrpSpPr/>
-        <p:nvPr/>
-      </p:nvGrpSpPr>
-      <p:grpSpPr>
-        <a:xfrm>
-          <a:off x="0" y="0"/>
-          <a:ext cx="0" cy="0"/>
-          <a:chOff x="0" y="0"/>
-          <a:chExt cx="0" cy="0"/>
-        </a:xfrm>
-      </p:grpSpPr>
-      <p:sp>
-        <p:nvSpPr>
-          <p:cNvPr id="13" name="Title 12"/>
-          <p:cNvSpPr>
-            <a:spLocks noGrp="1"/>
-          </p:cNvSpPr>
-          <p:nvPr>
-            <p:ph type="title"/>
-          </p:nvPr>
-        </p:nvSpPr>
-        <p:spPr>
-          <a:xfrm>
-            <a:off x="1524000" y="457200"/>
-            <a:ext cx="9144000" cy="1143000"/>
-          </a:xfrm>
-        </p:spPr>
-        <p:txBody>
-          <a:bodyPr/>
-          <a:lstStyle/>
-          <a:p>
-            <a:r>
-              <a:rPr lang="en-US" b="1" dirty="0"/>
-              <a:t>Learning Mode</a:t>
-            </a:r>
-          </a:p>
-        </p:txBody>
-      </p:sp>
-      <p:sp>
-        <p:nvSpPr>
-          <p:cNvPr id="14" name="Content Placeholder 13"/>
-          <p:cNvSpPr>
-            <a:spLocks noGrp="1"/>
-          </p:cNvSpPr>
-          <p:nvPr>
-            <p:ph idx="1"/>
-          </p:nvPr>
-        </p:nvSpPr>
-        <p:spPr>
-          <a:xfrm>
-            <a:off x="1524000" y="1828800"/>
-            <a:ext cx="9144000" cy="4267200"/>
-          </a:xfrm>
-        </p:spPr>
-        <p:txBody>
-          <a:bodyPr>
-            <a:normAutofit/>
-          </a:bodyPr>
-          <a:lstStyle/>
-          <a:p>
-            <a:pPr lvl="0"/>
-            <a:r>
-              <a:rPr lang="en-US" dirty="0"/>
-              <a:t>I strongly recommend to focus on understanding during listening</a:t>
-            </a:r>
-          </a:p>
-          <a:p>
-            <a:pPr lvl="0"/>
-            <a:r>
-              <a:rPr lang="en-US" dirty="0"/>
-              <a:t>Practice by yourself a time convenient for you</a:t>
-            </a:r>
-          </a:p>
-        </p:txBody>
-      </p:sp>
-      <p:grpSp>
-        <p:nvGrpSpPr>
-          <p:cNvPr id="9" name="Group 8">
-            <a:extLst>
-              <a:ext uri="{FF2B5EF4-FFF2-40B4-BE49-F238E27FC236}">
-                <a16:creationId xmlns:a16="http://schemas.microsoft.com/office/drawing/2014/main" id="{710A6B04-29E5-4DE4-A581-1F25FDC346CE}"/>
-              </a:ext>
-            </a:extLst>
-          </p:cNvPr>
-          <p:cNvGrpSpPr/>
-          <p:nvPr/>
-        </p:nvGrpSpPr>
-        <p:grpSpPr>
-          <a:xfrm>
-            <a:off x="533400" y="6477000"/>
-            <a:ext cx="11658600" cy="381000"/>
-            <a:chOff x="533400" y="6477000"/>
-            <a:chExt cx="11658600" cy="381000"/>
-          </a:xfrm>
-        </p:grpSpPr>
-        <p:sp>
-          <p:nvSpPr>
-            <p:cNvPr id="10" name="Rectangle 9">
-              <a:extLst>
-                <a:ext uri="{FF2B5EF4-FFF2-40B4-BE49-F238E27FC236}">
-                  <a16:creationId xmlns:a16="http://schemas.microsoft.com/office/drawing/2014/main" id="{3BE32A7E-60D9-4728-B73C-652AA397DE41}"/>
-                </a:ext>
-              </a:extLst>
-            </p:cNvPr>
-            <p:cNvSpPr/>
-            <p:nvPr/>
-          </p:nvSpPr>
-          <p:spPr>
-            <a:xfrm>
-              <a:off x="7086600" y="6477000"/>
-              <a:ext cx="5105400" cy="304800"/>
-            </a:xfrm>
-            <a:prstGeom prst="rect">
-              <a:avLst/>
-            </a:prstGeom>
-            <a:solidFill>
-              <a:schemeClr val="bg1"/>
-            </a:solidFill>
-            <a:ln w="38100">
-              <a:solidFill>
-                <a:schemeClr val="accent4">
-                  <a:lumMod val="75000"/>
-                </a:schemeClr>
-              </a:solidFill>
-            </a:ln>
-          </p:spPr>
-          <p:style>
-            <a:lnRef idx="2">
-              <a:schemeClr val="accent1">
-                <a:shade val="50000"/>
-              </a:schemeClr>
-            </a:lnRef>
-            <a:fillRef idx="1">
-              <a:schemeClr val="accent1"/>
-            </a:fillRef>
-            <a:effectRef idx="0">
-              <a:schemeClr val="accent1"/>
-            </a:effectRef>
-            <a:fontRef idx="minor">
-              <a:schemeClr val="lt1"/>
-            </a:fontRef>
-          </p:style>
-          <p:txBody>
-            <a:bodyPr rtlCol="0" anchor="ctr"/>
-            <a:lstStyle/>
-            <a:p>
-              <a:pPr algn="ctr"/>
-              <a:endParaRPr lang="en-AU"/>
-            </a:p>
-          </p:txBody>
-        </p:sp>
-        <p:sp>
-          <p:nvSpPr>
-            <p:cNvPr id="11" name="Rectangle 10">
-              <a:extLst>
-                <a:ext uri="{FF2B5EF4-FFF2-40B4-BE49-F238E27FC236}">
-                  <a16:creationId xmlns:a16="http://schemas.microsoft.com/office/drawing/2014/main" id="{B9AF97B4-5DB7-4C7D-9DDD-CD7A545676AE}"/>
-                </a:ext>
-              </a:extLst>
-            </p:cNvPr>
-            <p:cNvSpPr/>
-            <p:nvPr/>
-          </p:nvSpPr>
-          <p:spPr>
-            <a:xfrm>
-              <a:off x="7086600" y="6477000"/>
-              <a:ext cx="1066800" cy="304800"/>
-            </a:xfrm>
-            <a:prstGeom prst="rect">
-              <a:avLst/>
-            </a:prstGeom>
-            <a:solidFill>
-              <a:schemeClr val="accent2"/>
-            </a:solidFill>
-            <a:ln w="38100">
-              <a:noFill/>
-            </a:ln>
-          </p:spPr>
-          <p:style>
-            <a:lnRef idx="2">
-              <a:schemeClr val="accent1">
-                <a:shade val="50000"/>
-              </a:schemeClr>
-            </a:lnRef>
-            <a:fillRef idx="1">
-              <a:schemeClr val="accent1"/>
-            </a:fillRef>
-            <a:effectRef idx="0">
-              <a:schemeClr val="accent1"/>
-            </a:effectRef>
-            <a:fontRef idx="minor">
-              <a:schemeClr val="lt1"/>
-            </a:fontRef>
-          </p:style>
-          <p:txBody>
-            <a:bodyPr rtlCol="0" anchor="ctr"/>
-            <a:lstStyle/>
-            <a:p>
-              <a:pPr algn="ctr"/>
-              <a:endParaRPr lang="en-AU" dirty="0"/>
-            </a:p>
-          </p:txBody>
-        </p:sp>
-        <p:sp>
-          <p:nvSpPr>
-            <p:cNvPr id="12" name="TextBox 11">
-              <a:extLst>
-                <a:ext uri="{FF2B5EF4-FFF2-40B4-BE49-F238E27FC236}">
-                  <a16:creationId xmlns:a16="http://schemas.microsoft.com/office/drawing/2014/main" id="{79E7F918-127A-4907-A220-B9A02895E607}"/>
-                </a:ext>
-              </a:extLst>
-            </p:cNvPr>
-            <p:cNvSpPr txBox="1"/>
-            <p:nvPr/>
-          </p:nvSpPr>
-          <p:spPr>
-            <a:xfrm>
-              <a:off x="533400" y="6488668"/>
-              <a:ext cx="3962400" cy="369332"/>
-            </a:xfrm>
-            <a:prstGeom prst="rect">
-              <a:avLst/>
-            </a:prstGeom>
-            <a:noFill/>
-          </p:spPr>
-          <p:txBody>
-            <a:bodyPr wrap="square" rtlCol="0">
-              <a:spAutoFit/>
-            </a:bodyPr>
-            <a:lstStyle/>
-            <a:p>
-              <a:r>
-                <a:rPr lang="en-US" b="1" dirty="0">
-                  <a:solidFill>
-                    <a:schemeClr val="bg1"/>
-                  </a:solidFill>
-                  <a:latin typeface="Consolas (Headings)"/>
-                </a:rPr>
-                <a:t>Part I: Introduction</a:t>
-              </a:r>
-              <a:endParaRPr lang="en-AU" b="1" dirty="0">
-                <a:solidFill>
-                  <a:schemeClr val="bg1"/>
-                </a:solidFill>
-                <a:latin typeface="Consolas (Headings)"/>
-              </a:endParaRPr>
-            </a:p>
-          </p:txBody>
-        </p:sp>
-      </p:grpSp>
-    </p:spTree>
-    <p:extLst>
-      <p:ext uri="{BB962C8B-B14F-4D97-AF65-F5344CB8AC3E}">
-        <p14:creationId xmlns:p14="http://schemas.microsoft.com/office/powerpoint/2010/main" val="1998565245"/>
+        <p14:creationId xmlns:p14="http://schemas.microsoft.com/office/powerpoint/2010/main" val="715979431"/>
       </p:ext>
     </p:extLst>
   </p:cSld>

</xml_diff>

<commit_message>
improvment slides episode 1
</commit_message>
<xml_diff>
--- a/episode1/media/slides-episode-1.pptx
+++ b/episode1/media/slides-episode-1.pptx
@@ -6,10 +6,10 @@
     <p:sldMasterId id="2147483648" r:id="rId2"/>
   </p:sldMasterIdLst>
   <p:notesMasterIdLst>
-    <p:notesMasterId r:id="rId40"/>
+    <p:notesMasterId r:id="rId42"/>
   </p:notesMasterIdLst>
   <p:handoutMasterIdLst>
-    <p:handoutMasterId r:id="rId41"/>
+    <p:handoutMasterId r:id="rId43"/>
   </p:handoutMasterIdLst>
   <p:sldIdLst>
     <p:sldId id="256" r:id="rId3"/>
@@ -46,9 +46,11 @@
     <p:sldId id="301" r:id="rId34"/>
     <p:sldId id="302" r:id="rId35"/>
     <p:sldId id="306" r:id="rId36"/>
-    <p:sldId id="303" r:id="rId37"/>
-    <p:sldId id="304" r:id="rId38"/>
-    <p:sldId id="305" r:id="rId39"/>
+    <p:sldId id="312" r:id="rId37"/>
+    <p:sldId id="313" r:id="rId38"/>
+    <p:sldId id="303" r:id="rId39"/>
+    <p:sldId id="304" r:id="rId40"/>
+    <p:sldId id="305" r:id="rId41"/>
   </p:sldIdLst>
   <p:sldSz cx="12192000" cy="6858000"/>
   <p:notesSz cx="6858000" cy="9144000"/>
@@ -251,7 +253,7 @@
           <a:p>
             <a:fld id="{762B48F5-BACC-47D6-A0F7-82FBF9C6BC85}" type="datetimeFigureOut">
               <a:rPr lang="en-US"/>
-              <a:t>1/5/2021</a:t>
+              <a:t>1/10/2021</a:t>
             </a:fld>
             <a:endParaRPr/>
           </a:p>
@@ -416,7 +418,7 @@
           <a:p>
             <a:fld id="{0CB1CD00-5424-4675-AB18-2C419B060449}" type="datetimeFigureOut">
               <a:rPr lang="en-US"/>
-              <a:t>1/5/2021</a:t>
+              <a:t>1/10/2021</a:t>
             </a:fld>
             <a:endParaRPr/>
           </a:p>
@@ -2142,7 +2144,7 @@
           <a:p>
             <a:fld id="{37CC0096-1860-4642-9CD2-0079EA5E7CD1}" type="datetimeFigureOut">
               <a:rPr lang="en-US" smtClean="0"/>
-              <a:t>1/5/2021</a:t>
+              <a:t>1/10/2021</a:t>
             </a:fld>
             <a:endParaRPr lang="en-US"/>
           </a:p>
@@ -2453,7 +2455,7 @@
           <a:p>
             <a:fld id="{37CC0096-1860-4642-9CD2-0079EA5E7CD1}" type="datetimeFigureOut">
               <a:rPr lang="en-US" smtClean="0"/>
-              <a:t>1/5/2021</a:t>
+              <a:t>1/10/2021</a:t>
             </a:fld>
             <a:endParaRPr lang="en-US"/>
           </a:p>
@@ -2622,7 +2624,7 @@
           <a:p>
             <a:fld id="{37CC0096-1860-4642-9CD2-0079EA5E7CD1}" type="datetimeFigureOut">
               <a:rPr lang="en-US" smtClean="0"/>
-              <a:t>1/5/2021</a:t>
+              <a:t>1/10/2021</a:t>
             </a:fld>
             <a:endParaRPr lang="en-US"/>
           </a:p>
@@ -2801,7 +2803,7 @@
           <a:p>
             <a:fld id="{37CC0096-1860-4642-9CD2-0079EA5E7CD1}" type="datetimeFigureOut">
               <a:rPr lang="en-US" smtClean="0"/>
-              <a:t>1/5/2021</a:t>
+              <a:t>1/10/2021</a:t>
             </a:fld>
             <a:endParaRPr lang="en-US"/>
           </a:p>
@@ -3092,7 +3094,7 @@
           <a:p>
             <a:fld id="{37CC0096-1860-4642-9CD2-0079EA5E7CD1}" type="datetimeFigureOut">
               <a:rPr lang="en-US" smtClean="0"/>
-              <a:t>1/5/2021</a:t>
+              <a:t>1/10/2021</a:t>
             </a:fld>
             <a:endParaRPr lang="en-US"/>
           </a:p>
@@ -3519,7 +3521,7 @@
           <a:p>
             <a:fld id="{37CC0096-1860-4642-9CD2-0079EA5E7CD1}" type="datetimeFigureOut">
               <a:rPr lang="en-US" smtClean="0"/>
-              <a:t>1/5/2021</a:t>
+              <a:t>1/10/2021</a:t>
             </a:fld>
             <a:endParaRPr lang="en-US"/>
           </a:p>
@@ -3952,7 +3954,7 @@
           <a:p>
             <a:fld id="{37CC0096-1860-4642-9CD2-0079EA5E7CD1}" type="datetimeFigureOut">
               <a:rPr lang="en-US" smtClean="0"/>
-              <a:t>1/5/2021</a:t>
+              <a:t>1/10/2021</a:t>
             </a:fld>
             <a:endParaRPr lang="en-US"/>
           </a:p>
@@ -4391,7 +4393,7 @@
           <a:p>
             <a:fld id="{37CC0096-1860-4642-9CD2-0079EA5E7CD1}" type="datetimeFigureOut">
               <a:rPr lang="en-US" smtClean="0"/>
-              <a:t>1/5/2021</a:t>
+              <a:t>1/10/2021</a:t>
             </a:fld>
             <a:endParaRPr lang="en-US"/>
           </a:p>
@@ -4508,7 +4510,7 @@
           <a:p>
             <a:fld id="{37CC0096-1860-4642-9CD2-0079EA5E7CD1}" type="datetimeFigureOut">
               <a:rPr lang="en-US" smtClean="0"/>
-              <a:t>1/5/2021</a:t>
+              <a:t>1/10/2021</a:t>
             </a:fld>
             <a:endParaRPr lang="en-US"/>
           </a:p>
@@ -4603,7 +4605,7 @@
           <a:p>
             <a:fld id="{37CC0096-1860-4642-9CD2-0079EA5E7CD1}" type="datetimeFigureOut">
               <a:rPr lang="en-US" smtClean="0"/>
-              <a:t>1/5/2021</a:t>
+              <a:t>1/10/2021</a:t>
             </a:fld>
             <a:endParaRPr lang="en-US"/>
           </a:p>
@@ -4815,7 +4817,7 @@
           <a:p>
             <a:fld id="{9420A81C-88FD-4BBC-9AC4-0552DE3F24E8}" type="datetimeFigureOut">
               <a:rPr lang="LID4096" smtClean="0"/>
-              <a:t>01/05/2021</a:t>
+              <a:t>01/10/2021</a:t>
             </a:fld>
             <a:endParaRPr lang="LID4096"/>
           </a:p>
@@ -5399,7 +5401,7 @@
             <a:fld id="{37CC0096-1860-4642-9CD2-0079EA5E7CD1}" type="datetimeFigureOut">
               <a:rPr lang="en-US" smtClean="0"/>
               <a:pPr/>
-              <a:t>1/5/2021</a:t>
+              <a:t>1/10/2021</a:t>
             </a:fld>
             <a:endParaRPr lang="en-US"/>
           </a:p>
@@ -12693,6 +12695,715 @@
           <a:p>
             <a:r>
               <a:rPr lang="de-DE" dirty="0"/>
+              <a:t>The </a:t>
+            </a:r>
+            <a:r>
+              <a:rPr lang="de-DE" dirty="0" err="1"/>
+              <a:t>session</a:t>
+            </a:r>
+            <a:r>
+              <a:rPr lang="de-DE" dirty="0"/>
+              <a:t> plan – I </a:t>
+            </a:r>
+            <a:endParaRPr lang="LID4096" dirty="0"/>
+          </a:p>
+        </p:txBody>
+      </p:sp>
+      <p:sp>
+        <p:nvSpPr>
+          <p:cNvPr id="3" name="Content Placeholder 2">
+            <a:extLst>
+              <a:ext uri="{FF2B5EF4-FFF2-40B4-BE49-F238E27FC236}">
+                <a16:creationId xmlns:a16="http://schemas.microsoft.com/office/drawing/2014/main" id="{C46B2B66-3B8D-402C-84FC-C6B40F8D2E0C}"/>
+              </a:ext>
+            </a:extLst>
+          </p:cNvPr>
+          <p:cNvSpPr>
+            <a:spLocks noGrp="1"/>
+          </p:cNvSpPr>
+          <p:nvPr>
+            <p:ph idx="1"/>
+          </p:nvPr>
+        </p:nvSpPr>
+        <p:spPr/>
+        <p:txBody>
+          <a:bodyPr>
+            <a:normAutofit fontScale="70000" lnSpcReduction="20000"/>
+          </a:bodyPr>
+          <a:lstStyle/>
+          <a:p>
+            <a:r>
+              <a:rPr lang="en-US" sz="3200" dirty="0"/>
+              <a:t>Building the shell of </a:t>
+            </a:r>
+            <a:r>
+              <a:rPr lang="en-US" sz="3200" dirty="0" err="1"/>
+              <a:t>BlazQ</a:t>
+            </a:r>
+            <a:r>
+              <a:rPr lang="en-US" sz="3200" dirty="0"/>
+              <a:t>: </a:t>
+            </a:r>
+          </a:p>
+          <a:p>
+            <a:pPr lvl="1"/>
+            <a:r>
+              <a:rPr lang="en-US" sz="2800" dirty="0"/>
+              <a:t>Start your first project and build the foundation for </a:t>
+            </a:r>
+            <a:r>
+              <a:rPr lang="en-US" sz="2800" dirty="0" err="1"/>
+              <a:t>BlazQ</a:t>
+            </a:r>
+            <a:r>
+              <a:rPr lang="en-US" sz="2800" dirty="0"/>
+              <a:t> single player mode</a:t>
+            </a:r>
+          </a:p>
+          <a:p>
+            <a:r>
+              <a:rPr lang="en-US" sz="3200" dirty="0"/>
+              <a:t>Prettifying </a:t>
+            </a:r>
+            <a:r>
+              <a:rPr lang="en-US" sz="3200" dirty="0" err="1"/>
+              <a:t>BlazQ</a:t>
+            </a:r>
+            <a:endParaRPr lang="en-US" sz="3200" dirty="0"/>
+          </a:p>
+          <a:p>
+            <a:pPr lvl="1"/>
+            <a:r>
+              <a:rPr lang="en-US" sz="2800" dirty="0"/>
+              <a:t>Implementing the design</a:t>
+            </a:r>
+          </a:p>
+          <a:p>
+            <a:r>
+              <a:rPr lang="en-US" sz="3200" dirty="0"/>
+              <a:t>Coach Coop</a:t>
+            </a:r>
+          </a:p>
+          <a:p>
+            <a:pPr lvl="1"/>
+            <a:r>
+              <a:rPr lang="en-US" sz="2800" dirty="0"/>
+              <a:t>Adding multiple players that can play locally</a:t>
+            </a:r>
+          </a:p>
+          <a:p>
+            <a:r>
+              <a:rPr lang="en-US" sz="3200" dirty="0"/>
+              <a:t>Uprising of the Jokers</a:t>
+            </a:r>
+          </a:p>
+          <a:p>
+            <a:pPr lvl="1"/>
+            <a:r>
+              <a:rPr lang="en-US" sz="2800" dirty="0"/>
+              <a:t>Add more elements to the game</a:t>
+            </a:r>
+          </a:p>
+          <a:p>
+            <a:r>
+              <a:rPr lang="en-US" sz="3200" dirty="0"/>
+              <a:t>Go live</a:t>
+            </a:r>
+          </a:p>
+          <a:p>
+            <a:pPr lvl="1"/>
+            <a:r>
+              <a:rPr lang="en-US" sz="2800" dirty="0"/>
+              <a:t>Finishing touches and deploy the </a:t>
+            </a:r>
+            <a:r>
+              <a:rPr lang="en-US" sz="2800" dirty="0" err="1"/>
+              <a:t>appliaction</a:t>
+            </a:r>
+            <a:r>
+              <a:rPr lang="en-US" sz="2800" dirty="0"/>
+              <a:t>, so that everyone in the world can use it</a:t>
+            </a:r>
+          </a:p>
+        </p:txBody>
+      </p:sp>
+      <p:grpSp>
+        <p:nvGrpSpPr>
+          <p:cNvPr id="4" name="Group 3">
+            <a:extLst>
+              <a:ext uri="{FF2B5EF4-FFF2-40B4-BE49-F238E27FC236}">
+                <a16:creationId xmlns:a16="http://schemas.microsoft.com/office/drawing/2014/main" id="{F27F823C-283E-4459-A359-B8E4CD8FAFCC}"/>
+              </a:ext>
+            </a:extLst>
+          </p:cNvPr>
+          <p:cNvGrpSpPr/>
+          <p:nvPr/>
+        </p:nvGrpSpPr>
+        <p:grpSpPr>
+          <a:xfrm>
+            <a:off x="533400" y="6477000"/>
+            <a:ext cx="11658600" cy="381000"/>
+            <a:chOff x="533400" y="6477000"/>
+            <a:chExt cx="11658600" cy="381000"/>
+          </a:xfrm>
+        </p:grpSpPr>
+        <p:sp>
+          <p:nvSpPr>
+            <p:cNvPr id="5" name="Rectangle 4">
+              <a:extLst>
+                <a:ext uri="{FF2B5EF4-FFF2-40B4-BE49-F238E27FC236}">
+                  <a16:creationId xmlns:a16="http://schemas.microsoft.com/office/drawing/2014/main" id="{05039F3F-2188-4711-812C-E813C395970A}"/>
+                </a:ext>
+              </a:extLst>
+            </p:cNvPr>
+            <p:cNvSpPr/>
+            <p:nvPr/>
+          </p:nvSpPr>
+          <p:spPr>
+            <a:xfrm>
+              <a:off x="7086600" y="6477000"/>
+              <a:ext cx="5105400" cy="304800"/>
+            </a:xfrm>
+            <a:prstGeom prst="rect">
+              <a:avLst/>
+            </a:prstGeom>
+            <a:solidFill>
+              <a:schemeClr val="bg1"/>
+            </a:solidFill>
+            <a:ln w="38100">
+              <a:solidFill>
+                <a:schemeClr val="accent4">
+                  <a:lumMod val="75000"/>
+                </a:schemeClr>
+              </a:solidFill>
+            </a:ln>
+          </p:spPr>
+          <p:style>
+            <a:lnRef idx="2">
+              <a:schemeClr val="accent1">
+                <a:shade val="50000"/>
+              </a:schemeClr>
+            </a:lnRef>
+            <a:fillRef idx="1">
+              <a:schemeClr val="accent1"/>
+            </a:fillRef>
+            <a:effectRef idx="0">
+              <a:schemeClr val="accent1"/>
+            </a:effectRef>
+            <a:fontRef idx="minor">
+              <a:schemeClr val="lt1"/>
+            </a:fontRef>
+          </p:style>
+          <p:txBody>
+            <a:bodyPr rtlCol="0" anchor="ctr"/>
+            <a:lstStyle/>
+            <a:p>
+              <a:pPr algn="ctr"/>
+              <a:endParaRPr lang="en-AU"/>
+            </a:p>
+          </p:txBody>
+        </p:sp>
+        <p:sp>
+          <p:nvSpPr>
+            <p:cNvPr id="6" name="Rectangle 5">
+              <a:extLst>
+                <a:ext uri="{FF2B5EF4-FFF2-40B4-BE49-F238E27FC236}">
+                  <a16:creationId xmlns:a16="http://schemas.microsoft.com/office/drawing/2014/main" id="{BE32812F-3025-4696-99E4-5AB3094B4D59}"/>
+                </a:ext>
+              </a:extLst>
+            </p:cNvPr>
+            <p:cNvSpPr/>
+            <p:nvPr/>
+          </p:nvSpPr>
+          <p:spPr>
+            <a:xfrm>
+              <a:off x="7086600" y="6477000"/>
+              <a:ext cx="5105400" cy="304800"/>
+            </a:xfrm>
+            <a:prstGeom prst="rect">
+              <a:avLst/>
+            </a:prstGeom>
+            <a:solidFill>
+              <a:schemeClr val="accent2"/>
+            </a:solidFill>
+            <a:ln w="38100">
+              <a:noFill/>
+            </a:ln>
+          </p:spPr>
+          <p:style>
+            <a:lnRef idx="2">
+              <a:schemeClr val="accent1">
+                <a:shade val="50000"/>
+              </a:schemeClr>
+            </a:lnRef>
+            <a:fillRef idx="1">
+              <a:schemeClr val="accent1"/>
+            </a:fillRef>
+            <a:effectRef idx="0">
+              <a:schemeClr val="accent1"/>
+            </a:effectRef>
+            <a:fontRef idx="minor">
+              <a:schemeClr val="lt1"/>
+            </a:fontRef>
+          </p:style>
+          <p:txBody>
+            <a:bodyPr rtlCol="0" anchor="ctr"/>
+            <a:lstStyle/>
+            <a:p>
+              <a:pPr algn="ctr"/>
+              <a:endParaRPr lang="en-AU" dirty="0"/>
+            </a:p>
+          </p:txBody>
+        </p:sp>
+        <p:sp>
+          <p:nvSpPr>
+            <p:cNvPr id="7" name="TextBox 6">
+              <a:extLst>
+                <a:ext uri="{FF2B5EF4-FFF2-40B4-BE49-F238E27FC236}">
+                  <a16:creationId xmlns:a16="http://schemas.microsoft.com/office/drawing/2014/main" id="{361553E1-8AC3-4D1F-BC04-D70F65BB2741}"/>
+                </a:ext>
+              </a:extLst>
+            </p:cNvPr>
+            <p:cNvSpPr txBox="1"/>
+            <p:nvPr/>
+          </p:nvSpPr>
+          <p:spPr>
+            <a:xfrm>
+              <a:off x="533400" y="6488668"/>
+              <a:ext cx="3962400" cy="369332"/>
+            </a:xfrm>
+            <a:prstGeom prst="rect">
+              <a:avLst/>
+            </a:prstGeom>
+            <a:noFill/>
+          </p:spPr>
+          <p:txBody>
+            <a:bodyPr wrap="square" rtlCol="0">
+              <a:spAutoFit/>
+            </a:bodyPr>
+            <a:lstStyle/>
+            <a:p>
+              <a:r>
+                <a:rPr lang="en-US" b="1" dirty="0">
+                  <a:solidFill>
+                    <a:schemeClr val="bg1"/>
+                  </a:solidFill>
+                  <a:latin typeface="Consolas (Headings)"/>
+                </a:rPr>
+                <a:t>Part IV: Debrief</a:t>
+              </a:r>
+              <a:endParaRPr lang="en-AU" b="1" dirty="0">
+                <a:solidFill>
+                  <a:schemeClr val="bg1"/>
+                </a:solidFill>
+                <a:latin typeface="Consolas (Headings)"/>
+              </a:endParaRPr>
+            </a:p>
+          </p:txBody>
+        </p:sp>
+      </p:grpSp>
+    </p:spTree>
+    <p:extLst>
+      <p:ext uri="{BB962C8B-B14F-4D97-AF65-F5344CB8AC3E}">
+        <p14:creationId xmlns:p14="http://schemas.microsoft.com/office/powerpoint/2010/main" val="2351237971"/>
+      </p:ext>
+    </p:extLst>
+  </p:cSld>
+  <p:clrMapOvr>
+    <a:masterClrMapping/>
+  </p:clrMapOvr>
+</p:sld>
+</file>
+
+<file path=ppt/slides/slide36.xml><?xml version="1.0" encoding="utf-8"?>
+<p:sld xmlns:a="http://schemas.openxmlformats.org/drawingml/2006/main" xmlns:r="http://schemas.openxmlformats.org/officeDocument/2006/relationships" xmlns:p="http://schemas.openxmlformats.org/presentationml/2006/main">
+  <p:cSld>
+    <p:spTree>
+      <p:nvGrpSpPr>
+        <p:cNvPr id="1" name=""/>
+        <p:cNvGrpSpPr/>
+        <p:nvPr/>
+      </p:nvGrpSpPr>
+      <p:grpSpPr>
+        <a:xfrm>
+          <a:off x="0" y="0"/>
+          <a:ext cx="0" cy="0"/>
+          <a:chOff x="0" y="0"/>
+          <a:chExt cx="0" cy="0"/>
+        </a:xfrm>
+      </p:grpSpPr>
+      <p:sp>
+        <p:nvSpPr>
+          <p:cNvPr id="2" name="Title 1">
+            <a:extLst>
+              <a:ext uri="{FF2B5EF4-FFF2-40B4-BE49-F238E27FC236}">
+                <a16:creationId xmlns:a16="http://schemas.microsoft.com/office/drawing/2014/main" id="{BF06B1E5-4E0C-4BDA-B358-DCBFB8B5DE51}"/>
+              </a:ext>
+            </a:extLst>
+          </p:cNvPr>
+          <p:cNvSpPr>
+            <a:spLocks noGrp="1"/>
+          </p:cNvSpPr>
+          <p:nvPr>
+            <p:ph type="title"/>
+          </p:nvPr>
+        </p:nvSpPr>
+        <p:spPr/>
+        <p:txBody>
+          <a:bodyPr/>
+          <a:lstStyle/>
+          <a:p>
+            <a:r>
+              <a:rPr lang="de-DE" dirty="0"/>
+              <a:t>The </a:t>
+            </a:r>
+            <a:r>
+              <a:rPr lang="de-DE" dirty="0" err="1"/>
+              <a:t>session</a:t>
+            </a:r>
+            <a:r>
+              <a:rPr lang="de-DE" dirty="0"/>
+              <a:t> plan – II </a:t>
+            </a:r>
+            <a:endParaRPr lang="LID4096" dirty="0"/>
+          </a:p>
+        </p:txBody>
+      </p:sp>
+      <p:sp>
+        <p:nvSpPr>
+          <p:cNvPr id="3" name="Content Placeholder 2">
+            <a:extLst>
+              <a:ext uri="{FF2B5EF4-FFF2-40B4-BE49-F238E27FC236}">
+                <a16:creationId xmlns:a16="http://schemas.microsoft.com/office/drawing/2014/main" id="{C46B2B66-3B8D-402C-84FC-C6B40F8D2E0C}"/>
+              </a:ext>
+            </a:extLst>
+          </p:cNvPr>
+          <p:cNvSpPr>
+            <a:spLocks noGrp="1"/>
+          </p:cNvSpPr>
+          <p:nvPr>
+            <p:ph idx="1"/>
+          </p:nvPr>
+        </p:nvSpPr>
+        <p:spPr/>
+        <p:txBody>
+          <a:bodyPr>
+            <a:normAutofit fontScale="70000" lnSpcReduction="20000"/>
+          </a:bodyPr>
+          <a:lstStyle/>
+          <a:p>
+            <a:r>
+              <a:rPr lang="en-US" sz="3200" dirty="0"/>
+              <a:t>Be seated in the lobby</a:t>
+            </a:r>
+          </a:p>
+          <a:p>
+            <a:pPr lvl="1"/>
+            <a:r>
+              <a:rPr lang="en-US" sz="2800" dirty="0"/>
+              <a:t>First step in the multiplayer domain</a:t>
+            </a:r>
+          </a:p>
+          <a:p>
+            <a:r>
+              <a:rPr lang="en-US" dirty="0" err="1"/>
+              <a:t>BlazQ</a:t>
+            </a:r>
+            <a:r>
+              <a:rPr lang="en-US" dirty="0"/>
+              <a:t> goes Multiplayer</a:t>
+            </a:r>
+          </a:p>
+          <a:p>
+            <a:pPr lvl="1"/>
+            <a:r>
+              <a:rPr lang="en-US" dirty="0"/>
+              <a:t>Adding the mechanics for the multiplayer option</a:t>
+            </a:r>
+          </a:p>
+          <a:p>
+            <a:r>
+              <a:rPr lang="en-US" dirty="0"/>
+              <a:t>The hall of knowledge</a:t>
+            </a:r>
+          </a:p>
+          <a:p>
+            <a:pPr lvl="1"/>
+            <a:r>
+              <a:rPr lang="en-US" dirty="0"/>
+              <a:t>Persisting a high score and more</a:t>
+            </a:r>
+          </a:p>
+          <a:p>
+            <a:r>
+              <a:rPr lang="en-US" dirty="0"/>
+              <a:t>This is my lobby</a:t>
+            </a:r>
+          </a:p>
+          <a:p>
+            <a:pPr lvl="1"/>
+            <a:r>
+              <a:rPr lang="en-US" dirty="0"/>
+              <a:t>Introducing authentication and privacy into </a:t>
+            </a:r>
+            <a:r>
+              <a:rPr lang="en-US" dirty="0" err="1"/>
+              <a:t>BlazQ</a:t>
+            </a:r>
+            <a:endParaRPr lang="en-US" dirty="0"/>
+          </a:p>
+          <a:p>
+            <a:r>
+              <a:rPr lang="en-US" dirty="0"/>
+              <a:t>[Outro] </a:t>
+            </a:r>
+            <a:r>
+              <a:rPr lang="en-US" dirty="0" err="1"/>
+              <a:t>Ain’t</a:t>
+            </a:r>
+            <a:r>
+              <a:rPr lang="en-US" dirty="0"/>
+              <a:t> no sunshine when it's gone</a:t>
+            </a:r>
+          </a:p>
+          <a:p>
+            <a:pPr lvl="1"/>
+            <a:r>
+              <a:rPr lang="en-US" dirty="0"/>
+              <a:t>The careers as a software developer</a:t>
+            </a:r>
+            <a:endParaRPr lang="en-US" sz="2800" dirty="0"/>
+          </a:p>
+        </p:txBody>
+      </p:sp>
+      <p:grpSp>
+        <p:nvGrpSpPr>
+          <p:cNvPr id="4" name="Group 3">
+            <a:extLst>
+              <a:ext uri="{FF2B5EF4-FFF2-40B4-BE49-F238E27FC236}">
+                <a16:creationId xmlns:a16="http://schemas.microsoft.com/office/drawing/2014/main" id="{F27F823C-283E-4459-A359-B8E4CD8FAFCC}"/>
+              </a:ext>
+            </a:extLst>
+          </p:cNvPr>
+          <p:cNvGrpSpPr/>
+          <p:nvPr/>
+        </p:nvGrpSpPr>
+        <p:grpSpPr>
+          <a:xfrm>
+            <a:off x="533400" y="6477000"/>
+            <a:ext cx="11658600" cy="381000"/>
+            <a:chOff x="533400" y="6477000"/>
+            <a:chExt cx="11658600" cy="381000"/>
+          </a:xfrm>
+        </p:grpSpPr>
+        <p:sp>
+          <p:nvSpPr>
+            <p:cNvPr id="5" name="Rectangle 4">
+              <a:extLst>
+                <a:ext uri="{FF2B5EF4-FFF2-40B4-BE49-F238E27FC236}">
+                  <a16:creationId xmlns:a16="http://schemas.microsoft.com/office/drawing/2014/main" id="{05039F3F-2188-4711-812C-E813C395970A}"/>
+                </a:ext>
+              </a:extLst>
+            </p:cNvPr>
+            <p:cNvSpPr/>
+            <p:nvPr/>
+          </p:nvSpPr>
+          <p:spPr>
+            <a:xfrm>
+              <a:off x="7086600" y="6477000"/>
+              <a:ext cx="5105400" cy="304800"/>
+            </a:xfrm>
+            <a:prstGeom prst="rect">
+              <a:avLst/>
+            </a:prstGeom>
+            <a:solidFill>
+              <a:schemeClr val="bg1"/>
+            </a:solidFill>
+            <a:ln w="38100">
+              <a:solidFill>
+                <a:schemeClr val="accent4">
+                  <a:lumMod val="75000"/>
+                </a:schemeClr>
+              </a:solidFill>
+            </a:ln>
+          </p:spPr>
+          <p:style>
+            <a:lnRef idx="2">
+              <a:schemeClr val="accent1">
+                <a:shade val="50000"/>
+              </a:schemeClr>
+            </a:lnRef>
+            <a:fillRef idx="1">
+              <a:schemeClr val="accent1"/>
+            </a:fillRef>
+            <a:effectRef idx="0">
+              <a:schemeClr val="accent1"/>
+            </a:effectRef>
+            <a:fontRef idx="minor">
+              <a:schemeClr val="lt1"/>
+            </a:fontRef>
+          </p:style>
+          <p:txBody>
+            <a:bodyPr rtlCol="0" anchor="ctr"/>
+            <a:lstStyle/>
+            <a:p>
+              <a:pPr algn="ctr"/>
+              <a:endParaRPr lang="en-AU"/>
+            </a:p>
+          </p:txBody>
+        </p:sp>
+        <p:sp>
+          <p:nvSpPr>
+            <p:cNvPr id="6" name="Rectangle 5">
+              <a:extLst>
+                <a:ext uri="{FF2B5EF4-FFF2-40B4-BE49-F238E27FC236}">
+                  <a16:creationId xmlns:a16="http://schemas.microsoft.com/office/drawing/2014/main" id="{BE32812F-3025-4696-99E4-5AB3094B4D59}"/>
+                </a:ext>
+              </a:extLst>
+            </p:cNvPr>
+            <p:cNvSpPr/>
+            <p:nvPr/>
+          </p:nvSpPr>
+          <p:spPr>
+            <a:xfrm>
+              <a:off x="7086600" y="6477000"/>
+              <a:ext cx="5105400" cy="304800"/>
+            </a:xfrm>
+            <a:prstGeom prst="rect">
+              <a:avLst/>
+            </a:prstGeom>
+            <a:solidFill>
+              <a:schemeClr val="accent2"/>
+            </a:solidFill>
+            <a:ln w="38100">
+              <a:noFill/>
+            </a:ln>
+          </p:spPr>
+          <p:style>
+            <a:lnRef idx="2">
+              <a:schemeClr val="accent1">
+                <a:shade val="50000"/>
+              </a:schemeClr>
+            </a:lnRef>
+            <a:fillRef idx="1">
+              <a:schemeClr val="accent1"/>
+            </a:fillRef>
+            <a:effectRef idx="0">
+              <a:schemeClr val="accent1"/>
+            </a:effectRef>
+            <a:fontRef idx="minor">
+              <a:schemeClr val="lt1"/>
+            </a:fontRef>
+          </p:style>
+          <p:txBody>
+            <a:bodyPr rtlCol="0" anchor="ctr"/>
+            <a:lstStyle/>
+            <a:p>
+              <a:pPr algn="ctr"/>
+              <a:endParaRPr lang="en-AU" dirty="0"/>
+            </a:p>
+          </p:txBody>
+        </p:sp>
+        <p:sp>
+          <p:nvSpPr>
+            <p:cNvPr id="7" name="TextBox 6">
+              <a:extLst>
+                <a:ext uri="{FF2B5EF4-FFF2-40B4-BE49-F238E27FC236}">
+                  <a16:creationId xmlns:a16="http://schemas.microsoft.com/office/drawing/2014/main" id="{361553E1-8AC3-4D1F-BC04-D70F65BB2741}"/>
+                </a:ext>
+              </a:extLst>
+            </p:cNvPr>
+            <p:cNvSpPr txBox="1"/>
+            <p:nvPr/>
+          </p:nvSpPr>
+          <p:spPr>
+            <a:xfrm>
+              <a:off x="533400" y="6488668"/>
+              <a:ext cx="3962400" cy="369332"/>
+            </a:xfrm>
+            <a:prstGeom prst="rect">
+              <a:avLst/>
+            </a:prstGeom>
+            <a:noFill/>
+          </p:spPr>
+          <p:txBody>
+            <a:bodyPr wrap="square" rtlCol="0">
+              <a:spAutoFit/>
+            </a:bodyPr>
+            <a:lstStyle/>
+            <a:p>
+              <a:r>
+                <a:rPr lang="en-US" b="1" dirty="0">
+                  <a:solidFill>
+                    <a:schemeClr val="bg1"/>
+                  </a:solidFill>
+                  <a:latin typeface="Consolas (Headings)"/>
+                </a:rPr>
+                <a:t>Part IV: Debrief</a:t>
+              </a:r>
+              <a:endParaRPr lang="en-AU" b="1" dirty="0">
+                <a:solidFill>
+                  <a:schemeClr val="bg1"/>
+                </a:solidFill>
+                <a:latin typeface="Consolas (Headings)"/>
+              </a:endParaRPr>
+            </a:p>
+          </p:txBody>
+        </p:sp>
+      </p:grpSp>
+    </p:spTree>
+    <p:extLst>
+      <p:ext uri="{BB962C8B-B14F-4D97-AF65-F5344CB8AC3E}">
+        <p14:creationId xmlns:p14="http://schemas.microsoft.com/office/powerpoint/2010/main" val="799981591"/>
+      </p:ext>
+    </p:extLst>
+  </p:cSld>
+  <p:clrMapOvr>
+    <a:masterClrMapping/>
+  </p:clrMapOvr>
+</p:sld>
+</file>
+
+<file path=ppt/slides/slide37.xml><?xml version="1.0" encoding="utf-8"?>
+<p:sld xmlns:a="http://schemas.openxmlformats.org/drawingml/2006/main" xmlns:r="http://schemas.openxmlformats.org/officeDocument/2006/relationships" xmlns:p="http://schemas.openxmlformats.org/presentationml/2006/main">
+  <p:cSld>
+    <p:spTree>
+      <p:nvGrpSpPr>
+        <p:cNvPr id="1" name=""/>
+        <p:cNvGrpSpPr/>
+        <p:nvPr/>
+      </p:nvGrpSpPr>
+      <p:grpSpPr>
+        <a:xfrm>
+          <a:off x="0" y="0"/>
+          <a:ext cx="0" cy="0"/>
+          <a:chOff x="0" y="0"/>
+          <a:chExt cx="0" cy="0"/>
+        </a:xfrm>
+      </p:grpSpPr>
+      <p:sp>
+        <p:nvSpPr>
+          <p:cNvPr id="2" name="Title 1">
+            <a:extLst>
+              <a:ext uri="{FF2B5EF4-FFF2-40B4-BE49-F238E27FC236}">
+                <a16:creationId xmlns:a16="http://schemas.microsoft.com/office/drawing/2014/main" id="{BF06B1E5-4E0C-4BDA-B358-DCBFB8B5DE51}"/>
+              </a:ext>
+            </a:extLst>
+          </p:cNvPr>
+          <p:cNvSpPr>
+            <a:spLocks noGrp="1"/>
+          </p:cNvSpPr>
+          <p:nvPr>
+            <p:ph type="title"/>
+          </p:nvPr>
+        </p:nvSpPr>
+        <p:spPr/>
+        <p:txBody>
+          <a:bodyPr/>
+          <a:lstStyle/>
+          <a:p>
+            <a:r>
+              <a:rPr lang="de-DE" dirty="0"/>
               <a:t>Next Episode</a:t>
             </a:r>
             <a:endParaRPr lang="LID4096" dirty="0"/>
@@ -13009,7 +13720,7 @@
 </p:sld>
 </file>
 
-<file path=ppt/slides/slide36.xml><?xml version="1.0" encoding="utf-8"?>
+<file path=ppt/slides/slide38.xml><?xml version="1.0" encoding="utf-8"?>
 <p:sld xmlns:a="http://schemas.openxmlformats.org/drawingml/2006/main" xmlns:r="http://schemas.openxmlformats.org/officeDocument/2006/relationships" xmlns:p="http://schemas.openxmlformats.org/presentationml/2006/main">
   <p:cSld>
     <p:spTree>
@@ -13421,7 +14132,7 @@
 </p:sld>
 </file>
 
-<file path=ppt/slides/slide37.xml><?xml version="1.0" encoding="utf-8"?>
+<file path=ppt/slides/slide39.xml><?xml version="1.0" encoding="utf-8"?>
 <p:sld xmlns:a="http://schemas.openxmlformats.org/drawingml/2006/main" xmlns:r="http://schemas.openxmlformats.org/officeDocument/2006/relationships" xmlns:p="http://schemas.openxmlformats.org/presentationml/2006/main">
   <p:cSld>
     <p:spTree>
@@ -14231,7 +14942,7 @@
             </a:r>
             <a:r>
               <a:rPr lang="en-US" dirty="0"/>
-              <a:t> will help you to evaluate the question if a career as a Software Engineer is something you’ll enjoy</a:t>
+              <a:t> will help you to evaluate the question if a career as a Software Engineer is something, you’ll enjoy</a:t>
             </a:r>
           </a:p>
           <a:p>

</xml_diff>

<commit_message>
correct spelling in slides ep01
</commit_message>
<xml_diff>
--- a/episode1/media/slides-episode-1.pptx
+++ b/episode1/media/slides-episode-1.pptx
@@ -253,7 +253,7 @@
           <a:p>
             <a:fld id="{762B48F5-BACC-47D6-A0F7-82FBF9C6BC85}" type="datetimeFigureOut">
               <a:rPr lang="en-US"/>
-              <a:t>1/10/2021</a:t>
+              <a:t>1/20/2021</a:t>
             </a:fld>
             <a:endParaRPr/>
           </a:p>
@@ -418,7 +418,7 @@
           <a:p>
             <a:fld id="{0CB1CD00-5424-4675-AB18-2C419B060449}" type="datetimeFigureOut">
               <a:rPr lang="en-US"/>
-              <a:t>1/10/2021</a:t>
+              <a:t>1/20/2021</a:t>
             </a:fld>
             <a:endParaRPr/>
           </a:p>
@@ -1578,42 +1578,6 @@
           </a:p>
         </p:txBody>
       </p:sp>
-      <p:pic>
-        <p:nvPicPr>
-          <p:cNvPr id="10" name="Picture 9" descr="Shape&#10;&#10;Description automatically generated with medium confidence">
-            <a:extLst>
-              <a:ext uri="{FF2B5EF4-FFF2-40B4-BE49-F238E27FC236}">
-                <a16:creationId xmlns:a16="http://schemas.microsoft.com/office/drawing/2014/main" id="{BFDEE25F-60F4-47C6-BE9D-2300E5107A3E}"/>
-              </a:ext>
-            </a:extLst>
-          </p:cNvPr>
-          <p:cNvPicPr>
-            <a:picLocks noChangeAspect="1"/>
-          </p:cNvPicPr>
-          <p:nvPr userDrawn="1"/>
-        </p:nvPicPr>
-        <p:blipFill>
-          <a:blip r:embed="rId3" cstate="print">
-            <a:extLst>
-              <a:ext uri="{28A0092B-C50C-407E-A947-70E740481C1C}">
-                <a14:useLocalDpi xmlns:a14="http://schemas.microsoft.com/office/drawing/2010/main" val="0"/>
-              </a:ext>
-            </a:extLst>
-          </a:blip>
-          <a:stretch>
-            <a:fillRect/>
-          </a:stretch>
-        </p:blipFill>
-        <p:spPr>
-          <a:xfrm>
-            <a:off x="228600" y="4080887"/>
-            <a:ext cx="2362200" cy="2807030"/>
-          </a:xfrm>
-          <a:prstGeom prst="rect">
-            <a:avLst/>
-          </a:prstGeom>
-        </p:spPr>
-      </p:pic>
       <p:sp>
         <p:nvSpPr>
           <p:cNvPr id="11" name="TextBox 10">
@@ -1741,7 +1705,7 @@
             <p:nvPr userDrawn="1"/>
           </p:nvPicPr>
           <p:blipFill>
-            <a:blip r:embed="rId4"/>
+            <a:blip r:embed="rId3"/>
             <a:stretch>
               <a:fillRect/>
             </a:stretch>
@@ -1771,7 +1735,7 @@
             <p:nvPr userDrawn="1"/>
           </p:nvPicPr>
           <p:blipFill>
-            <a:blip r:embed="rId5"/>
+            <a:blip r:embed="rId4"/>
             <a:stretch>
               <a:fillRect/>
             </a:stretch>
@@ -1819,7 +1783,7 @@
                   <a:solidFill>
                     <a:schemeClr val="bg1"/>
                   </a:solidFill>
-                  <a:hlinkClick r:id="rId6">
+                  <a:hlinkClick r:id="rId5">
                     <a:extLst>
                       <a:ext uri="{A12FA001-AC4F-418D-AE19-62706E023703}">
                         <ahyp:hlinkClr xmlns:ahyp="http://schemas.microsoft.com/office/drawing/2018/hyperlinkcolor" val="tx"/>
@@ -1870,7 +1834,7 @@
                   <a:solidFill>
                     <a:schemeClr val="bg1"/>
                   </a:solidFill>
-                  <a:hlinkClick r:id="rId7">
+                  <a:hlinkClick r:id="rId6">
                     <a:extLst>
                       <a:ext uri="{A12FA001-AC4F-418D-AE19-62706E023703}">
                         <ahyp:hlinkClr xmlns:ahyp="http://schemas.microsoft.com/office/drawing/2018/hyperlinkcolor" val="tx"/>
@@ -1889,6 +1853,42 @@
           </p:txBody>
         </p:sp>
       </p:grpSp>
+      <p:pic>
+        <p:nvPicPr>
+          <p:cNvPr id="4" name="Picture 3">
+            <a:extLst>
+              <a:ext uri="{FF2B5EF4-FFF2-40B4-BE49-F238E27FC236}">
+                <a16:creationId xmlns:a16="http://schemas.microsoft.com/office/drawing/2014/main" id="{F1C94B65-7754-4355-AD5C-56099722DE29}"/>
+              </a:ext>
+            </a:extLst>
+          </p:cNvPr>
+          <p:cNvPicPr>
+            <a:picLocks noChangeAspect="1"/>
+          </p:cNvPicPr>
+          <p:nvPr userDrawn="1"/>
+        </p:nvPicPr>
+        <p:blipFill>
+          <a:blip r:embed="rId7">
+            <a:extLst>
+              <a:ext uri="{28A0092B-C50C-407E-A947-70E740481C1C}">
+                <a14:useLocalDpi xmlns:a14="http://schemas.microsoft.com/office/drawing/2010/main" val="0"/>
+              </a:ext>
+            </a:extLst>
+          </a:blip>
+          <a:stretch>
+            <a:fillRect/>
+          </a:stretch>
+        </p:blipFill>
+        <p:spPr>
+          <a:xfrm>
+            <a:off x="413238" y="3886200"/>
+            <a:ext cx="2101362" cy="2857853"/>
+          </a:xfrm>
+          <a:prstGeom prst="rect">
+            <a:avLst/>
+          </a:prstGeom>
+        </p:spPr>
+      </p:pic>
     </p:spTree>
     <p:extLst>
       <p:ext uri="{BB962C8B-B14F-4D97-AF65-F5344CB8AC3E}">
@@ -2144,7 +2144,7 @@
           <a:p>
             <a:fld id="{37CC0096-1860-4642-9CD2-0079EA5E7CD1}" type="datetimeFigureOut">
               <a:rPr lang="en-US" smtClean="0"/>
-              <a:t>1/10/2021</a:t>
+              <a:t>1/20/2021</a:t>
             </a:fld>
             <a:endParaRPr lang="en-US"/>
           </a:p>
@@ -2455,7 +2455,7 @@
           <a:p>
             <a:fld id="{37CC0096-1860-4642-9CD2-0079EA5E7CD1}" type="datetimeFigureOut">
               <a:rPr lang="en-US" smtClean="0"/>
-              <a:t>1/10/2021</a:t>
+              <a:t>1/20/2021</a:t>
             </a:fld>
             <a:endParaRPr lang="en-US"/>
           </a:p>
@@ -2624,7 +2624,7 @@
           <a:p>
             <a:fld id="{37CC0096-1860-4642-9CD2-0079EA5E7CD1}" type="datetimeFigureOut">
               <a:rPr lang="en-US" smtClean="0"/>
-              <a:t>1/10/2021</a:t>
+              <a:t>1/20/2021</a:t>
             </a:fld>
             <a:endParaRPr lang="en-US"/>
           </a:p>
@@ -2803,7 +2803,7 @@
           <a:p>
             <a:fld id="{37CC0096-1860-4642-9CD2-0079EA5E7CD1}" type="datetimeFigureOut">
               <a:rPr lang="en-US" smtClean="0"/>
-              <a:t>1/10/2021</a:t>
+              <a:t>1/20/2021</a:t>
             </a:fld>
             <a:endParaRPr lang="en-US"/>
           </a:p>
@@ -3094,7 +3094,7 @@
           <a:p>
             <a:fld id="{37CC0096-1860-4642-9CD2-0079EA5E7CD1}" type="datetimeFigureOut">
               <a:rPr lang="en-US" smtClean="0"/>
-              <a:t>1/10/2021</a:t>
+              <a:t>1/20/2021</a:t>
             </a:fld>
             <a:endParaRPr lang="en-US"/>
           </a:p>
@@ -3315,7 +3315,7 @@
                 <a:spcPts val="0"/>
               </a:spcBef>
               <a:buNone/>
-              <a:defRPr sz="2000">
+              <a:defRPr sz="3200">
                 <a:solidFill>
                   <a:schemeClr val="accent1"/>
                 </a:solidFill>
@@ -3521,7 +3521,7 @@
           <a:p>
             <a:fld id="{37CC0096-1860-4642-9CD2-0079EA5E7CD1}" type="datetimeFigureOut">
               <a:rPr lang="en-US" smtClean="0"/>
-              <a:t>1/10/2021</a:t>
+              <a:t>1/20/2021</a:t>
             </a:fld>
             <a:endParaRPr lang="en-US"/>
           </a:p>
@@ -3954,7 +3954,7 @@
           <a:p>
             <a:fld id="{37CC0096-1860-4642-9CD2-0079EA5E7CD1}" type="datetimeFigureOut">
               <a:rPr lang="en-US" smtClean="0"/>
-              <a:t>1/10/2021</a:t>
+              <a:t>1/20/2021</a:t>
             </a:fld>
             <a:endParaRPr lang="en-US"/>
           </a:p>
@@ -4393,7 +4393,7 @@
           <a:p>
             <a:fld id="{37CC0096-1860-4642-9CD2-0079EA5E7CD1}" type="datetimeFigureOut">
               <a:rPr lang="en-US" smtClean="0"/>
-              <a:t>1/10/2021</a:t>
+              <a:t>1/20/2021</a:t>
             </a:fld>
             <a:endParaRPr lang="en-US"/>
           </a:p>
@@ -4510,7 +4510,7 @@
           <a:p>
             <a:fld id="{37CC0096-1860-4642-9CD2-0079EA5E7CD1}" type="datetimeFigureOut">
               <a:rPr lang="en-US" smtClean="0"/>
-              <a:t>1/10/2021</a:t>
+              <a:t>1/20/2021</a:t>
             </a:fld>
             <a:endParaRPr lang="en-US"/>
           </a:p>
@@ -4605,7 +4605,7 @@
           <a:p>
             <a:fld id="{37CC0096-1860-4642-9CD2-0079EA5E7CD1}" type="datetimeFigureOut">
               <a:rPr lang="en-US" smtClean="0"/>
-              <a:t>1/10/2021</a:t>
+              <a:t>1/20/2021</a:t>
             </a:fld>
             <a:endParaRPr lang="en-US"/>
           </a:p>
@@ -4817,7 +4817,7 @@
           <a:p>
             <a:fld id="{9420A81C-88FD-4BBC-9AC4-0552DE3F24E8}" type="datetimeFigureOut">
               <a:rPr lang="LID4096" smtClean="0"/>
-              <a:t>01/10/2021</a:t>
+              <a:t>01/20/2021</a:t>
             </a:fld>
             <a:endParaRPr lang="LID4096"/>
           </a:p>
@@ -5401,7 +5401,7 @@
             <a:fld id="{37CC0096-1860-4642-9CD2-0079EA5E7CD1}" type="datetimeFigureOut">
               <a:rPr lang="en-US" smtClean="0"/>
               <a:pPr/>
-              <a:t>1/10/2021</a:t>
+              <a:t>1/20/2021</a:t>
             </a:fld>
             <a:endParaRPr lang="en-US"/>
           </a:p>
@@ -6372,8 +6372,8 @@
           <a:lstStyle/>
           <a:p>
             <a:r>
-              <a:rPr lang="en-US"/>
-              <a:t>What techniques will be covered</a:t>
+              <a:rPr lang="en-US" dirty="0"/>
+              <a:t>What techniques will be covered?</a:t>
             </a:r>
             <a:endParaRPr lang="LID4096" dirty="0"/>
           </a:p>
@@ -6408,25 +6408,25 @@
           <a:p>
             <a:r>
               <a:rPr lang="en-US" dirty="0"/>
-              <a:t>C# and Object orientated programming (OOP)</a:t>
+              <a:t>C# and object orientated programming (OOP)</a:t>
             </a:r>
           </a:p>
           <a:p>
             <a:r>
               <a:rPr lang="en-US" dirty="0"/>
-              <a:t>Client Server und HTTP REST API</a:t>
+              <a:t>Client server und HTTP REST API</a:t>
             </a:r>
           </a:p>
           <a:p>
             <a:r>
               <a:rPr lang="en-US" dirty="0"/>
-              <a:t>Persistent Data (Database, Storage)</a:t>
+              <a:t>Persistent data (Database, Storage)</a:t>
             </a:r>
           </a:p>
           <a:p>
             <a:r>
               <a:rPr lang="en-US" dirty="0"/>
-              <a:t>Bidirectional Communication (WebSocket)</a:t>
+              <a:t>Bidirectional communication (WebSocket)</a:t>
             </a:r>
           </a:p>
           <a:p>
@@ -6959,8 +6959,12 @@
           <a:lstStyle/>
           <a:p>
             <a:r>
+              <a:rPr lang="en-US" dirty="0"/>
+              <a:t>Learning</a:t>
+            </a:r>
+            <a:r>
               <a:rPr lang="en-US" b="1" dirty="0"/>
-              <a:t>Learning Mode</a:t>
+              <a:t> Mode</a:t>
             </a:r>
           </a:p>
         </p:txBody>
@@ -6997,7 +7001,7 @@
             <a:pPr lvl="0"/>
             <a:r>
               <a:rPr lang="en-US" dirty="0"/>
-              <a:t>Practice by yourself a time convenient for you</a:t>
+              <a:t>Practice by yourself at a time convenient for you</a:t>
             </a:r>
           </a:p>
         </p:txBody>
@@ -7228,7 +7232,7 @@
           <a:lstStyle/>
           <a:p>
             <a:r>
-              <a:rPr lang="en-US" b="1" dirty="0"/>
+              <a:rPr lang="en-US" dirty="0"/>
               <a:t>Learning Mode - GitHub</a:t>
             </a:r>
           </a:p>
@@ -7291,10 +7295,9 @@
           <a:p>
             <a:pPr lvl="1"/>
             <a:r>
-              <a:rPr lang="en-US" dirty="0" err="1"/>
-              <a:t>Etc</a:t>
-            </a:r>
-            <a:endParaRPr lang="en-US" dirty="0"/>
+              <a:rPr lang="en-US" dirty="0"/>
+              <a:t>And more</a:t>
+            </a:r>
           </a:p>
           <a:p>
             <a:r>
@@ -7533,7 +7536,7 @@
           <a:lstStyle/>
           <a:p>
             <a:r>
-              <a:rPr lang="en-US" b="1" dirty="0"/>
+              <a:rPr lang="en-US" dirty="0"/>
               <a:t>Learning Mode - GitHub</a:t>
             </a:r>
           </a:p>
@@ -7737,59 +7740,11 @@
           <a:p>
             <a:r>
               <a:rPr lang="de-DE" dirty="0"/>
-              <a:t>[</a:t>
+              <a:t>[See live </a:t>
             </a:r>
             <a:r>
               <a:rPr lang="de-DE" dirty="0" err="1"/>
-              <a:t>Heading</a:t>
-            </a:r>
-            <a:r>
-              <a:rPr lang="de-DE" dirty="0"/>
-              <a:t> </a:t>
-            </a:r>
-            <a:r>
-              <a:rPr lang="de-DE" dirty="0" err="1"/>
-              <a:t>to</a:t>
-            </a:r>
-            <a:r>
-              <a:rPr lang="de-DE" dirty="0"/>
-              <a:t> </a:t>
-            </a:r>
-            <a:r>
-              <a:rPr lang="de-DE" dirty="0" err="1"/>
-              <a:t>the</a:t>
-            </a:r>
-            <a:r>
-              <a:rPr lang="de-DE" dirty="0"/>
-              <a:t> </a:t>
-            </a:r>
-            <a:r>
-              <a:rPr lang="de-DE" dirty="0" err="1"/>
-              <a:t>repo</a:t>
-            </a:r>
-            <a:r>
-              <a:rPr lang="de-DE" dirty="0"/>
-              <a:t> and </a:t>
-            </a:r>
-            <a:r>
-              <a:rPr lang="de-DE" dirty="0" err="1"/>
-              <a:t>showing</a:t>
-            </a:r>
-            <a:r>
-              <a:rPr lang="de-DE" dirty="0"/>
-              <a:t> </a:t>
-            </a:r>
-            <a:r>
-              <a:rPr lang="de-DE" dirty="0" err="1"/>
-              <a:t>basic</a:t>
-            </a:r>
-            <a:r>
-              <a:rPr lang="de-DE" dirty="0"/>
-              <a:t> </a:t>
-            </a:r>
-            <a:r>
-              <a:rPr lang="de-DE" dirty="0" err="1"/>
-              <a:t>functions</a:t>
+              <a:t>demo</a:t>
             </a:r>
             <a:r>
               <a:rPr lang="de-DE" dirty="0"/>
@@ -8124,7 +8079,7 @@
           <a:lstStyle/>
           <a:p>
             <a:r>
-              <a:rPr lang="en-US" b="1" dirty="0"/>
+              <a:rPr lang="en-US" dirty="0"/>
               <a:t>Learning Mode - Questions</a:t>
             </a:r>
           </a:p>
@@ -8422,15 +8377,7 @@
             <a:pPr lvl="0"/>
             <a:r>
               <a:rPr lang="en-US" dirty="0"/>
-              <a:t>Move </a:t>
-            </a:r>
-            <a:r>
-              <a:rPr lang="en-US" dirty="0" err="1"/>
-              <a:t>Blazorly</a:t>
-            </a:r>
-            <a:r>
-              <a:rPr lang="en-US" dirty="0"/>
-              <a:t> around the screen</a:t>
+              <a:t>Move Blazorly around the screen</a:t>
             </a:r>
           </a:p>
         </p:txBody>
@@ -8712,14 +8659,16 @@
         </p:nvSpPr>
         <p:spPr/>
         <p:txBody>
-          <a:bodyPr/>
+          <a:bodyPr>
+            <a:normAutofit/>
+          </a:bodyPr>
           <a:lstStyle/>
           <a:p>
             <a:r>
-              <a:rPr lang="en-US" dirty="0"/>
+              <a:rPr lang="en-US" sz="2800" dirty="0"/>
               <a:t>Setting up the development environment </a:t>
             </a:r>
-            <a:endParaRPr lang="LID4096" dirty="0"/>
+            <a:endParaRPr lang="LID4096" sz="2800" dirty="0"/>
           </a:p>
         </p:txBody>
       </p:sp>
@@ -8803,15 +8752,14 @@
             <a:pPr lvl="0"/>
             <a:r>
               <a:rPr lang="en-US" dirty="0"/>
-              <a:t>Move </a:t>
-            </a:r>
-            <a:r>
-              <a:rPr lang="en-US" dirty="0" err="1"/>
-              <a:t>Blazorly</a:t>
-            </a:r>
+              <a:t>Move Blazorly around the screen</a:t>
+            </a:r>
+          </a:p>
+          <a:p>
+            <a:pPr lvl="0"/>
             <a:r>
               <a:rPr lang="en-US" dirty="0"/>
-              <a:t> around the screen</a:t>
+              <a:t>[See live demo]</a:t>
             </a:r>
           </a:p>
         </p:txBody>
@@ -8862,8 +8810,12 @@
           <a:lstStyle/>
           <a:p>
             <a:r>
+              <a:rPr lang="en-US" dirty="0"/>
+              <a:t>Setting</a:t>
+            </a:r>
+            <a:r>
               <a:rPr lang="en-US" b="1" dirty="0"/>
-              <a:t>Setting up the environment</a:t>
+              <a:t> up the environment</a:t>
             </a:r>
           </a:p>
         </p:txBody>
@@ -8892,21 +8844,21 @@
             </a:r>
           </a:p>
           <a:p>
-            <a:pPr lvl="0"/>
+            <a:pPr lvl="1"/>
             <a:r>
               <a:rPr lang="en-US" dirty="0"/>
               <a:t>.NET 5 SDK</a:t>
             </a:r>
           </a:p>
           <a:p>
-            <a:pPr lvl="0"/>
+            <a:pPr lvl="1"/>
             <a:r>
               <a:rPr lang="en-US" dirty="0"/>
               <a:t>Git </a:t>
             </a:r>
           </a:p>
           <a:p>
-            <a:pPr lvl="0"/>
+            <a:pPr lvl="1"/>
             <a:r>
               <a:rPr lang="en-US" dirty="0"/>
               <a:t>VS Code</a:t>
@@ -9146,7 +9098,7 @@
           <a:lstStyle/>
           <a:p>
             <a:r>
-              <a:rPr lang="en-US" b="1" dirty="0"/>
+              <a:rPr lang="en-US" dirty="0"/>
               <a:t>Setting up the environment</a:t>
             </a:r>
           </a:p>
@@ -9423,7 +9375,7 @@
           <a:lstStyle/>
           <a:p>
             <a:r>
-              <a:rPr lang="en-US" b="1" dirty="0"/>
+              <a:rPr lang="en-US" dirty="0"/>
               <a:t>Setting up the environment</a:t>
             </a:r>
             <a:endParaRPr lang="LID4096" dirty="0"/>
@@ -9824,7 +9776,7 @@
           <a:lstStyle/>
           <a:p>
             <a:r>
-              <a:rPr lang="en-US" dirty="0" err="1"/>
+              <a:rPr lang="en-US" dirty="0"/>
               <a:t>Blazorly</a:t>
             </a:r>
             <a:endParaRPr lang="LID4096" dirty="0"/>
@@ -9849,14 +9801,16 @@
         </p:nvSpPr>
         <p:spPr/>
         <p:txBody>
-          <a:bodyPr/>
+          <a:bodyPr>
+            <a:normAutofit/>
+          </a:bodyPr>
           <a:lstStyle/>
           <a:p>
             <a:r>
-              <a:rPr lang="en-US" dirty="0"/>
-              <a:t>How to program a simple animation</a:t>
-            </a:r>
-            <a:endParaRPr lang="LID4096" dirty="0"/>
+              <a:rPr lang="en-US" sz="2800" dirty="0"/>
+              <a:t>How to instruct a simple animation</a:t>
+            </a:r>
+            <a:endParaRPr lang="LID4096" sz="2800" dirty="0"/>
           </a:p>
         </p:txBody>
       </p:sp>
@@ -9970,10 +9924,8 @@
           <a:p>
             <a:r>
               <a:rPr lang="en-US" dirty="0"/>
-              <a:t>type: git clone &lt;Paste URL&gt;</a:t>
-            </a:r>
-          </a:p>
-          <a:p>
+              <a:t>type: git clone https://github.com/just-the-benno/BlazQ.git</a:t>
+            </a:r>
             <a:endParaRPr lang="LID4096" dirty="0"/>
           </a:p>
         </p:txBody>
@@ -10141,16 +10093,7 @@
                   </a:solidFill>
                   <a:latin typeface="Consolas (Headings)"/>
                 </a:rPr>
-                <a:t>Part III: </a:t>
-              </a:r>
-              <a:r>
-                <a:rPr lang="en-US" b="1" dirty="0" err="1">
-                  <a:solidFill>
-                    <a:schemeClr val="bg1"/>
-                  </a:solidFill>
-                  <a:latin typeface="Consolas (Headings)"/>
-                </a:rPr>
-                <a:t>Blazorly</a:t>
+                <a:t>Part III: Blazorly</a:t>
               </a:r>
               <a:endParaRPr lang="en-AU" b="1" dirty="0">
                 <a:solidFill>
@@ -10432,16 +10375,7 @@
                   </a:solidFill>
                   <a:latin typeface="Consolas (Headings)"/>
                 </a:rPr>
-                <a:t>Part III: </a:t>
-              </a:r>
-              <a:r>
-                <a:rPr lang="en-US" b="1" dirty="0" err="1">
-                  <a:solidFill>
-                    <a:schemeClr val="bg1"/>
-                  </a:solidFill>
-                  <a:latin typeface="Consolas (Headings)"/>
-                </a:rPr>
-                <a:t>Blazorly</a:t>
+                <a:t>Part III: Blazorly</a:t>
               </a:r>
               <a:endParaRPr lang="en-AU" b="1" dirty="0">
                 <a:solidFill>
@@ -10513,11 +10447,7 @@
           <a:p>
             <a:r>
               <a:rPr lang="en-US" dirty="0"/>
-              <a:t>Starting point: Say hello to </a:t>
-            </a:r>
-            <a:r>
-              <a:rPr lang="en-US" dirty="0" err="1"/>
-              <a:t>Blazorly</a:t>
+              <a:t>Starting point: Say hello to Blazorly</a:t>
             </a:r>
             <a:endParaRPr lang="LID4096" dirty="0"/>
           </a:p>
@@ -10718,16 +10648,7 @@
                   </a:solidFill>
                   <a:latin typeface="Consolas (Headings)"/>
                 </a:rPr>
-                <a:t>Part III: </a:t>
-              </a:r>
-              <a:r>
-                <a:rPr lang="en-US" b="1" dirty="0" err="1">
-                  <a:solidFill>
-                    <a:schemeClr val="bg1"/>
-                  </a:solidFill>
-                  <a:latin typeface="Consolas (Headings)"/>
-                </a:rPr>
-                <a:t>Blazorly</a:t>
+                <a:t>Part III: Blazorly</a:t>
               </a:r>
               <a:endParaRPr lang="en-AU" b="1" dirty="0">
                 <a:solidFill>
@@ -11006,16 +10927,7 @@
                   </a:solidFill>
                   <a:latin typeface="Consolas (Headings)"/>
                 </a:rPr>
-                <a:t>Part III: </a:t>
-              </a:r>
-              <a:r>
-                <a:rPr lang="en-US" b="1" dirty="0" err="1">
-                  <a:solidFill>
-                    <a:schemeClr val="bg1"/>
-                  </a:solidFill>
-                  <a:latin typeface="Consolas (Headings)"/>
-                </a:rPr>
-                <a:t>Blazorly</a:t>
+                <a:t>Part III: Blazorly</a:t>
               </a:r>
               <a:endParaRPr lang="en-AU" b="1" dirty="0">
                 <a:solidFill>
@@ -11278,16 +11190,7 @@
                   </a:solidFill>
                   <a:latin typeface="Consolas (Headings)"/>
                 </a:rPr>
-                <a:t>Part III: </a:t>
-              </a:r>
-              <a:r>
-                <a:rPr lang="en-US" b="1" dirty="0" err="1">
-                  <a:solidFill>
-                    <a:schemeClr val="bg1"/>
-                  </a:solidFill>
-                  <a:latin typeface="Consolas (Headings)"/>
-                </a:rPr>
-                <a:t>Blazorly</a:t>
+                <a:t>Part III: Blazorly</a:t>
               </a:r>
               <a:endParaRPr lang="en-AU" b="1" dirty="0">
                 <a:solidFill>
@@ -11393,15 +11296,7 @@
           <a:p>
             <a:r>
               <a:rPr lang="en-US" dirty="0"/>
-              <a:t>Let </a:t>
-            </a:r>
-            <a:r>
-              <a:rPr lang="en-US" dirty="0" err="1"/>
-              <a:t>Blazorly</a:t>
-            </a:r>
-            <a:r>
-              <a:rPr lang="en-US" dirty="0"/>
-              <a:t> move</a:t>
+              <a:t>Let’s move Blazorly</a:t>
             </a:r>
           </a:p>
           <a:p>
@@ -11647,16 +11542,7 @@
                   </a:solidFill>
                   <a:latin typeface="Consolas (Headings)"/>
                 </a:rPr>
-                <a:t>Part III: </a:t>
-              </a:r>
-              <a:r>
-                <a:rPr lang="en-US" b="1" dirty="0" err="1">
-                  <a:solidFill>
-                    <a:schemeClr val="bg1"/>
-                  </a:solidFill>
-                  <a:latin typeface="Consolas (Headings)"/>
-                </a:rPr>
-                <a:t>Blazorly</a:t>
+                <a:t>Part III: Blazorly</a:t>
               </a:r>
               <a:endParaRPr lang="en-AU" b="1" dirty="0">
                 <a:solidFill>
@@ -11952,16 +11838,7 @@
                   </a:solidFill>
                   <a:latin typeface="Consolas (Headings)"/>
                 </a:rPr>
-                <a:t>Part III: </a:t>
-              </a:r>
-              <a:r>
-                <a:rPr lang="en-US" b="1" dirty="0" err="1">
-                  <a:solidFill>
-                    <a:schemeClr val="bg1"/>
-                  </a:solidFill>
-                  <a:latin typeface="Consolas (Headings)"/>
-                </a:rPr>
-                <a:t>Blazorly</a:t>
+                <a:t>Part III: Blazorly</a:t>
               </a:r>
               <a:endParaRPr lang="en-AU" b="1" dirty="0">
                 <a:solidFill>
@@ -12410,7 +12287,7 @@
           <a:p>
             <a:r>
               <a:rPr lang="en-US" dirty="0"/>
-              <a:t>Summery</a:t>
+              <a:t>Summary</a:t>
             </a:r>
             <a:endParaRPr lang="LID4096" dirty="0"/>
           </a:p>
@@ -12453,15 +12330,7 @@
           <a:p>
             <a:r>
               <a:rPr lang="en-US" dirty="0"/>
-              <a:t>This episode was about to accomplish (the movement of </a:t>
-            </a:r>
-            <a:r>
-              <a:rPr lang="en-US" dirty="0" err="1"/>
-              <a:t>Blazorly</a:t>
-            </a:r>
-            <a:r>
-              <a:rPr lang="en-US" dirty="0"/>
-              <a:t>) to feel good for the next session</a:t>
+              <a:t>This episode was about to accomplish (the movement of Blazorly) to feel good for the next session</a:t>
             </a:r>
             <a:endParaRPr lang="LID4096" dirty="0"/>
           </a:p>
@@ -13940,6 +13809,18 @@
             <a:endParaRPr lang="de-DE" dirty="0"/>
           </a:p>
           <a:p>
+            <a:r>
+              <a:rPr lang="de-DE" dirty="0">
+                <a:hlinkClick r:id="rId2"/>
+              </a:rPr>
+              <a:t>https://forms.gle/HKFBKnQDT6KyFjRS9</a:t>
+            </a:r>
+            <a:r>
+              <a:rPr lang="de-DE" dirty="0"/>
+              <a:t> </a:t>
+            </a:r>
+          </a:p>
+          <a:p>
             <a:endParaRPr lang="LID4096" dirty="0"/>
           </a:p>
         </p:txBody>
@@ -14470,20 +14351,14 @@
         </p:nvSpPr>
         <p:spPr/>
         <p:txBody>
-          <a:bodyPr/>
+          <a:bodyPr>
+            <a:normAutofit fontScale="85000" lnSpcReduction="20000"/>
+          </a:bodyPr>
           <a:lstStyle/>
           <a:p>
             <a:r>
               <a:rPr lang="en-AU" dirty="0"/>
-              <a:t>What is </a:t>
-            </a:r>
-            <a:r>
-              <a:rPr lang="en-AU" dirty="0" err="1"/>
-              <a:t>BlazQ</a:t>
-            </a:r>
-            <a:r>
-              <a:rPr lang="en-AU" dirty="0"/>
-              <a:t> and how does it help to learn software development?</a:t>
+              <a:t>What is BlazQ and how does it help to learn software development?</a:t>
             </a:r>
           </a:p>
         </p:txBody>
@@ -14596,7 +14471,7 @@
           <a:p>
             <a:r>
               <a:rPr lang="en-US" dirty="0"/>
-              <a:t>Worked as Freelancer in different domains including</a:t>
+              <a:t>Worked as a freelancer in different domains including</a:t>
             </a:r>
           </a:p>
           <a:p>
@@ -14937,18 +14812,14 @@
           <a:lstStyle/>
           <a:p>
             <a:r>
-              <a:rPr lang="en-US" dirty="0" err="1"/>
-              <a:t>BlazQ</a:t>
-            </a:r>
-            <a:r>
               <a:rPr lang="en-US" dirty="0"/>
-              <a:t> will help you to evaluate the question if a career as a Software Engineer is something, you’ll enjoy</a:t>
+              <a:t>BlazQ will help you to evaluate the question whether a career as a Software Engineer is something that you’ll enjoy</a:t>
             </a:r>
           </a:p>
           <a:p>
             <a:r>
               <a:rPr lang="en-US" dirty="0"/>
-              <a:t>You can see, if the way of thinking is something you want to do to earn a living</a:t>
+              <a:t>You can see, if the this way of thinking is something you want to do to earn a living</a:t>
             </a:r>
           </a:p>
           <a:p>
@@ -14984,7 +14855,7 @@
           <a:p>
             <a:r>
               <a:rPr lang="en-US" b="1" dirty="0"/>
-              <a:t>I want to develop Software!</a:t>
+              <a:t>I want to develop software!</a:t>
             </a:r>
             <a:endParaRPr lang="LID4096" b="1" dirty="0"/>
           </a:p>
@@ -15019,13 +14890,13 @@
           <a:p>
             <a:r>
               <a:rPr lang="en-US" dirty="0"/>
-              <a:t>You don’t know where to start or feels overwhelmed by all the possibilities</a:t>
+              <a:t>You don’t know where to start or feel overwhelmed by all the possibilities</a:t>
             </a:r>
           </a:p>
           <a:p>
             <a:r>
               <a:rPr lang="en-US" dirty="0"/>
-              <a:t>Looking for a challenging but still easy to fellow introduction</a:t>
+              <a:t>Looking for a challenging but still easy to follow introduction</a:t>
             </a:r>
             <a:endParaRPr lang="LID4096" dirty="0"/>
           </a:p>
@@ -15103,7 +14974,7 @@
             <a:lstStyle/>
             <a:p>
               <a:pPr algn="ctr"/>
-              <a:endParaRPr lang="en-AU"/>
+              <a:endParaRPr lang="en-AU" dirty="0"/>
             </a:p>
           </p:txBody>
         </p:sp>
@@ -15258,15 +15129,7 @@
           <a:p>
             <a:r>
               <a:rPr lang="en-US" dirty="0"/>
-              <a:t>Why </a:t>
-            </a:r>
-            <a:r>
-              <a:rPr lang="en-US" dirty="0" err="1"/>
-              <a:t>BlazQ</a:t>
-            </a:r>
-            <a:r>
-              <a:rPr lang="en-US" dirty="0"/>
-              <a:t>?</a:t>
+              <a:t>Why BlazQ?</a:t>
             </a:r>
           </a:p>
         </p:txBody>
@@ -15304,12 +15167,8 @@
           </a:p>
           <a:p>
             <a:r>
-              <a:rPr lang="en-US" dirty="0" err="1"/>
-              <a:t>BlazQ</a:t>
-            </a:r>
-            <a:r>
               <a:rPr lang="en-US" dirty="0"/>
-              <a:t> is my contribution to a smooth start on the path towards becoming a software developer </a:t>
+              <a:t>BlazQ is my contribution to a smooth start on the path towards becoming a software developer </a:t>
             </a:r>
           </a:p>
         </p:txBody>
@@ -15386,7 +15245,7 @@
             <a:lstStyle/>
             <a:p>
               <a:pPr algn="ctr"/>
-              <a:endParaRPr lang="en-AU"/>
+              <a:endParaRPr lang="en-AU" dirty="0"/>
             </a:p>
           </p:txBody>
         </p:sp>
@@ -15536,40 +15395,46 @@
           <a:p>
             <a:r>
               <a:rPr lang="en-US" dirty="0"/>
-              <a:t>What is </a:t>
-            </a:r>
-            <a:r>
-              <a:rPr lang="en-US" dirty="0" err="1"/>
-              <a:t>BlazQ</a:t>
-            </a:r>
-            <a:r>
-              <a:rPr lang="en-US" dirty="0"/>
-              <a:t>?</a:t>
-            </a:r>
-          </a:p>
-        </p:txBody>
-      </p:sp>
-      <p:sp>
-        <p:nvSpPr>
-          <p:cNvPr id="14" name="Content Placeholder 13"/>
-          <p:cNvSpPr>
-            <a:spLocks noGrp="1"/>
-          </p:cNvSpPr>
+              <a:t>What is BlazQ?</a:t>
+            </a:r>
+          </a:p>
+        </p:txBody>
+      </p:sp>
+      <p:pic>
+        <p:nvPicPr>
+          <p:cNvPr id="8" name="Content Placeholder 7">
+            <a:extLst>
+              <a:ext uri="{FF2B5EF4-FFF2-40B4-BE49-F238E27FC236}">
+                <a16:creationId xmlns:a16="http://schemas.microsoft.com/office/drawing/2014/main" id="{EE45C24F-0F72-413D-A043-C0445E312E02}"/>
+              </a:ext>
+            </a:extLst>
+          </p:cNvPr>
+          <p:cNvPicPr>
+            <a:picLocks noGrp="1" noChangeAspect="1"/>
+          </p:cNvPicPr>
           <p:nvPr>
             <p:ph sz="half" idx="1"/>
           </p:nvPr>
-        </p:nvSpPr>
-        <p:spPr/>
-        <p:txBody>
-          <a:bodyPr>
-            <a:normAutofit lnSpcReduction="10000"/>
-          </a:bodyPr>
-          <a:lstStyle/>
-          <a:p>
-            <a:endParaRPr lang="en-US" dirty="0"/>
-          </a:p>
-        </p:txBody>
-      </p:sp>
+        </p:nvPicPr>
+        <p:blipFill>
+          <a:blip r:embed="rId2" cstate="print">
+            <a:extLst>
+              <a:ext uri="{28A0092B-C50C-407E-A947-70E740481C1C}">
+                <a14:useLocalDpi xmlns:a14="http://schemas.microsoft.com/office/drawing/2010/main" val="0"/>
+              </a:ext>
+            </a:extLst>
+          </a:blip>
+          <a:stretch>
+            <a:fillRect/>
+          </a:stretch>
+        </p:blipFill>
+        <p:spPr>
+          <a:xfrm>
+            <a:off x="2498380" y="1825625"/>
+            <a:ext cx="2394640" cy="4270375"/>
+          </a:xfrm>
+        </p:spPr>
+      </p:pic>
       <p:sp>
         <p:nvSpPr>
           <p:cNvPr id="3" name="Content Placeholder 2">
@@ -15604,7 +15469,7 @@
             </a:r>
             <a:r>
               <a:rPr lang="en-US" sz="2800" dirty="0"/>
-              <a:t> is web technology from the .NET stack</a:t>
+              <a:t> is web technology within the .NET stack</a:t>
             </a:r>
           </a:p>
           <a:p>
@@ -15629,7 +15494,7 @@
             <a:pPr lvl="0"/>
             <a:r>
               <a:rPr lang="en-US" sz="2800" dirty="0"/>
-              <a:t>Starting local, to coach coop, to a online multiplayer version</a:t>
+              <a:t>Starting local player, to couch coop, to a online multiplayer version</a:t>
             </a:r>
           </a:p>
         </p:txBody>
@@ -15904,7 +15769,7 @@
             <a:pPr lvl="1"/>
             <a:r>
               <a:rPr lang="en-US" dirty="0"/>
-              <a:t>Taking itself not too serious</a:t>
+              <a:t>Taking itself not too seriously</a:t>
             </a:r>
           </a:p>
           <a:p>

</xml_diff>

<commit_message>
updating slides for ep 01
</commit_message>
<xml_diff>
--- a/episode1/media/slides-episode-1.pptx
+++ b/episode1/media/slides-episode-1.pptx
@@ -253,7 +253,7 @@
           <a:p>
             <a:fld id="{762B48F5-BACC-47D6-A0F7-82FBF9C6BC85}" type="datetimeFigureOut">
               <a:rPr lang="en-US"/>
-              <a:t>1/20/2021</a:t>
+              <a:t>1/21/2021</a:t>
             </a:fld>
             <a:endParaRPr/>
           </a:p>
@@ -418,7 +418,7 @@
           <a:p>
             <a:fld id="{0CB1CD00-5424-4675-AB18-2C419B060449}" type="datetimeFigureOut">
               <a:rPr lang="en-US"/>
-              <a:t>1/20/2021</a:t>
+              <a:t>1/21/2021</a:t>
             </a:fld>
             <a:endParaRPr/>
           </a:p>
@@ -2144,7 +2144,7 @@
           <a:p>
             <a:fld id="{37CC0096-1860-4642-9CD2-0079EA5E7CD1}" type="datetimeFigureOut">
               <a:rPr lang="en-US" smtClean="0"/>
-              <a:t>1/20/2021</a:t>
+              <a:t>1/21/2021</a:t>
             </a:fld>
             <a:endParaRPr lang="en-US"/>
           </a:p>
@@ -2455,7 +2455,7 @@
           <a:p>
             <a:fld id="{37CC0096-1860-4642-9CD2-0079EA5E7CD1}" type="datetimeFigureOut">
               <a:rPr lang="en-US" smtClean="0"/>
-              <a:t>1/20/2021</a:t>
+              <a:t>1/21/2021</a:t>
             </a:fld>
             <a:endParaRPr lang="en-US"/>
           </a:p>
@@ -2624,7 +2624,7 @@
           <a:p>
             <a:fld id="{37CC0096-1860-4642-9CD2-0079EA5E7CD1}" type="datetimeFigureOut">
               <a:rPr lang="en-US" smtClean="0"/>
-              <a:t>1/20/2021</a:t>
+              <a:t>1/21/2021</a:t>
             </a:fld>
             <a:endParaRPr lang="en-US"/>
           </a:p>
@@ -2803,7 +2803,7 @@
           <a:p>
             <a:fld id="{37CC0096-1860-4642-9CD2-0079EA5E7CD1}" type="datetimeFigureOut">
               <a:rPr lang="en-US" smtClean="0"/>
-              <a:t>1/20/2021</a:t>
+              <a:t>1/21/2021</a:t>
             </a:fld>
             <a:endParaRPr lang="en-US"/>
           </a:p>
@@ -3094,7 +3094,7 @@
           <a:p>
             <a:fld id="{37CC0096-1860-4642-9CD2-0079EA5E7CD1}" type="datetimeFigureOut">
               <a:rPr lang="en-US" smtClean="0"/>
-              <a:t>1/20/2021</a:t>
+              <a:t>1/21/2021</a:t>
             </a:fld>
             <a:endParaRPr lang="en-US"/>
           </a:p>
@@ -3521,7 +3521,7 @@
           <a:p>
             <a:fld id="{37CC0096-1860-4642-9CD2-0079EA5E7CD1}" type="datetimeFigureOut">
               <a:rPr lang="en-US" smtClean="0"/>
-              <a:t>1/20/2021</a:t>
+              <a:t>1/21/2021</a:t>
             </a:fld>
             <a:endParaRPr lang="en-US"/>
           </a:p>
@@ -3954,7 +3954,7 @@
           <a:p>
             <a:fld id="{37CC0096-1860-4642-9CD2-0079EA5E7CD1}" type="datetimeFigureOut">
               <a:rPr lang="en-US" smtClean="0"/>
-              <a:t>1/20/2021</a:t>
+              <a:t>1/21/2021</a:t>
             </a:fld>
             <a:endParaRPr lang="en-US"/>
           </a:p>
@@ -4393,7 +4393,7 @@
           <a:p>
             <a:fld id="{37CC0096-1860-4642-9CD2-0079EA5E7CD1}" type="datetimeFigureOut">
               <a:rPr lang="en-US" smtClean="0"/>
-              <a:t>1/20/2021</a:t>
+              <a:t>1/21/2021</a:t>
             </a:fld>
             <a:endParaRPr lang="en-US"/>
           </a:p>
@@ -4510,7 +4510,7 @@
           <a:p>
             <a:fld id="{37CC0096-1860-4642-9CD2-0079EA5E7CD1}" type="datetimeFigureOut">
               <a:rPr lang="en-US" smtClean="0"/>
-              <a:t>1/20/2021</a:t>
+              <a:t>1/21/2021</a:t>
             </a:fld>
             <a:endParaRPr lang="en-US"/>
           </a:p>
@@ -4605,7 +4605,7 @@
           <a:p>
             <a:fld id="{37CC0096-1860-4642-9CD2-0079EA5E7CD1}" type="datetimeFigureOut">
               <a:rPr lang="en-US" smtClean="0"/>
-              <a:t>1/20/2021</a:t>
+              <a:t>1/21/2021</a:t>
             </a:fld>
             <a:endParaRPr lang="en-US"/>
           </a:p>
@@ -4817,7 +4817,7 @@
           <a:p>
             <a:fld id="{9420A81C-88FD-4BBC-9AC4-0552DE3F24E8}" type="datetimeFigureOut">
               <a:rPr lang="LID4096" smtClean="0"/>
-              <a:t>01/20/2021</a:t>
+              <a:t>01/21/2021</a:t>
             </a:fld>
             <a:endParaRPr lang="LID4096"/>
           </a:p>
@@ -5401,7 +5401,7 @@
             <a:fld id="{37CC0096-1860-4642-9CD2-0079EA5E7CD1}" type="datetimeFigureOut">
               <a:rPr lang="en-US" smtClean="0"/>
               <a:pPr/>
-              <a:t>1/20/2021</a:t>
+              <a:t>1/21/2021</a:t>
             </a:fld>
             <a:endParaRPr lang="en-US"/>
           </a:p>
@@ -6698,7 +6698,7 @@
             </a:pPr>
             <a:r>
               <a:rPr lang="en-US" dirty="0"/>
-              <a:t>There are no dump questions</a:t>
+              <a:t>There are no dumb questions</a:t>
             </a:r>
           </a:p>
           <a:p>
@@ -6708,7 +6708,7 @@
             </a:pPr>
             <a:r>
               <a:rPr lang="en-US" dirty="0"/>
-              <a:t>I’m not free of error</a:t>
+              <a:t>No one is free of error</a:t>
             </a:r>
           </a:p>
           <a:p>

</xml_diff>